<commit_message>
Changes to DOE Poster for bioclim
</commit_message>
<xml_diff>
--- a/presentations/MacQueen_Juenger_DOE.pptx
+++ b/presentations/MacQueen_Juenger_DOE.pptx
@@ -4,6 +4,9 @@
   <p:sldMasterIdLst>
     <p:sldMasterId id="2147483684" r:id="rId1"/>
   </p:sldMasterIdLst>
+  <p:notesMasterIdLst>
+    <p:notesMasterId r:id="rId3"/>
+  </p:notesMasterIdLst>
   <p:sldIdLst>
     <p:sldId id="256" r:id="rId2"/>
   </p:sldIdLst>
@@ -104,7 +107,450 @@
       </a:defRPr>
     </a:lvl9pPr>
   </p:defaultTextStyle>
+  <p:extLst>
+    <p:ext uri="{EFAFB233-063F-42B5-8137-9DF3F51BA10A}">
+      <p15:sldGuideLst xmlns:p15="http://schemas.microsoft.com/office/powerpoint/2012/main"/>
+    </p:ext>
+  </p:extLst>
 </p:presentation>
+</file>
+
+<file path=ppt/notesMasters/notesMaster1.xml><?xml version="1.0" encoding="utf-8"?>
+<p:notesMaster xmlns:a="http://schemas.openxmlformats.org/drawingml/2006/main" xmlns:r="http://schemas.openxmlformats.org/officeDocument/2006/relationships" xmlns:p="http://schemas.openxmlformats.org/presentationml/2006/main">
+  <p:cSld>
+    <p:bg>
+      <p:bgRef idx="1001">
+        <a:schemeClr val="bg1"/>
+      </p:bgRef>
+    </p:bg>
+    <p:spTree>
+      <p:nvGrpSpPr>
+        <p:cNvPr id="1" name=""/>
+        <p:cNvGrpSpPr/>
+        <p:nvPr/>
+      </p:nvGrpSpPr>
+      <p:grpSpPr>
+        <a:xfrm>
+          <a:off x="0" y="0"/>
+          <a:ext cx="0" cy="0"/>
+          <a:chOff x="0" y="0"/>
+          <a:chExt cx="0" cy="0"/>
+        </a:xfrm>
+      </p:grpSpPr>
+      <p:sp>
+        <p:nvSpPr>
+          <p:cNvPr id="2" name="Header Placeholder 1"/>
+          <p:cNvSpPr>
+            <a:spLocks noGrp="1"/>
+          </p:cNvSpPr>
+          <p:nvPr>
+            <p:ph type="hdr" sz="quarter"/>
+          </p:nvPr>
+        </p:nvSpPr>
+        <p:spPr>
+          <a:xfrm>
+            <a:off x="0" y="0"/>
+            <a:ext cx="2971800" cy="458788"/>
+          </a:xfrm>
+          <a:prstGeom prst="rect">
+            <a:avLst/>
+          </a:prstGeom>
+        </p:spPr>
+        <p:txBody>
+          <a:bodyPr vert="horz" lIns="91440" tIns="45720" rIns="91440" bIns="45720" rtlCol="0"/>
+          <a:lstStyle>
+            <a:lvl1pPr algn="l">
+              <a:defRPr sz="1200"/>
+            </a:lvl1pPr>
+          </a:lstStyle>
+          <a:p>
+            <a:endParaRPr lang="en-US"/>
+          </a:p>
+        </p:txBody>
+      </p:sp>
+      <p:sp>
+        <p:nvSpPr>
+          <p:cNvPr id="3" name="Date Placeholder 2"/>
+          <p:cNvSpPr>
+            <a:spLocks noGrp="1"/>
+          </p:cNvSpPr>
+          <p:nvPr>
+            <p:ph type="dt" idx="1"/>
+          </p:nvPr>
+        </p:nvSpPr>
+        <p:spPr>
+          <a:xfrm>
+            <a:off x="3884613" y="0"/>
+            <a:ext cx="2971800" cy="458788"/>
+          </a:xfrm>
+          <a:prstGeom prst="rect">
+            <a:avLst/>
+          </a:prstGeom>
+        </p:spPr>
+        <p:txBody>
+          <a:bodyPr vert="horz" lIns="91440" tIns="45720" rIns="91440" bIns="45720" rtlCol="0"/>
+          <a:lstStyle>
+            <a:lvl1pPr algn="r">
+              <a:defRPr sz="1200"/>
+            </a:lvl1pPr>
+          </a:lstStyle>
+          <a:p>
+            <a:fld id="{4944184F-C803-4148-93A0-DFA06EF5EF58}" type="datetimeFigureOut">
+              <a:rPr lang="en-US" smtClean="0"/>
+              <a:t>2/18/2020</a:t>
+            </a:fld>
+            <a:endParaRPr lang="en-US"/>
+          </a:p>
+        </p:txBody>
+      </p:sp>
+      <p:sp>
+        <p:nvSpPr>
+          <p:cNvPr id="4" name="Slide Image Placeholder 3"/>
+          <p:cNvSpPr>
+            <a:spLocks noGrp="1" noRot="1" noChangeAspect="1"/>
+          </p:cNvSpPr>
+          <p:nvPr>
+            <p:ph type="sldImg" idx="2"/>
+          </p:nvPr>
+        </p:nvSpPr>
+        <p:spPr>
+          <a:xfrm>
+            <a:off x="1628775" y="1143000"/>
+            <a:ext cx="3600450" cy="3086100"/>
+          </a:xfrm>
+          <a:prstGeom prst="rect">
+            <a:avLst/>
+          </a:prstGeom>
+          <a:noFill/>
+          <a:ln w="12700">
+            <a:solidFill>
+              <a:prstClr val="black"/>
+            </a:solidFill>
+          </a:ln>
+        </p:spPr>
+        <p:txBody>
+          <a:bodyPr vert="horz" lIns="91440" tIns="45720" rIns="91440" bIns="45720" rtlCol="0" anchor="ctr"/>
+          <a:lstStyle/>
+          <a:p>
+            <a:endParaRPr lang="en-US"/>
+          </a:p>
+        </p:txBody>
+      </p:sp>
+      <p:sp>
+        <p:nvSpPr>
+          <p:cNvPr id="5" name="Notes Placeholder 4"/>
+          <p:cNvSpPr>
+            <a:spLocks noGrp="1"/>
+          </p:cNvSpPr>
+          <p:nvPr>
+            <p:ph type="body" sz="quarter" idx="3"/>
+          </p:nvPr>
+        </p:nvSpPr>
+        <p:spPr>
+          <a:xfrm>
+            <a:off x="685800" y="4400550"/>
+            <a:ext cx="5486400" cy="3600450"/>
+          </a:xfrm>
+          <a:prstGeom prst="rect">
+            <a:avLst/>
+          </a:prstGeom>
+        </p:spPr>
+        <p:txBody>
+          <a:bodyPr vert="horz" lIns="91440" tIns="45720" rIns="91440" bIns="45720" rtlCol="0"/>
+          <a:lstStyle/>
+          <a:p>
+            <a:pPr lvl="0"/>
+            <a:r>
+              <a:rPr lang="en-US" smtClean="0"/>
+              <a:t>Edit Master text styles</a:t>
+            </a:r>
+          </a:p>
+          <a:p>
+            <a:pPr lvl="1"/>
+            <a:r>
+              <a:rPr lang="en-US" smtClean="0"/>
+              <a:t>Second level</a:t>
+            </a:r>
+          </a:p>
+          <a:p>
+            <a:pPr lvl="2"/>
+            <a:r>
+              <a:rPr lang="en-US" smtClean="0"/>
+              <a:t>Third level</a:t>
+            </a:r>
+          </a:p>
+          <a:p>
+            <a:pPr lvl="3"/>
+            <a:r>
+              <a:rPr lang="en-US" smtClean="0"/>
+              <a:t>Fourth level</a:t>
+            </a:r>
+          </a:p>
+          <a:p>
+            <a:pPr lvl="4"/>
+            <a:r>
+              <a:rPr lang="en-US" smtClean="0"/>
+              <a:t>Fifth level</a:t>
+            </a:r>
+            <a:endParaRPr lang="en-US"/>
+          </a:p>
+        </p:txBody>
+      </p:sp>
+      <p:sp>
+        <p:nvSpPr>
+          <p:cNvPr id="6" name="Footer Placeholder 5"/>
+          <p:cNvSpPr>
+            <a:spLocks noGrp="1"/>
+          </p:cNvSpPr>
+          <p:nvPr>
+            <p:ph type="ftr" sz="quarter" idx="4"/>
+          </p:nvPr>
+        </p:nvSpPr>
+        <p:spPr>
+          <a:xfrm>
+            <a:off x="0" y="8685213"/>
+            <a:ext cx="2971800" cy="458787"/>
+          </a:xfrm>
+          <a:prstGeom prst="rect">
+            <a:avLst/>
+          </a:prstGeom>
+        </p:spPr>
+        <p:txBody>
+          <a:bodyPr vert="horz" lIns="91440" tIns="45720" rIns="91440" bIns="45720" rtlCol="0" anchor="b"/>
+          <a:lstStyle>
+            <a:lvl1pPr algn="l">
+              <a:defRPr sz="1200"/>
+            </a:lvl1pPr>
+          </a:lstStyle>
+          <a:p>
+            <a:endParaRPr lang="en-US"/>
+          </a:p>
+        </p:txBody>
+      </p:sp>
+      <p:sp>
+        <p:nvSpPr>
+          <p:cNvPr id="7" name="Slide Number Placeholder 6"/>
+          <p:cNvSpPr>
+            <a:spLocks noGrp="1"/>
+          </p:cNvSpPr>
+          <p:nvPr>
+            <p:ph type="sldNum" sz="quarter" idx="5"/>
+          </p:nvPr>
+        </p:nvSpPr>
+        <p:spPr>
+          <a:xfrm>
+            <a:off x="3884613" y="8685213"/>
+            <a:ext cx="2971800" cy="458787"/>
+          </a:xfrm>
+          <a:prstGeom prst="rect">
+            <a:avLst/>
+          </a:prstGeom>
+        </p:spPr>
+        <p:txBody>
+          <a:bodyPr vert="horz" lIns="91440" tIns="45720" rIns="91440" bIns="45720" rtlCol="0" anchor="b"/>
+          <a:lstStyle>
+            <a:lvl1pPr algn="r">
+              <a:defRPr sz="1200"/>
+            </a:lvl1pPr>
+          </a:lstStyle>
+          <a:p>
+            <a:fld id="{25DC9172-DF7D-482D-92E9-C9A2419437BA}" type="slidenum">
+              <a:rPr lang="en-US" smtClean="0"/>
+              <a:t>‹#›</a:t>
+            </a:fld>
+            <a:endParaRPr lang="en-US"/>
+          </a:p>
+        </p:txBody>
+      </p:sp>
+    </p:spTree>
+    <p:extLst>
+      <p:ext uri="{BB962C8B-B14F-4D97-AF65-F5344CB8AC3E}">
+        <p14:creationId xmlns:p14="http://schemas.microsoft.com/office/powerpoint/2010/main" val="4238966841"/>
+      </p:ext>
+    </p:extLst>
+  </p:cSld>
+  <p:clrMap bg1="lt1" tx1="dk1" bg2="lt2" tx2="dk2" accent1="accent1" accent2="accent2" accent3="accent3" accent4="accent4" accent5="accent5" accent6="accent6" hlink="hlink" folHlink="folHlink"/>
+  <p:notesStyle>
+    <a:lvl1pPr marL="0" algn="l" defTabSz="914400" rtl="0" eaLnBrk="1" latinLnBrk="0" hangingPunct="1">
+      <a:defRPr sz="1200" kern="1200">
+        <a:solidFill>
+          <a:schemeClr val="tx1"/>
+        </a:solidFill>
+        <a:latin typeface="+mn-lt"/>
+        <a:ea typeface="+mn-ea"/>
+        <a:cs typeface="+mn-cs"/>
+      </a:defRPr>
+    </a:lvl1pPr>
+    <a:lvl2pPr marL="457200" algn="l" defTabSz="914400" rtl="0" eaLnBrk="1" latinLnBrk="0" hangingPunct="1">
+      <a:defRPr sz="1200" kern="1200">
+        <a:solidFill>
+          <a:schemeClr val="tx1"/>
+        </a:solidFill>
+        <a:latin typeface="+mn-lt"/>
+        <a:ea typeface="+mn-ea"/>
+        <a:cs typeface="+mn-cs"/>
+      </a:defRPr>
+    </a:lvl2pPr>
+    <a:lvl3pPr marL="914400" algn="l" defTabSz="914400" rtl="0" eaLnBrk="1" latinLnBrk="0" hangingPunct="1">
+      <a:defRPr sz="1200" kern="1200">
+        <a:solidFill>
+          <a:schemeClr val="tx1"/>
+        </a:solidFill>
+        <a:latin typeface="+mn-lt"/>
+        <a:ea typeface="+mn-ea"/>
+        <a:cs typeface="+mn-cs"/>
+      </a:defRPr>
+    </a:lvl3pPr>
+    <a:lvl4pPr marL="1371600" algn="l" defTabSz="914400" rtl="0" eaLnBrk="1" latinLnBrk="0" hangingPunct="1">
+      <a:defRPr sz="1200" kern="1200">
+        <a:solidFill>
+          <a:schemeClr val="tx1"/>
+        </a:solidFill>
+        <a:latin typeface="+mn-lt"/>
+        <a:ea typeface="+mn-ea"/>
+        <a:cs typeface="+mn-cs"/>
+      </a:defRPr>
+    </a:lvl4pPr>
+    <a:lvl5pPr marL="1828800" algn="l" defTabSz="914400" rtl="0" eaLnBrk="1" latinLnBrk="0" hangingPunct="1">
+      <a:defRPr sz="1200" kern="1200">
+        <a:solidFill>
+          <a:schemeClr val="tx1"/>
+        </a:solidFill>
+        <a:latin typeface="+mn-lt"/>
+        <a:ea typeface="+mn-ea"/>
+        <a:cs typeface="+mn-cs"/>
+      </a:defRPr>
+    </a:lvl5pPr>
+    <a:lvl6pPr marL="2286000" algn="l" defTabSz="914400" rtl="0" eaLnBrk="1" latinLnBrk="0" hangingPunct="1">
+      <a:defRPr sz="1200" kern="1200">
+        <a:solidFill>
+          <a:schemeClr val="tx1"/>
+        </a:solidFill>
+        <a:latin typeface="+mn-lt"/>
+        <a:ea typeface="+mn-ea"/>
+        <a:cs typeface="+mn-cs"/>
+      </a:defRPr>
+    </a:lvl6pPr>
+    <a:lvl7pPr marL="2743200" algn="l" defTabSz="914400" rtl="0" eaLnBrk="1" latinLnBrk="0" hangingPunct="1">
+      <a:defRPr sz="1200" kern="1200">
+        <a:solidFill>
+          <a:schemeClr val="tx1"/>
+        </a:solidFill>
+        <a:latin typeface="+mn-lt"/>
+        <a:ea typeface="+mn-ea"/>
+        <a:cs typeface="+mn-cs"/>
+      </a:defRPr>
+    </a:lvl7pPr>
+    <a:lvl8pPr marL="3200400" algn="l" defTabSz="914400" rtl="0" eaLnBrk="1" latinLnBrk="0" hangingPunct="1">
+      <a:defRPr sz="1200" kern="1200">
+        <a:solidFill>
+          <a:schemeClr val="tx1"/>
+        </a:solidFill>
+        <a:latin typeface="+mn-lt"/>
+        <a:ea typeface="+mn-ea"/>
+        <a:cs typeface="+mn-cs"/>
+      </a:defRPr>
+    </a:lvl8pPr>
+    <a:lvl9pPr marL="3657600" algn="l" defTabSz="914400" rtl="0" eaLnBrk="1" latinLnBrk="0" hangingPunct="1">
+      <a:defRPr sz="1200" kern="1200">
+        <a:solidFill>
+          <a:schemeClr val="tx1"/>
+        </a:solidFill>
+        <a:latin typeface="+mn-lt"/>
+        <a:ea typeface="+mn-ea"/>
+        <a:cs typeface="+mn-cs"/>
+      </a:defRPr>
+    </a:lvl9pPr>
+  </p:notesStyle>
+</p:notesMaster>
+</file>
+
+<file path=ppt/notesSlides/notesSlide1.xml><?xml version="1.0" encoding="utf-8"?>
+<p:notes xmlns:a="http://schemas.openxmlformats.org/drawingml/2006/main" xmlns:r="http://schemas.openxmlformats.org/officeDocument/2006/relationships" xmlns:p="http://schemas.openxmlformats.org/presentationml/2006/main">
+  <p:cSld>
+    <p:spTree>
+      <p:nvGrpSpPr>
+        <p:cNvPr id="1" name=""/>
+        <p:cNvGrpSpPr/>
+        <p:nvPr/>
+      </p:nvGrpSpPr>
+      <p:grpSpPr>
+        <a:xfrm>
+          <a:off x="0" y="0"/>
+          <a:ext cx="0" cy="0"/>
+          <a:chOff x="0" y="0"/>
+          <a:chExt cx="0" cy="0"/>
+        </a:xfrm>
+      </p:grpSpPr>
+      <p:sp>
+        <p:nvSpPr>
+          <p:cNvPr id="2" name="Slide Image Placeholder 1"/>
+          <p:cNvSpPr>
+            <a:spLocks noGrp="1" noRot="1" noChangeAspect="1"/>
+          </p:cNvSpPr>
+          <p:nvPr>
+            <p:ph type="sldImg"/>
+          </p:nvPr>
+        </p:nvSpPr>
+        <p:spPr/>
+      </p:sp>
+      <p:sp>
+        <p:nvSpPr>
+          <p:cNvPr id="3" name="Notes Placeholder 2"/>
+          <p:cNvSpPr>
+            <a:spLocks noGrp="1"/>
+          </p:cNvSpPr>
+          <p:nvPr>
+            <p:ph type="body" idx="1"/>
+          </p:nvPr>
+        </p:nvSpPr>
+        <p:spPr/>
+        <p:txBody>
+          <a:bodyPr/>
+          <a:lstStyle/>
+          <a:p>
+            <a:r>
+              <a:rPr lang="en-US" dirty="0" smtClean="0"/>
+              <a:t>The alternate allele for this SNP near Cold Shock Protein 1 is associated with consistently warmer climates with higher rainfall that is more variable across the season. Its strongest effects are on mean diurnal temperature range, followed by temperature annual range and temperature seasonality.</a:t>
+            </a:r>
+            <a:endParaRPr lang="en-US" dirty="0"/>
+          </a:p>
+        </p:txBody>
+      </p:sp>
+      <p:sp>
+        <p:nvSpPr>
+          <p:cNvPr id="4" name="Slide Number Placeholder 3"/>
+          <p:cNvSpPr>
+            <a:spLocks noGrp="1"/>
+          </p:cNvSpPr>
+          <p:nvPr>
+            <p:ph type="sldNum" sz="quarter" idx="10"/>
+          </p:nvPr>
+        </p:nvSpPr>
+        <p:spPr/>
+        <p:txBody>
+          <a:bodyPr/>
+          <a:lstStyle/>
+          <a:p>
+            <a:fld id="{25DC9172-DF7D-482D-92E9-C9A2419437BA}" type="slidenum">
+              <a:rPr lang="en-US" smtClean="0"/>
+              <a:t>1</a:t>
+            </a:fld>
+            <a:endParaRPr lang="en-US"/>
+          </a:p>
+        </p:txBody>
+      </p:sp>
+    </p:spTree>
+    <p:extLst>
+      <p:ext uri="{BB962C8B-B14F-4D97-AF65-F5344CB8AC3E}">
+        <p14:creationId xmlns:p14="http://schemas.microsoft.com/office/powerpoint/2010/main" val="1360056353"/>
+      </p:ext>
+    </p:extLst>
+  </p:cSld>
+  <p:clrMapOvr>
+    <a:masterClrMapping/>
+  </p:clrMapOvr>
+</p:notes>
 </file>
 
 <file path=ppt/slideLayouts/slideLayout1.xml><?xml version="1.0" encoding="utf-8"?>
@@ -238,7 +684,7 @@
           <a:p>
             <a:fld id="{C3D8989D-7557-47B7-BF73-5C0345B022EC}" type="datetimeFigureOut">
               <a:rPr lang="en-US" smtClean="0"/>
-              <a:t>2/17/2020</a:t>
+              <a:t>2/18/2020</a:t>
             </a:fld>
             <a:endParaRPr lang="en-US"/>
           </a:p>
@@ -408,7 +854,7 @@
           <a:p>
             <a:fld id="{C3D8989D-7557-47B7-BF73-5C0345B022EC}" type="datetimeFigureOut">
               <a:rPr lang="en-US" smtClean="0"/>
-              <a:t>2/17/2020</a:t>
+              <a:t>2/18/2020</a:t>
             </a:fld>
             <a:endParaRPr lang="en-US"/>
           </a:p>
@@ -588,7 +1034,7 @@
           <a:p>
             <a:fld id="{C3D8989D-7557-47B7-BF73-5C0345B022EC}" type="datetimeFigureOut">
               <a:rPr lang="en-US" smtClean="0"/>
-              <a:t>2/17/2020</a:t>
+              <a:t>2/18/2020</a:t>
             </a:fld>
             <a:endParaRPr lang="en-US"/>
           </a:p>
@@ -758,7 +1204,7 @@
           <a:p>
             <a:fld id="{C3D8989D-7557-47B7-BF73-5C0345B022EC}" type="datetimeFigureOut">
               <a:rPr lang="en-US" smtClean="0"/>
-              <a:t>2/17/2020</a:t>
+              <a:t>2/18/2020</a:t>
             </a:fld>
             <a:endParaRPr lang="en-US"/>
           </a:p>
@@ -1002,7 +1448,7 @@
           <a:p>
             <a:fld id="{C3D8989D-7557-47B7-BF73-5C0345B022EC}" type="datetimeFigureOut">
               <a:rPr lang="en-US" smtClean="0"/>
-              <a:t>2/17/2020</a:t>
+              <a:t>2/18/2020</a:t>
             </a:fld>
             <a:endParaRPr lang="en-US"/>
           </a:p>
@@ -1234,7 +1680,7 @@
           <a:p>
             <a:fld id="{C3D8989D-7557-47B7-BF73-5C0345B022EC}" type="datetimeFigureOut">
               <a:rPr lang="en-US" smtClean="0"/>
-              <a:t>2/17/2020</a:t>
+              <a:t>2/18/2020</a:t>
             </a:fld>
             <a:endParaRPr lang="en-US"/>
           </a:p>
@@ -1601,7 +2047,7 @@
           <a:p>
             <a:fld id="{C3D8989D-7557-47B7-BF73-5C0345B022EC}" type="datetimeFigureOut">
               <a:rPr lang="en-US" smtClean="0"/>
-              <a:t>2/17/2020</a:t>
+              <a:t>2/18/2020</a:t>
             </a:fld>
             <a:endParaRPr lang="en-US"/>
           </a:p>
@@ -1719,7 +2165,7 @@
           <a:p>
             <a:fld id="{C3D8989D-7557-47B7-BF73-5C0345B022EC}" type="datetimeFigureOut">
               <a:rPr lang="en-US" smtClean="0"/>
-              <a:t>2/17/2020</a:t>
+              <a:t>2/18/2020</a:t>
             </a:fld>
             <a:endParaRPr lang="en-US"/>
           </a:p>
@@ -1814,7 +2260,7 @@
           <a:p>
             <a:fld id="{C3D8989D-7557-47B7-BF73-5C0345B022EC}" type="datetimeFigureOut">
               <a:rPr lang="en-US" smtClean="0"/>
-              <a:t>2/17/2020</a:t>
+              <a:t>2/18/2020</a:t>
             </a:fld>
             <a:endParaRPr lang="en-US"/>
           </a:p>
@@ -2091,7 +2537,7 @@
           <a:p>
             <a:fld id="{C3D8989D-7557-47B7-BF73-5C0345B022EC}" type="datetimeFigureOut">
               <a:rPr lang="en-US" smtClean="0"/>
-              <a:t>2/17/2020</a:t>
+              <a:t>2/18/2020</a:t>
             </a:fld>
             <a:endParaRPr lang="en-US"/>
           </a:p>
@@ -2348,7 +2794,7 @@
           <a:p>
             <a:fld id="{C3D8989D-7557-47B7-BF73-5C0345B022EC}" type="datetimeFigureOut">
               <a:rPr lang="en-US" smtClean="0"/>
-              <a:t>2/17/2020</a:t>
+              <a:t>2/18/2020</a:t>
             </a:fld>
             <a:endParaRPr lang="en-US"/>
           </a:p>
@@ -2561,7 +3007,7 @@
           <a:p>
             <a:fld id="{C3D8989D-7557-47B7-BF73-5C0345B022EC}" type="datetimeFigureOut">
               <a:rPr lang="en-US" smtClean="0"/>
-              <a:t>2/17/2020</a:t>
+              <a:t>2/18/2020</a:t>
             </a:fld>
             <a:endParaRPr lang="en-US"/>
           </a:p>
@@ -3914,36 +4360,6 @@
           <p:nvPr/>
         </p:nvPicPr>
         <p:blipFill>
-          <a:blip r:embed="rId2" cstate="print">
-            <a:extLst>
-              <a:ext uri="{28A0092B-C50C-407E-A947-70E740481C1C}">
-                <a14:useLocalDpi xmlns:a14="http://schemas.microsoft.com/office/drawing/2010/main" val="0"/>
-              </a:ext>
-            </a:extLst>
-          </a:blip>
-          <a:stretch>
-            <a:fillRect/>
-          </a:stretch>
-        </p:blipFill>
-        <p:spPr>
-          <a:xfrm>
-            <a:off x="3136475" y="1003023"/>
-            <a:ext cx="5472032" cy="916408"/>
-          </a:xfrm>
-          <a:prstGeom prst="rect">
-            <a:avLst/>
-          </a:prstGeom>
-        </p:spPr>
-      </p:pic>
-      <p:pic>
-        <p:nvPicPr>
-          <p:cNvPr id="29" name="Picture 28"/>
-          <p:cNvPicPr>
-            <a:picLocks noChangeAspect="1"/>
-          </p:cNvPicPr>
-          <p:nvPr/>
-        </p:nvPicPr>
-        <p:blipFill>
           <a:blip r:embed="rId3" cstate="print">
             <a:extLst>
               <a:ext uri="{28A0092B-C50C-407E-A947-70E740481C1C}">
@@ -3957,710 +4373,17 @@
         </p:blipFill>
         <p:spPr>
           <a:xfrm>
-            <a:off x="30849082" y="6009974"/>
-            <a:ext cx="4535305" cy="755884"/>
+            <a:off x="3136475" y="1003023"/>
+            <a:ext cx="5472032" cy="916408"/>
           </a:xfrm>
           <a:prstGeom prst="rect">
             <a:avLst/>
           </a:prstGeom>
         </p:spPr>
       </p:pic>
-      <p:sp>
-        <p:nvSpPr>
-          <p:cNvPr id="31" name="TextBox 30"/>
-          <p:cNvSpPr txBox="1"/>
-          <p:nvPr/>
-        </p:nvSpPr>
-        <p:spPr>
-          <a:xfrm>
-            <a:off x="30849082" y="4679912"/>
-            <a:ext cx="6223178" cy="1246495"/>
-          </a:xfrm>
-          <a:prstGeom prst="rect">
-            <a:avLst/>
-          </a:prstGeom>
-          <a:noFill/>
-        </p:spPr>
-        <p:txBody>
-          <a:bodyPr wrap="none" rtlCol="0">
-            <a:spAutoFit/>
-          </a:bodyPr>
-          <a:lstStyle/>
-          <a:p>
-            <a:r>
-              <a:rPr lang="en-US" sz="2500" dirty="0" smtClean="0">
-                <a:latin typeface="Helvetica" panose="020B0604020202020204" pitchFamily="34" charset="0"/>
-                <a:cs typeface="Helvetica" panose="020B0604020202020204" pitchFamily="34" charset="0"/>
-              </a:rPr>
-              <a:t>1: University of Texas at Austin</a:t>
-            </a:r>
-          </a:p>
-          <a:p>
-            <a:r>
-              <a:rPr lang="en-US" sz="2500" dirty="0" smtClean="0">
-                <a:latin typeface="Helvetica" panose="020B0604020202020204" pitchFamily="34" charset="0"/>
-                <a:cs typeface="Helvetica" panose="020B0604020202020204" pitchFamily="34" charset="0"/>
-              </a:rPr>
-              <a:t>2: </a:t>
-            </a:r>
-            <a:r>
-              <a:rPr lang="en-US" sz="2500" dirty="0" err="1" smtClean="0">
-                <a:latin typeface="Helvetica" panose="020B0604020202020204" pitchFamily="34" charset="0"/>
-                <a:cs typeface="Helvetica" panose="020B0604020202020204" pitchFamily="34" charset="0"/>
-              </a:rPr>
-              <a:t>HudsonAlpha</a:t>
-            </a:r>
-            <a:r>
-              <a:rPr lang="en-US" sz="2500" dirty="0" smtClean="0">
-                <a:latin typeface="Helvetica" panose="020B0604020202020204" pitchFamily="34" charset="0"/>
-                <a:cs typeface="Helvetica" panose="020B0604020202020204" pitchFamily="34" charset="0"/>
-              </a:rPr>
-              <a:t> Institute of Biotechnology </a:t>
-            </a:r>
-          </a:p>
-          <a:p>
-            <a:r>
-              <a:rPr lang="en-US" sz="2500" dirty="0" smtClean="0">
-                <a:latin typeface="Helvetica" panose="020B0604020202020204" pitchFamily="34" charset="0"/>
-                <a:cs typeface="Helvetica" panose="020B0604020202020204" pitchFamily="34" charset="0"/>
-              </a:rPr>
-              <a:t>and Joint Genome Institute</a:t>
-            </a:r>
-            <a:endParaRPr lang="en-US" sz="2500" dirty="0">
-              <a:latin typeface="Helvetica" panose="020B0604020202020204" pitchFamily="34" charset="0"/>
-              <a:cs typeface="Helvetica" panose="020B0604020202020204" pitchFamily="34" charset="0"/>
-            </a:endParaRPr>
-          </a:p>
-        </p:txBody>
-      </p:sp>
-      <p:sp>
-        <p:nvSpPr>
-          <p:cNvPr id="15" name="TextBox 14"/>
-          <p:cNvSpPr txBox="1"/>
-          <p:nvPr/>
-        </p:nvSpPr>
-        <p:spPr>
-          <a:xfrm>
-            <a:off x="16263453" y="16568308"/>
-            <a:ext cx="9194604" cy="523220"/>
-          </a:xfrm>
-          <a:prstGeom prst="rect">
-            <a:avLst/>
-          </a:prstGeom>
-          <a:noFill/>
-        </p:spPr>
-        <p:txBody>
-          <a:bodyPr wrap="square" rtlCol="0">
-            <a:spAutoFit/>
-          </a:bodyPr>
-          <a:lstStyle/>
-          <a:p>
-            <a:r>
-              <a:rPr lang="en-US" sz="2800" b="1" dirty="0" smtClean="0">
-                <a:latin typeface="Helvetica" panose="020B0604020202020204" pitchFamily="34" charset="0"/>
-                <a:cs typeface="Helvetica" panose="020B0604020202020204" pitchFamily="34" charset="0"/>
-              </a:rPr>
-              <a:t>A </a:t>
-            </a:r>
-            <a:r>
-              <a:rPr lang="en-US" sz="2500" i="1" dirty="0" smtClean="0">
-                <a:latin typeface="Helvetica" panose="020B0604020202020204" pitchFamily="34" charset="0"/>
-                <a:cs typeface="Helvetica" panose="020B0604020202020204" pitchFamily="34" charset="0"/>
-              </a:rPr>
-              <a:t>Associations for BIO5, Max Temperature of Warmest Month</a:t>
-            </a:r>
-            <a:endParaRPr lang="en-US" sz="2500" i="1" dirty="0">
-              <a:latin typeface="Helvetica" panose="020B0604020202020204" pitchFamily="34" charset="0"/>
-              <a:cs typeface="Helvetica" panose="020B0604020202020204" pitchFamily="34" charset="0"/>
-            </a:endParaRPr>
-          </a:p>
-        </p:txBody>
-      </p:sp>
-      <p:sp>
-        <p:nvSpPr>
-          <p:cNvPr id="32" name="TextBox 31"/>
-          <p:cNvSpPr txBox="1"/>
-          <p:nvPr/>
-        </p:nvSpPr>
-        <p:spPr>
-          <a:xfrm>
-            <a:off x="30849082" y="6853550"/>
-            <a:ext cx="6870022" cy="3939540"/>
-          </a:xfrm>
-          <a:prstGeom prst="rect">
-            <a:avLst/>
-          </a:prstGeom>
-          <a:noFill/>
-        </p:spPr>
-        <p:txBody>
-          <a:bodyPr wrap="none" rtlCol="0">
-            <a:spAutoFit/>
-          </a:bodyPr>
-          <a:lstStyle/>
-          <a:p>
-            <a:r>
-              <a:rPr lang="en-US" sz="2500" dirty="0" smtClean="0">
-                <a:latin typeface="Helvetica" panose="020B0604020202020204" pitchFamily="34" charset="0"/>
-                <a:cs typeface="Helvetica" panose="020B0604020202020204" pitchFamily="34" charset="0"/>
-              </a:rPr>
-              <a:t>*Presenting Author</a:t>
-            </a:r>
-          </a:p>
-          <a:p>
-            <a:r>
-              <a:rPr lang="en-US" sz="2500" dirty="0" smtClean="0">
-                <a:latin typeface="Helvetica" panose="020B0604020202020204" pitchFamily="34" charset="0"/>
-                <a:cs typeface="Helvetica" panose="020B0604020202020204" pitchFamily="34" charset="0"/>
-              </a:rPr>
-              <a:t>**Switchgrass genomics team members: </a:t>
-            </a:r>
-          </a:p>
-          <a:p>
-            <a:r>
-              <a:rPr lang="en-US" sz="2500" dirty="0" smtClean="0">
-                <a:latin typeface="Helvetica" panose="020B0604020202020204" pitchFamily="34" charset="0"/>
-                <a:cs typeface="Helvetica" panose="020B0604020202020204" pitchFamily="34" charset="0"/>
-              </a:rPr>
-              <a:t>Jerry Jenkins, Chris </a:t>
-            </a:r>
-            <a:r>
-              <a:rPr lang="en-US" sz="2500" dirty="0" err="1" smtClean="0">
-                <a:latin typeface="Helvetica" panose="020B0604020202020204" pitchFamily="34" charset="0"/>
-                <a:cs typeface="Helvetica" panose="020B0604020202020204" pitchFamily="34" charset="0"/>
-              </a:rPr>
-              <a:t>Plott</a:t>
-            </a:r>
-            <a:r>
-              <a:rPr lang="en-US" sz="2500" dirty="0" smtClean="0">
-                <a:latin typeface="Helvetica" panose="020B0604020202020204" pitchFamily="34" charset="0"/>
-                <a:cs typeface="Helvetica" panose="020B0604020202020204" pitchFamily="34" charset="0"/>
-              </a:rPr>
-              <a:t>, </a:t>
-            </a:r>
-            <a:r>
-              <a:rPr lang="en-US" sz="2500" dirty="0" err="1" smtClean="0">
-                <a:latin typeface="Helvetica" panose="020B0604020202020204" pitchFamily="34" charset="0"/>
-                <a:cs typeface="Helvetica" panose="020B0604020202020204" pitchFamily="34" charset="0"/>
-              </a:rPr>
-              <a:t>Shengqiang</a:t>
-            </a:r>
-            <a:r>
-              <a:rPr lang="en-US" sz="2500" dirty="0" smtClean="0">
-                <a:latin typeface="Helvetica" panose="020B0604020202020204" pitchFamily="34" charset="0"/>
-                <a:cs typeface="Helvetica" panose="020B0604020202020204" pitchFamily="34" charset="0"/>
-              </a:rPr>
-              <a:t> Shu, </a:t>
-            </a:r>
-          </a:p>
-          <a:p>
-            <a:r>
-              <a:rPr lang="en-US" sz="2500" dirty="0" err="1" smtClean="0">
-                <a:latin typeface="Helvetica" panose="020B0604020202020204" pitchFamily="34" charset="0"/>
-                <a:cs typeface="Helvetica" panose="020B0604020202020204" pitchFamily="34" charset="0"/>
-              </a:rPr>
-              <a:t>Avinash</a:t>
-            </a:r>
-            <a:r>
-              <a:rPr lang="en-US" sz="2500" dirty="0" smtClean="0">
-                <a:latin typeface="Helvetica" panose="020B0604020202020204" pitchFamily="34" charset="0"/>
-                <a:cs typeface="Helvetica" panose="020B0604020202020204" pitchFamily="34" charset="0"/>
-              </a:rPr>
-              <a:t> </a:t>
-            </a:r>
-            <a:r>
-              <a:rPr lang="en-US" sz="2500" dirty="0" err="1" smtClean="0">
-                <a:latin typeface="Helvetica" panose="020B0604020202020204" pitchFamily="34" charset="0"/>
-                <a:cs typeface="Helvetica" panose="020B0604020202020204" pitchFamily="34" charset="0"/>
-              </a:rPr>
-              <a:t>Sreedasyam</a:t>
-            </a:r>
-            <a:r>
-              <a:rPr lang="en-US" sz="2500" dirty="0" smtClean="0">
-                <a:latin typeface="Helvetica" panose="020B0604020202020204" pitchFamily="34" charset="0"/>
-                <a:cs typeface="Helvetica" panose="020B0604020202020204" pitchFamily="34" charset="0"/>
-              </a:rPr>
-              <a:t>, Adam Healey, Li Zhang, </a:t>
-            </a:r>
-          </a:p>
-          <a:p>
-            <a:r>
-              <a:rPr lang="en-US" sz="2500" dirty="0" smtClean="0">
-                <a:latin typeface="Helvetica" panose="020B0604020202020204" pitchFamily="34" charset="0"/>
-                <a:cs typeface="Helvetica" panose="020B0604020202020204" pitchFamily="34" charset="0"/>
-              </a:rPr>
-              <a:t>Taslima </a:t>
-            </a:r>
-            <a:r>
-              <a:rPr lang="en-US" sz="2500" dirty="0" err="1" smtClean="0">
-                <a:latin typeface="Helvetica" panose="020B0604020202020204" pitchFamily="34" charset="0"/>
-                <a:cs typeface="Helvetica" panose="020B0604020202020204" pitchFamily="34" charset="0"/>
-              </a:rPr>
-              <a:t>Haque</a:t>
-            </a:r>
-            <a:r>
-              <a:rPr lang="en-US" sz="2500" dirty="0" smtClean="0">
-                <a:latin typeface="Helvetica" panose="020B0604020202020204" pitchFamily="34" charset="0"/>
-                <a:cs typeface="Helvetica" panose="020B0604020202020204" pitchFamily="34" charset="0"/>
-              </a:rPr>
-              <a:t>, Joe Napier, Adam Session, </a:t>
-            </a:r>
-          </a:p>
-          <a:p>
-            <a:r>
-              <a:rPr lang="en-US" sz="2500" dirty="0" smtClean="0">
-                <a:latin typeface="Helvetica" panose="020B0604020202020204" pitchFamily="34" charset="0"/>
-                <a:cs typeface="Helvetica" panose="020B0604020202020204" pitchFamily="34" charset="0"/>
-              </a:rPr>
-              <a:t>Michael </a:t>
-            </a:r>
-            <a:r>
-              <a:rPr lang="en-US" sz="2500" dirty="0" err="1" smtClean="0">
-                <a:latin typeface="Helvetica" panose="020B0604020202020204" pitchFamily="34" charset="0"/>
-                <a:cs typeface="Helvetica" panose="020B0604020202020204" pitchFamily="34" charset="0"/>
-              </a:rPr>
-              <a:t>Udvardi</a:t>
-            </a:r>
-            <a:r>
-              <a:rPr lang="en-US" sz="2500" dirty="0" smtClean="0">
-                <a:latin typeface="Helvetica" panose="020B0604020202020204" pitchFamily="34" charset="0"/>
-                <a:cs typeface="Helvetica" panose="020B0604020202020204" pitchFamily="34" charset="0"/>
-              </a:rPr>
-              <a:t>, Malay </a:t>
-            </a:r>
-            <a:r>
-              <a:rPr lang="en-US" sz="2500" dirty="0" err="1" smtClean="0">
-                <a:latin typeface="Helvetica" panose="020B0604020202020204" pitchFamily="34" charset="0"/>
-                <a:cs typeface="Helvetica" panose="020B0604020202020204" pitchFamily="34" charset="0"/>
-              </a:rPr>
-              <a:t>Saha</a:t>
-            </a:r>
-            <a:r>
-              <a:rPr lang="en-US" sz="2500" dirty="0" smtClean="0">
-                <a:latin typeface="Helvetica" panose="020B0604020202020204" pitchFamily="34" charset="0"/>
-                <a:cs typeface="Helvetica" panose="020B0604020202020204" pitchFamily="34" charset="0"/>
-              </a:rPr>
-              <a:t>, </a:t>
-            </a:r>
-            <a:r>
-              <a:rPr lang="en-US" sz="2500" dirty="0" err="1" smtClean="0">
-                <a:latin typeface="Helvetica" panose="020B0604020202020204" pitchFamily="34" charset="0"/>
-                <a:cs typeface="Helvetica" panose="020B0604020202020204" pitchFamily="34" charset="0"/>
-              </a:rPr>
-              <a:t>Yuhong</a:t>
-            </a:r>
-            <a:r>
-              <a:rPr lang="en-US" sz="2500" dirty="0" smtClean="0">
-                <a:latin typeface="Helvetica" panose="020B0604020202020204" pitchFamily="34" charset="0"/>
-                <a:cs typeface="Helvetica" panose="020B0604020202020204" pitchFamily="34" charset="0"/>
-              </a:rPr>
-              <a:t> Tang, </a:t>
-            </a:r>
-          </a:p>
-          <a:p>
-            <a:r>
-              <a:rPr lang="en-US" sz="2500" dirty="0" smtClean="0">
-                <a:latin typeface="Helvetica" panose="020B0604020202020204" pitchFamily="34" charset="0"/>
-                <a:cs typeface="Helvetica" panose="020B0604020202020204" pitchFamily="34" charset="0"/>
-              </a:rPr>
-              <a:t>Laura Bartley, </a:t>
-            </a:r>
-            <a:r>
-              <a:rPr lang="en-US" sz="2500" dirty="0" err="1" smtClean="0">
-                <a:latin typeface="Helvetica" panose="020B0604020202020204" pitchFamily="34" charset="0"/>
-                <a:cs typeface="Helvetica" panose="020B0604020202020204" pitchFamily="34" charset="0"/>
-              </a:rPr>
-              <a:t>Katrien</a:t>
-            </a:r>
-            <a:r>
-              <a:rPr lang="en-US" sz="2500" dirty="0" smtClean="0">
-                <a:latin typeface="Helvetica" panose="020B0604020202020204" pitchFamily="34" charset="0"/>
-                <a:cs typeface="Helvetica" panose="020B0604020202020204" pitchFamily="34" charset="0"/>
-              </a:rPr>
-              <a:t> </a:t>
-            </a:r>
-            <a:r>
-              <a:rPr lang="en-US" sz="2500" dirty="0" err="1" smtClean="0">
-                <a:latin typeface="Helvetica" panose="020B0604020202020204" pitchFamily="34" charset="0"/>
-                <a:cs typeface="Helvetica" panose="020B0604020202020204" pitchFamily="34" charset="0"/>
-              </a:rPr>
-              <a:t>Devos</a:t>
-            </a:r>
-            <a:r>
-              <a:rPr lang="en-US" sz="2500" dirty="0" smtClean="0">
-                <a:latin typeface="Helvetica" panose="020B0604020202020204" pitchFamily="34" charset="0"/>
-                <a:cs typeface="Helvetica" panose="020B0604020202020204" pitchFamily="34" charset="0"/>
-              </a:rPr>
-              <a:t>, Michael </a:t>
-            </a:r>
-            <a:r>
-              <a:rPr lang="en-US" sz="2500" dirty="0" err="1" smtClean="0">
-                <a:latin typeface="Helvetica" panose="020B0604020202020204" pitchFamily="34" charset="0"/>
-                <a:cs typeface="Helvetica" panose="020B0604020202020204" pitchFamily="34" charset="0"/>
-              </a:rPr>
-              <a:t>Casler</a:t>
-            </a:r>
-            <a:r>
-              <a:rPr lang="en-US" sz="2500" dirty="0" smtClean="0">
-                <a:latin typeface="Helvetica" panose="020B0604020202020204" pitchFamily="34" charset="0"/>
-                <a:cs typeface="Helvetica" panose="020B0604020202020204" pitchFamily="34" charset="0"/>
-              </a:rPr>
-              <a:t>, </a:t>
-            </a:r>
-          </a:p>
-          <a:p>
-            <a:r>
-              <a:rPr lang="en-US" sz="2500" dirty="0" err="1" smtClean="0">
-                <a:latin typeface="Helvetica" panose="020B0604020202020204" pitchFamily="34" charset="0"/>
-                <a:cs typeface="Helvetica" panose="020B0604020202020204" pitchFamily="34" charset="0"/>
-              </a:rPr>
-              <a:t>Jiming</a:t>
-            </a:r>
-            <a:r>
-              <a:rPr lang="en-US" sz="2500" dirty="0" smtClean="0">
-                <a:latin typeface="Helvetica" panose="020B0604020202020204" pitchFamily="34" charset="0"/>
-                <a:cs typeface="Helvetica" panose="020B0604020202020204" pitchFamily="34" charset="0"/>
-              </a:rPr>
-              <a:t> Jiang, David Lowry, </a:t>
-            </a:r>
-            <a:r>
-              <a:rPr lang="en-US" sz="2500" dirty="0" err="1" smtClean="0">
-                <a:latin typeface="Helvetica" panose="020B0604020202020204" pitchFamily="34" charset="0"/>
-                <a:cs typeface="Helvetica" panose="020B0604020202020204" pitchFamily="34" charset="0"/>
-              </a:rPr>
-              <a:t>Guohong</a:t>
-            </a:r>
-            <a:r>
-              <a:rPr lang="en-US" sz="2500" dirty="0" smtClean="0">
-                <a:latin typeface="Helvetica" panose="020B0604020202020204" pitchFamily="34" charset="0"/>
-                <a:cs typeface="Helvetica" panose="020B0604020202020204" pitchFamily="34" charset="0"/>
-              </a:rPr>
-              <a:t> Wu, </a:t>
-            </a:r>
-          </a:p>
-          <a:p>
-            <a:r>
-              <a:rPr lang="en-US" sz="2500" dirty="0" smtClean="0">
-                <a:latin typeface="Helvetica" panose="020B0604020202020204" pitchFamily="34" charset="0"/>
-                <a:cs typeface="Helvetica" panose="020B0604020202020204" pitchFamily="34" charset="0"/>
-              </a:rPr>
-              <a:t>David </a:t>
-            </a:r>
-            <a:r>
-              <a:rPr lang="en-US" sz="2500" dirty="0" err="1" smtClean="0">
-                <a:latin typeface="Helvetica" panose="020B0604020202020204" pitchFamily="34" charset="0"/>
-                <a:cs typeface="Helvetica" panose="020B0604020202020204" pitchFamily="34" charset="0"/>
-              </a:rPr>
-              <a:t>Kudma</a:t>
-            </a:r>
-            <a:r>
-              <a:rPr lang="en-US" sz="2500" dirty="0" smtClean="0">
-                <a:latin typeface="Helvetica" panose="020B0604020202020204" pitchFamily="34" charset="0"/>
-                <a:cs typeface="Helvetica" panose="020B0604020202020204" pitchFamily="34" charset="0"/>
-              </a:rPr>
-              <a:t>, Kerrie Barry, Jane </a:t>
-            </a:r>
-            <a:r>
-              <a:rPr lang="en-US" sz="2500" dirty="0" err="1" smtClean="0">
-                <a:latin typeface="Helvetica" panose="020B0604020202020204" pitchFamily="34" charset="0"/>
-                <a:cs typeface="Helvetica" panose="020B0604020202020204" pitchFamily="34" charset="0"/>
-              </a:rPr>
-              <a:t>Grimwood</a:t>
-            </a:r>
-            <a:r>
-              <a:rPr lang="en-US" sz="2500" dirty="0" smtClean="0">
-                <a:latin typeface="Helvetica" panose="020B0604020202020204" pitchFamily="34" charset="0"/>
-                <a:cs typeface="Helvetica" panose="020B0604020202020204" pitchFamily="34" charset="0"/>
-              </a:rPr>
-              <a:t>, </a:t>
-            </a:r>
-          </a:p>
-          <a:p>
-            <a:r>
-              <a:rPr lang="en-US" sz="2500" dirty="0" smtClean="0">
-                <a:latin typeface="Helvetica" panose="020B0604020202020204" pitchFamily="34" charset="0"/>
-                <a:cs typeface="Helvetica" panose="020B0604020202020204" pitchFamily="34" charset="0"/>
-              </a:rPr>
-              <a:t>Dan </a:t>
-            </a:r>
-            <a:r>
-              <a:rPr lang="en-US" sz="2500" dirty="0" err="1" smtClean="0">
-                <a:latin typeface="Helvetica" panose="020B0604020202020204" pitchFamily="34" charset="0"/>
-                <a:cs typeface="Helvetica" panose="020B0604020202020204" pitchFamily="34" charset="0"/>
-              </a:rPr>
-              <a:t>Rohksar</a:t>
-            </a:r>
-            <a:endParaRPr lang="en-US" sz="2500" dirty="0">
-              <a:latin typeface="Helvetica" panose="020B0604020202020204" pitchFamily="34" charset="0"/>
-              <a:cs typeface="Helvetica" panose="020B0604020202020204" pitchFamily="34" charset="0"/>
-            </a:endParaRPr>
-          </a:p>
-        </p:txBody>
-      </p:sp>
-      <p:sp>
-        <p:nvSpPr>
-          <p:cNvPr id="36" name="TextBox 35"/>
-          <p:cNvSpPr txBox="1"/>
-          <p:nvPr/>
-        </p:nvSpPr>
-        <p:spPr>
-          <a:xfrm>
-            <a:off x="21073965" y="4927831"/>
-            <a:ext cx="4046301" cy="738664"/>
-          </a:xfrm>
-          <a:prstGeom prst="rect">
-            <a:avLst/>
-          </a:prstGeom>
-          <a:noFill/>
-        </p:spPr>
-        <p:txBody>
-          <a:bodyPr wrap="none" rtlCol="0">
-            <a:spAutoFit/>
-          </a:bodyPr>
-          <a:lstStyle/>
-          <a:p>
-            <a:r>
-              <a:rPr lang="en-US" sz="4200" b="1" dirty="0" smtClean="0">
-                <a:solidFill>
-                  <a:srgbClr val="262B70"/>
-                </a:solidFill>
-                <a:latin typeface="Helvetica" panose="020B0604020202020204" pitchFamily="34" charset="0"/>
-                <a:cs typeface="Helvetica" panose="020B0604020202020204" pitchFamily="34" charset="0"/>
-              </a:rPr>
-              <a:t>Diversity Panel</a:t>
-            </a:r>
-            <a:endParaRPr lang="en-US" sz="4200" b="1" dirty="0">
-              <a:solidFill>
-                <a:srgbClr val="262B70"/>
-              </a:solidFill>
-              <a:latin typeface="Helvetica" panose="020B0604020202020204" pitchFamily="34" charset="0"/>
-              <a:cs typeface="Helvetica" panose="020B0604020202020204" pitchFamily="34" charset="0"/>
-            </a:endParaRPr>
-          </a:p>
-        </p:txBody>
-      </p:sp>
-      <p:sp>
-        <p:nvSpPr>
-          <p:cNvPr id="37" name="TextBox 36"/>
-          <p:cNvSpPr txBox="1"/>
-          <p:nvPr/>
-        </p:nvSpPr>
-        <p:spPr>
-          <a:xfrm>
-            <a:off x="16263453" y="11169893"/>
-            <a:ext cx="21005366" cy="738664"/>
-          </a:xfrm>
-          <a:prstGeom prst="rect">
-            <a:avLst/>
-          </a:prstGeom>
-          <a:noFill/>
-        </p:spPr>
-        <p:txBody>
-          <a:bodyPr wrap="none" rtlCol="0">
-            <a:spAutoFit/>
-          </a:bodyPr>
-          <a:lstStyle/>
-          <a:p>
-            <a:r>
-              <a:rPr lang="en-US" sz="4200" b="1" dirty="0" smtClean="0">
-                <a:solidFill>
-                  <a:srgbClr val="262B70"/>
-                </a:solidFill>
-                <a:latin typeface="Helvetica" panose="020B0604020202020204" pitchFamily="34" charset="0"/>
-                <a:cs typeface="Helvetica" panose="020B0604020202020204" pitchFamily="34" charset="0"/>
-              </a:rPr>
-              <a:t>Genome-Wide Association Studies for Environments at Plant Locations of Origin </a:t>
-            </a:r>
-            <a:endParaRPr lang="en-US" sz="4200" b="1" dirty="0">
-              <a:solidFill>
-                <a:srgbClr val="262B70"/>
-              </a:solidFill>
-              <a:latin typeface="Helvetica" panose="020B0604020202020204" pitchFamily="34" charset="0"/>
-              <a:cs typeface="Helvetica" panose="020B0604020202020204" pitchFamily="34" charset="0"/>
-            </a:endParaRPr>
-          </a:p>
-        </p:txBody>
-      </p:sp>
-      <p:sp>
-        <p:nvSpPr>
-          <p:cNvPr id="38" name="TextBox 37"/>
-          <p:cNvSpPr txBox="1"/>
-          <p:nvPr/>
-        </p:nvSpPr>
-        <p:spPr>
-          <a:xfrm>
-            <a:off x="1454288" y="11169893"/>
-            <a:ext cx="13685991" cy="738664"/>
-          </a:xfrm>
-          <a:prstGeom prst="rect">
-            <a:avLst/>
-          </a:prstGeom>
-          <a:noFill/>
-        </p:spPr>
-        <p:txBody>
-          <a:bodyPr wrap="none" rtlCol="0">
-            <a:spAutoFit/>
-          </a:bodyPr>
-          <a:lstStyle/>
-          <a:p>
-            <a:r>
-              <a:rPr lang="en-US" sz="4200" b="1" dirty="0" smtClean="0">
-                <a:solidFill>
-                  <a:srgbClr val="262B70"/>
-                </a:solidFill>
-                <a:latin typeface="Helvetica" panose="020B0604020202020204" pitchFamily="34" charset="0"/>
-                <a:cs typeface="Helvetica" panose="020B0604020202020204" pitchFamily="34" charset="0"/>
-              </a:rPr>
-              <a:t>Continent-Scale Adaptation Using Common Gardens</a:t>
-            </a:r>
-            <a:endParaRPr lang="en-US" sz="4200" b="1" dirty="0">
-              <a:solidFill>
-                <a:srgbClr val="262B70"/>
-              </a:solidFill>
-              <a:latin typeface="Helvetica" panose="020B0604020202020204" pitchFamily="34" charset="0"/>
-              <a:cs typeface="Helvetica" panose="020B0604020202020204" pitchFamily="34" charset="0"/>
-            </a:endParaRPr>
-          </a:p>
-        </p:txBody>
-      </p:sp>
-      <p:sp>
-        <p:nvSpPr>
-          <p:cNvPr id="39" name="TextBox 38"/>
-          <p:cNvSpPr txBox="1"/>
-          <p:nvPr/>
-        </p:nvSpPr>
-        <p:spPr>
-          <a:xfrm>
-            <a:off x="10572940" y="18500964"/>
-            <a:ext cx="19522588" cy="738664"/>
-          </a:xfrm>
-          <a:prstGeom prst="rect">
-            <a:avLst/>
-          </a:prstGeom>
-          <a:noFill/>
-        </p:spPr>
-        <p:txBody>
-          <a:bodyPr wrap="none" rtlCol="0">
-            <a:spAutoFit/>
-          </a:bodyPr>
-          <a:lstStyle/>
-          <a:p>
-            <a:r>
-              <a:rPr lang="en-US" sz="4200" b="1" dirty="0" smtClean="0">
-                <a:solidFill>
-                  <a:srgbClr val="262B70"/>
-                </a:solidFill>
-                <a:latin typeface="Helvetica" panose="020B0604020202020204" pitchFamily="34" charset="0"/>
-                <a:cs typeface="Helvetica" panose="020B0604020202020204" pitchFamily="34" charset="0"/>
-              </a:rPr>
-              <a:t>Genome-Wide Association Studies for Traits Involved in Climate Adaptation</a:t>
-            </a:r>
-            <a:endParaRPr lang="en-US" sz="4200" b="1" dirty="0">
-              <a:solidFill>
-                <a:srgbClr val="262B70"/>
-              </a:solidFill>
-              <a:latin typeface="Helvetica" panose="020B0604020202020204" pitchFamily="34" charset="0"/>
-              <a:cs typeface="Helvetica" panose="020B0604020202020204" pitchFamily="34" charset="0"/>
-            </a:endParaRPr>
-          </a:p>
-        </p:txBody>
-      </p:sp>
-      <p:sp>
-        <p:nvSpPr>
-          <p:cNvPr id="40" name="TextBox 39"/>
-          <p:cNvSpPr txBox="1"/>
-          <p:nvPr/>
-        </p:nvSpPr>
-        <p:spPr>
-          <a:xfrm>
-            <a:off x="31755129" y="26135708"/>
-            <a:ext cx="2190023" cy="738664"/>
-          </a:xfrm>
-          <a:prstGeom prst="rect">
-            <a:avLst/>
-          </a:prstGeom>
-          <a:noFill/>
-        </p:spPr>
-        <p:txBody>
-          <a:bodyPr wrap="none" rtlCol="0">
-            <a:spAutoFit/>
-          </a:bodyPr>
-          <a:lstStyle/>
-          <a:p>
-            <a:r>
-              <a:rPr lang="en-US" sz="4200" b="1" dirty="0" smtClean="0">
-                <a:solidFill>
-                  <a:srgbClr val="262B70"/>
-                </a:solidFill>
-                <a:latin typeface="Helvetica" panose="020B0604020202020204" pitchFamily="34" charset="0"/>
-                <a:cs typeface="Helvetica" panose="020B0604020202020204" pitchFamily="34" charset="0"/>
-              </a:rPr>
-              <a:t>Contact</a:t>
-            </a:r>
-            <a:endParaRPr lang="en-US" sz="4200" b="1" dirty="0">
-              <a:solidFill>
-                <a:srgbClr val="262B70"/>
-              </a:solidFill>
-              <a:latin typeface="Helvetica" panose="020B0604020202020204" pitchFamily="34" charset="0"/>
-              <a:cs typeface="Helvetica" panose="020B0604020202020204" pitchFamily="34" charset="0"/>
-            </a:endParaRPr>
-          </a:p>
-        </p:txBody>
-      </p:sp>
-      <p:sp>
-        <p:nvSpPr>
-          <p:cNvPr id="41" name="TextBox 40"/>
-          <p:cNvSpPr txBox="1"/>
-          <p:nvPr/>
-        </p:nvSpPr>
-        <p:spPr>
-          <a:xfrm>
-            <a:off x="19188448" y="26135708"/>
-            <a:ext cx="7817333" cy="738664"/>
-          </a:xfrm>
-          <a:prstGeom prst="rect">
-            <a:avLst/>
-          </a:prstGeom>
-          <a:noFill/>
-        </p:spPr>
-        <p:txBody>
-          <a:bodyPr wrap="none" rtlCol="0">
-            <a:spAutoFit/>
-          </a:bodyPr>
-          <a:lstStyle/>
-          <a:p>
-            <a:r>
-              <a:rPr lang="en-US" sz="4200" b="1" dirty="0" err="1" smtClean="0">
-                <a:solidFill>
-                  <a:srgbClr val="262B70"/>
-                </a:solidFill>
-                <a:latin typeface="Helvetica" panose="020B0604020202020204" pitchFamily="34" charset="0"/>
-                <a:cs typeface="Helvetica" panose="020B0604020202020204" pitchFamily="34" charset="0"/>
-              </a:rPr>
-              <a:t>switchgrassGWAS</a:t>
-            </a:r>
-            <a:r>
-              <a:rPr lang="en-US" sz="4200" b="1" dirty="0" smtClean="0">
-                <a:solidFill>
-                  <a:srgbClr val="262B70"/>
-                </a:solidFill>
-                <a:latin typeface="Helvetica" panose="020B0604020202020204" pitchFamily="34" charset="0"/>
-                <a:cs typeface="Helvetica" panose="020B0604020202020204" pitchFamily="34" charset="0"/>
-              </a:rPr>
-              <a:t> R Package</a:t>
-            </a:r>
-            <a:endParaRPr lang="en-US" sz="4200" b="1" dirty="0">
-              <a:solidFill>
-                <a:srgbClr val="262B70"/>
-              </a:solidFill>
-              <a:latin typeface="Helvetica" panose="020B0604020202020204" pitchFamily="34" charset="0"/>
-              <a:cs typeface="Helvetica" panose="020B0604020202020204" pitchFamily="34" charset="0"/>
-            </a:endParaRPr>
-          </a:p>
-        </p:txBody>
-      </p:sp>
       <p:pic>
         <p:nvPicPr>
-          <p:cNvPr id="44" name="Picture 43"/>
+          <p:cNvPr id="29" name="Picture 28"/>
           <p:cNvPicPr>
             <a:picLocks noChangeAspect="1"/>
           </p:cNvPicPr>
@@ -4680,8 +4403,8 @@
         </p:blipFill>
         <p:spPr>
           <a:xfrm>
-            <a:off x="27853971" y="29331491"/>
-            <a:ext cx="9992126" cy="2716105"/>
+            <a:off x="30849082" y="6009974"/>
+            <a:ext cx="4535305" cy="755884"/>
           </a:xfrm>
           <a:prstGeom prst="rect">
             <a:avLst/>
@@ -4690,14 +4413,14 @@
       </p:pic>
       <p:sp>
         <p:nvSpPr>
-          <p:cNvPr id="45" name="TextBox 44"/>
+          <p:cNvPr id="31" name="TextBox 30"/>
           <p:cNvSpPr txBox="1"/>
           <p:nvPr/>
         </p:nvSpPr>
         <p:spPr>
           <a:xfrm>
-            <a:off x="28495423" y="27064872"/>
-            <a:ext cx="8709436" cy="1569660"/>
+            <a:off x="30849082" y="4679912"/>
+            <a:ext cx="6223178" cy="1246495"/>
           </a:xfrm>
           <a:prstGeom prst="rect">
             <a:avLst/>
@@ -4710,284 +4433,62 @@
           </a:bodyPr>
           <a:lstStyle/>
           <a:p>
-            <a:pPr algn="ctr"/>
-            <a:r>
-              <a:rPr lang="en-US" sz="3200" dirty="0" smtClean="0">
-                <a:latin typeface="Helvetica" panose="020B0604020202020204" pitchFamily="34" charset="0"/>
-                <a:cs typeface="Helvetica" panose="020B0604020202020204" pitchFamily="34" charset="0"/>
-              </a:rPr>
-              <a:t>Alice MacQueen: alice.macqueen@utexas.edu</a:t>
-            </a:r>
-          </a:p>
-          <a:p>
-            <a:pPr algn="ctr"/>
-            <a:endParaRPr lang="en-US" sz="3200" dirty="0" smtClean="0">
+            <a:r>
+              <a:rPr lang="en-US" sz="2500" dirty="0" smtClean="0">
+                <a:latin typeface="Helvetica" panose="020B0604020202020204" pitchFamily="34" charset="0"/>
+                <a:cs typeface="Helvetica" panose="020B0604020202020204" pitchFamily="34" charset="0"/>
+              </a:rPr>
+              <a:t>1: University of Texas at Austin</a:t>
+            </a:r>
+          </a:p>
+          <a:p>
+            <a:r>
+              <a:rPr lang="en-US" sz="2500" dirty="0" smtClean="0">
+                <a:latin typeface="Helvetica" panose="020B0604020202020204" pitchFamily="34" charset="0"/>
+                <a:cs typeface="Helvetica" panose="020B0604020202020204" pitchFamily="34" charset="0"/>
+              </a:rPr>
+              <a:t>2: </a:t>
+            </a:r>
+            <a:r>
+              <a:rPr lang="en-US" sz="2500" dirty="0" err="1" smtClean="0">
+                <a:latin typeface="Helvetica" panose="020B0604020202020204" pitchFamily="34" charset="0"/>
+                <a:cs typeface="Helvetica" panose="020B0604020202020204" pitchFamily="34" charset="0"/>
+              </a:rPr>
+              <a:t>HudsonAlpha</a:t>
+            </a:r>
+            <a:r>
+              <a:rPr lang="en-US" sz="2500" dirty="0" smtClean="0">
+                <a:latin typeface="Helvetica" panose="020B0604020202020204" pitchFamily="34" charset="0"/>
+                <a:cs typeface="Helvetica" panose="020B0604020202020204" pitchFamily="34" charset="0"/>
+              </a:rPr>
+              <a:t> Institute of Biotechnology </a:t>
+            </a:r>
+          </a:p>
+          <a:p>
+            <a:r>
+              <a:rPr lang="en-US" sz="2500" dirty="0" smtClean="0">
+                <a:latin typeface="Helvetica" panose="020B0604020202020204" pitchFamily="34" charset="0"/>
+                <a:cs typeface="Helvetica" panose="020B0604020202020204" pitchFamily="34" charset="0"/>
+              </a:rPr>
+              <a:t>and Joint Genome Institute</a:t>
+            </a:r>
+            <a:endParaRPr lang="en-US" sz="2500" dirty="0">
               <a:latin typeface="Helvetica" panose="020B0604020202020204" pitchFamily="34" charset="0"/>
               <a:cs typeface="Helvetica" panose="020B0604020202020204" pitchFamily="34" charset="0"/>
             </a:endParaRPr>
           </a:p>
-          <a:p>
-            <a:pPr algn="ctr"/>
-            <a:r>
-              <a:rPr lang="en-US" sz="3200" dirty="0" smtClean="0">
-                <a:latin typeface="Helvetica" panose="020B0604020202020204" pitchFamily="34" charset="0"/>
-                <a:cs typeface="Helvetica" panose="020B0604020202020204" pitchFamily="34" charset="0"/>
-              </a:rPr>
-              <a:t>Tom </a:t>
-            </a:r>
-            <a:r>
-              <a:rPr lang="en-US" sz="3200" dirty="0" err="1" smtClean="0">
-                <a:latin typeface="Helvetica" panose="020B0604020202020204" pitchFamily="34" charset="0"/>
-                <a:cs typeface="Helvetica" panose="020B0604020202020204" pitchFamily="34" charset="0"/>
-              </a:rPr>
-              <a:t>Juenger</a:t>
-            </a:r>
-            <a:r>
-              <a:rPr lang="en-US" sz="3200" dirty="0" smtClean="0">
-                <a:latin typeface="Helvetica" panose="020B0604020202020204" pitchFamily="34" charset="0"/>
-                <a:cs typeface="Helvetica" panose="020B0604020202020204" pitchFamily="34" charset="0"/>
-              </a:rPr>
-              <a:t>: tjuenger@utexas.edu</a:t>
-            </a:r>
-            <a:endParaRPr lang="en-US" sz="3200" dirty="0">
-              <a:latin typeface="Helvetica" panose="020B0604020202020204" pitchFamily="34" charset="0"/>
-              <a:cs typeface="Helvetica" panose="020B0604020202020204" pitchFamily="34" charset="0"/>
-            </a:endParaRPr>
-          </a:p>
-        </p:txBody>
-      </p:sp>
-      <p:sp>
-        <p:nvSpPr>
-          <p:cNvPr id="46" name="Rectangle 45"/>
-          <p:cNvSpPr/>
-          <p:nvPr/>
-        </p:nvSpPr>
-        <p:spPr>
-          <a:xfrm>
-            <a:off x="17635747" y="27135126"/>
-            <a:ext cx="10056727" cy="584775"/>
-          </a:xfrm>
-          <a:prstGeom prst="rect">
-            <a:avLst/>
-          </a:prstGeom>
-        </p:spPr>
-        <p:txBody>
-          <a:bodyPr wrap="none">
-            <a:spAutoFit/>
-          </a:bodyPr>
-          <a:lstStyle/>
-          <a:p>
-            <a:pPr algn="ctr"/>
-            <a:r>
-              <a:rPr lang="en-US" sz="3200" dirty="0">
-                <a:latin typeface="Helvetica" panose="020B0604020202020204" pitchFamily="34" charset="0"/>
-                <a:cs typeface="Helvetica" panose="020B0604020202020204" pitchFamily="34" charset="0"/>
-              </a:rPr>
-              <a:t>https://github.com/Alice-MacQueen/switchgrassGWAS</a:t>
-            </a:r>
-            <a:endParaRPr lang="en-US" sz="3200" dirty="0">
-              <a:latin typeface="Helvetica" panose="020B0604020202020204" pitchFamily="34" charset="0"/>
-              <a:cs typeface="Helvetica" panose="020B0604020202020204" pitchFamily="34" charset="0"/>
-            </a:endParaRPr>
-          </a:p>
-        </p:txBody>
-      </p:sp>
-      <p:sp>
-        <p:nvSpPr>
-          <p:cNvPr id="47" name="Rectangle 46"/>
-          <p:cNvSpPr/>
-          <p:nvPr/>
-        </p:nvSpPr>
-        <p:spPr>
-          <a:xfrm>
-            <a:off x="17778902" y="28157262"/>
-            <a:ext cx="9770431" cy="3539430"/>
-          </a:xfrm>
-          <a:prstGeom prst="rect">
-            <a:avLst/>
-          </a:prstGeom>
-        </p:spPr>
-        <p:txBody>
-          <a:bodyPr wrap="none">
-            <a:spAutoFit/>
-          </a:bodyPr>
-          <a:lstStyle/>
-          <a:p>
-            <a:pPr marL="514350" indent="-514350">
-              <a:buAutoNum type="arabicPeriod"/>
-            </a:pPr>
-            <a:r>
-              <a:rPr lang="en-US" sz="3200" dirty="0" smtClean="0">
-                <a:latin typeface="Helvetica" panose="020B0604020202020204" pitchFamily="34" charset="0"/>
-                <a:cs typeface="Helvetica" panose="020B0604020202020204" pitchFamily="34" charset="0"/>
-              </a:rPr>
-              <a:t>Run Genome-Wide Association with `</a:t>
-            </a:r>
-            <a:r>
-              <a:rPr lang="en-US" sz="3200" i="1" dirty="0" err="1" smtClean="0">
-                <a:latin typeface="Helvetica" panose="020B0604020202020204" pitchFamily="34" charset="0"/>
-                <a:cs typeface="Helvetica" panose="020B0604020202020204" pitchFamily="34" charset="0"/>
-              </a:rPr>
-              <a:t>pvdiv_gwas</a:t>
-            </a:r>
-            <a:r>
-              <a:rPr lang="en-US" sz="3200" dirty="0" smtClean="0">
-                <a:latin typeface="Helvetica" panose="020B0604020202020204" pitchFamily="34" charset="0"/>
-                <a:cs typeface="Helvetica" panose="020B0604020202020204" pitchFamily="34" charset="0"/>
-              </a:rPr>
-              <a:t>`</a:t>
-            </a:r>
-          </a:p>
-          <a:p>
-            <a:pPr marL="514350" indent="-514350">
-              <a:buAutoNum type="arabicPeriod"/>
-            </a:pPr>
-            <a:r>
-              <a:rPr lang="en-US" sz="3200" dirty="0" smtClean="0">
-                <a:latin typeface="Helvetica" panose="020B0604020202020204" pitchFamily="34" charset="0"/>
-                <a:cs typeface="Helvetica" panose="020B0604020202020204" pitchFamily="34" charset="0"/>
-              </a:rPr>
-              <a:t>Find annotations with `</a:t>
-            </a:r>
-            <a:r>
-              <a:rPr lang="en-US" sz="3200" i="1" dirty="0" err="1" smtClean="0">
-                <a:latin typeface="Helvetica" panose="020B0604020202020204" pitchFamily="34" charset="0"/>
-                <a:cs typeface="Helvetica" panose="020B0604020202020204" pitchFamily="34" charset="0"/>
-              </a:rPr>
-              <a:t>pvdiv_table_topsnps</a:t>
-            </a:r>
-            <a:r>
-              <a:rPr lang="en-US" sz="3200" dirty="0" smtClean="0">
-                <a:latin typeface="Helvetica" panose="020B0604020202020204" pitchFamily="34" charset="0"/>
-                <a:cs typeface="Helvetica" panose="020B0604020202020204" pitchFamily="34" charset="0"/>
-              </a:rPr>
-              <a:t>`</a:t>
-            </a:r>
-          </a:p>
-          <a:p>
-            <a:pPr marL="514350" indent="-514350">
-              <a:buAutoNum type="arabicPeriod"/>
-            </a:pPr>
-            <a:r>
-              <a:rPr lang="en-US" sz="3200" dirty="0" smtClean="0">
-                <a:latin typeface="Helvetica" panose="020B0604020202020204" pitchFamily="34" charset="0"/>
-                <a:cs typeface="Helvetica" panose="020B0604020202020204" pitchFamily="34" charset="0"/>
-              </a:rPr>
-              <a:t>Analyze data at multiple sites using mash, with:</a:t>
-            </a:r>
-            <a:endParaRPr lang="en-US" sz="3200" dirty="0">
-              <a:latin typeface="Helvetica" panose="020B0604020202020204" pitchFamily="34" charset="0"/>
-              <a:cs typeface="Helvetica" panose="020B0604020202020204" pitchFamily="34" charset="0"/>
-            </a:endParaRPr>
-          </a:p>
-          <a:p>
-            <a:pPr lvl="3"/>
-            <a:r>
-              <a:rPr lang="en-US" sz="3200" dirty="0" smtClean="0">
-                <a:latin typeface="Helvetica" panose="020B0604020202020204" pitchFamily="34" charset="0"/>
-                <a:cs typeface="Helvetica" panose="020B0604020202020204" pitchFamily="34" charset="0"/>
-              </a:rPr>
-              <a:t>`</a:t>
-            </a:r>
-            <a:r>
-              <a:rPr lang="en-US" sz="3200" i="1" dirty="0" smtClean="0">
-                <a:latin typeface="Helvetica" panose="020B0604020202020204" pitchFamily="34" charset="0"/>
-                <a:cs typeface="Helvetica" panose="020B0604020202020204" pitchFamily="34" charset="0"/>
-              </a:rPr>
-              <a:t>pvdiv_bigsnp2mashr</a:t>
-            </a:r>
-            <a:r>
-              <a:rPr lang="en-US" sz="3200" dirty="0" smtClean="0">
-                <a:latin typeface="Helvetica" panose="020B0604020202020204" pitchFamily="34" charset="0"/>
-                <a:cs typeface="Helvetica" panose="020B0604020202020204" pitchFamily="34" charset="0"/>
-              </a:rPr>
-              <a:t>`</a:t>
-            </a:r>
-          </a:p>
-          <a:p>
-            <a:pPr lvl="3"/>
-            <a:r>
-              <a:rPr lang="en-US" sz="3200" dirty="0" smtClean="0">
-                <a:latin typeface="Helvetica" panose="020B0604020202020204" pitchFamily="34" charset="0"/>
-                <a:cs typeface="Helvetica" panose="020B0604020202020204" pitchFamily="34" charset="0"/>
-              </a:rPr>
-              <a:t>`</a:t>
-            </a:r>
-            <a:r>
-              <a:rPr lang="en-US" sz="3200" i="1" dirty="0" err="1" smtClean="0">
-                <a:latin typeface="Helvetica" panose="020B0604020202020204" pitchFamily="34" charset="0"/>
-                <a:cs typeface="Helvetica" panose="020B0604020202020204" pitchFamily="34" charset="0"/>
-              </a:rPr>
-              <a:t>mash_standard_run</a:t>
-            </a:r>
-            <a:r>
-              <a:rPr lang="en-US" sz="3200" dirty="0" smtClean="0">
-                <a:latin typeface="Helvetica" panose="020B0604020202020204" pitchFamily="34" charset="0"/>
-                <a:cs typeface="Helvetica" panose="020B0604020202020204" pitchFamily="34" charset="0"/>
-              </a:rPr>
-              <a:t>`</a:t>
-            </a:r>
-          </a:p>
-          <a:p>
-            <a:pPr lvl="3"/>
-            <a:r>
-              <a:rPr lang="en-US" sz="3200" dirty="0" smtClean="0">
-                <a:latin typeface="Helvetica" panose="020B0604020202020204" pitchFamily="34" charset="0"/>
-                <a:cs typeface="Helvetica" panose="020B0604020202020204" pitchFamily="34" charset="0"/>
-              </a:rPr>
-              <a:t>`</a:t>
-            </a:r>
-            <a:r>
-              <a:rPr lang="en-US" sz="3200" i="1" dirty="0" err="1" smtClean="0">
-                <a:latin typeface="Helvetica" panose="020B0604020202020204" pitchFamily="34" charset="0"/>
-                <a:cs typeface="Helvetica" panose="020B0604020202020204" pitchFamily="34" charset="0"/>
-              </a:rPr>
-              <a:t>mash_plot_manhattan_by_condition</a:t>
-            </a:r>
-            <a:r>
-              <a:rPr lang="en-US" sz="3200" dirty="0" smtClean="0">
-                <a:latin typeface="Helvetica" panose="020B0604020202020204" pitchFamily="34" charset="0"/>
-                <a:cs typeface="Helvetica" panose="020B0604020202020204" pitchFamily="34" charset="0"/>
-              </a:rPr>
-              <a:t>`</a:t>
-            </a:r>
-          </a:p>
-          <a:p>
-            <a:pPr lvl="3"/>
-            <a:r>
-              <a:rPr lang="en-US" sz="3200" dirty="0" smtClean="0">
-                <a:latin typeface="Helvetica" panose="020B0604020202020204" pitchFamily="34" charset="0"/>
-                <a:cs typeface="Helvetica" panose="020B0604020202020204" pitchFamily="34" charset="0"/>
-              </a:rPr>
-              <a:t>`</a:t>
-            </a:r>
-            <a:r>
-              <a:rPr lang="en-US" sz="3200" i="1" dirty="0" err="1" smtClean="0">
-                <a:latin typeface="Helvetica" panose="020B0604020202020204" pitchFamily="34" charset="0"/>
-                <a:cs typeface="Helvetica" panose="020B0604020202020204" pitchFamily="34" charset="0"/>
-              </a:rPr>
-              <a:t>mash_plot_effects</a:t>
-            </a:r>
-            <a:r>
-              <a:rPr lang="en-US" sz="3200" dirty="0" smtClean="0">
-                <a:latin typeface="Helvetica" panose="020B0604020202020204" pitchFamily="34" charset="0"/>
-                <a:cs typeface="Helvetica" panose="020B0604020202020204" pitchFamily="34" charset="0"/>
-              </a:rPr>
-              <a:t>`</a:t>
-            </a:r>
-          </a:p>
-        </p:txBody>
-      </p:sp>
-      <p:sp>
-        <p:nvSpPr>
-          <p:cNvPr id="48" name="TextBox 47"/>
+        </p:txBody>
+      </p:sp>
+      <p:sp>
+        <p:nvSpPr>
+          <p:cNvPr id="15" name="TextBox 14"/>
           <p:cNvSpPr txBox="1"/>
           <p:nvPr/>
         </p:nvSpPr>
         <p:spPr>
           <a:xfrm>
-            <a:off x="1858809" y="26980835"/>
-            <a:ext cx="13685991" cy="2062103"/>
+            <a:off x="16263453" y="16568308"/>
+            <a:ext cx="9194604" cy="523220"/>
           </a:xfrm>
           <a:prstGeom prst="rect">
             <a:avLst/>
@@ -5001,37 +4502,611 @@
           <a:lstStyle/>
           <a:p>
             <a:r>
-              <a:rPr lang="en-US" sz="3200" b="1" dirty="0" smtClean="0">
-                <a:latin typeface="Helvetica" panose="020B0604020202020204" pitchFamily="34" charset="0"/>
-                <a:cs typeface="Helvetica" panose="020B0604020202020204" pitchFamily="34" charset="0"/>
-              </a:rPr>
-              <a:t>Environmental GWAS and population structure are inextricably linked in this species.</a:t>
-            </a:r>
-          </a:p>
-          <a:p>
-            <a:endParaRPr lang="en-US" sz="3200" b="1" dirty="0">
+              <a:rPr lang="en-US" sz="2800" b="1" dirty="0" smtClean="0">
+                <a:latin typeface="Helvetica" panose="020B0604020202020204" pitchFamily="34" charset="0"/>
+                <a:cs typeface="Helvetica" panose="020B0604020202020204" pitchFamily="34" charset="0"/>
+              </a:rPr>
+              <a:t>A </a:t>
+            </a:r>
+            <a:r>
+              <a:rPr lang="en-US" sz="2500" i="1" dirty="0" smtClean="0">
+                <a:latin typeface="Helvetica" panose="020B0604020202020204" pitchFamily="34" charset="0"/>
+                <a:cs typeface="Helvetica" panose="020B0604020202020204" pitchFamily="34" charset="0"/>
+              </a:rPr>
+              <a:t>Associations for BIO5, Max Temperature of Warmest Month</a:t>
+            </a:r>
+            <a:endParaRPr lang="en-US" sz="2500" i="1" dirty="0">
               <a:latin typeface="Helvetica" panose="020B0604020202020204" pitchFamily="34" charset="0"/>
               <a:cs typeface="Helvetica" panose="020B0604020202020204" pitchFamily="34" charset="0"/>
             </a:endParaRPr>
           </a:p>
-          <a:p>
-            <a:r>
-              <a:rPr lang="en-US" sz="3200" b="1" dirty="0" smtClean="0">
-                <a:latin typeface="Helvetica" panose="020B0604020202020204" pitchFamily="34" charset="0"/>
-                <a:cs typeface="Helvetica" panose="020B0604020202020204" pitchFamily="34" charset="0"/>
-              </a:rPr>
-              <a:t>Strong signals for associations </a:t>
-            </a:r>
-            <a:endParaRPr lang="en-US" sz="3200" b="1" dirty="0">
+        </p:txBody>
+      </p:sp>
+      <p:sp>
+        <p:nvSpPr>
+          <p:cNvPr id="32" name="TextBox 31"/>
+          <p:cNvSpPr txBox="1"/>
+          <p:nvPr/>
+        </p:nvSpPr>
+        <p:spPr>
+          <a:xfrm>
+            <a:off x="30849082" y="6853550"/>
+            <a:ext cx="6870022" cy="3939540"/>
+          </a:xfrm>
+          <a:prstGeom prst="rect">
+            <a:avLst/>
+          </a:prstGeom>
+          <a:noFill/>
+        </p:spPr>
+        <p:txBody>
+          <a:bodyPr wrap="none" rtlCol="0">
+            <a:spAutoFit/>
+          </a:bodyPr>
+          <a:lstStyle/>
+          <a:p>
+            <a:r>
+              <a:rPr lang="en-US" sz="2500" dirty="0" smtClean="0">
+                <a:latin typeface="Helvetica" panose="020B0604020202020204" pitchFamily="34" charset="0"/>
+                <a:cs typeface="Helvetica" panose="020B0604020202020204" pitchFamily="34" charset="0"/>
+              </a:rPr>
+              <a:t>*Presenting Author</a:t>
+            </a:r>
+          </a:p>
+          <a:p>
+            <a:r>
+              <a:rPr lang="en-US" sz="2500" dirty="0" smtClean="0">
+                <a:latin typeface="Helvetica" panose="020B0604020202020204" pitchFamily="34" charset="0"/>
+                <a:cs typeface="Helvetica" panose="020B0604020202020204" pitchFamily="34" charset="0"/>
+              </a:rPr>
+              <a:t>**Switchgrass genomics team members: </a:t>
+            </a:r>
+          </a:p>
+          <a:p>
+            <a:r>
+              <a:rPr lang="en-US" sz="2500" dirty="0" smtClean="0">
+                <a:latin typeface="Helvetica" panose="020B0604020202020204" pitchFamily="34" charset="0"/>
+                <a:cs typeface="Helvetica" panose="020B0604020202020204" pitchFamily="34" charset="0"/>
+              </a:rPr>
+              <a:t>Jerry Jenkins, Chris </a:t>
+            </a:r>
+            <a:r>
+              <a:rPr lang="en-US" sz="2500" dirty="0" err="1" smtClean="0">
+                <a:latin typeface="Helvetica" panose="020B0604020202020204" pitchFamily="34" charset="0"/>
+                <a:cs typeface="Helvetica" panose="020B0604020202020204" pitchFamily="34" charset="0"/>
+              </a:rPr>
+              <a:t>Plott</a:t>
+            </a:r>
+            <a:r>
+              <a:rPr lang="en-US" sz="2500" dirty="0" smtClean="0">
+                <a:latin typeface="Helvetica" panose="020B0604020202020204" pitchFamily="34" charset="0"/>
+                <a:cs typeface="Helvetica" panose="020B0604020202020204" pitchFamily="34" charset="0"/>
+              </a:rPr>
+              <a:t>, </a:t>
+            </a:r>
+            <a:r>
+              <a:rPr lang="en-US" sz="2500" dirty="0" err="1" smtClean="0">
+                <a:latin typeface="Helvetica" panose="020B0604020202020204" pitchFamily="34" charset="0"/>
+                <a:cs typeface="Helvetica" panose="020B0604020202020204" pitchFamily="34" charset="0"/>
+              </a:rPr>
+              <a:t>Shengqiang</a:t>
+            </a:r>
+            <a:r>
+              <a:rPr lang="en-US" sz="2500" dirty="0" smtClean="0">
+                <a:latin typeface="Helvetica" panose="020B0604020202020204" pitchFamily="34" charset="0"/>
+                <a:cs typeface="Helvetica" panose="020B0604020202020204" pitchFamily="34" charset="0"/>
+              </a:rPr>
+              <a:t> Shu, </a:t>
+            </a:r>
+          </a:p>
+          <a:p>
+            <a:r>
+              <a:rPr lang="en-US" sz="2500" dirty="0" err="1" smtClean="0">
+                <a:latin typeface="Helvetica" panose="020B0604020202020204" pitchFamily="34" charset="0"/>
+                <a:cs typeface="Helvetica" panose="020B0604020202020204" pitchFamily="34" charset="0"/>
+              </a:rPr>
+              <a:t>Avinash</a:t>
+            </a:r>
+            <a:r>
+              <a:rPr lang="en-US" sz="2500" dirty="0" smtClean="0">
+                <a:latin typeface="Helvetica" panose="020B0604020202020204" pitchFamily="34" charset="0"/>
+                <a:cs typeface="Helvetica" panose="020B0604020202020204" pitchFamily="34" charset="0"/>
+              </a:rPr>
+              <a:t> </a:t>
+            </a:r>
+            <a:r>
+              <a:rPr lang="en-US" sz="2500" dirty="0" err="1" smtClean="0">
+                <a:latin typeface="Helvetica" panose="020B0604020202020204" pitchFamily="34" charset="0"/>
+                <a:cs typeface="Helvetica" panose="020B0604020202020204" pitchFamily="34" charset="0"/>
+              </a:rPr>
+              <a:t>Sreedasyam</a:t>
+            </a:r>
+            <a:r>
+              <a:rPr lang="en-US" sz="2500" dirty="0" smtClean="0">
+                <a:latin typeface="Helvetica" panose="020B0604020202020204" pitchFamily="34" charset="0"/>
+                <a:cs typeface="Helvetica" panose="020B0604020202020204" pitchFamily="34" charset="0"/>
+              </a:rPr>
+              <a:t>, Adam Healey, Li Zhang, </a:t>
+            </a:r>
+          </a:p>
+          <a:p>
+            <a:r>
+              <a:rPr lang="en-US" sz="2500" dirty="0" smtClean="0">
+                <a:latin typeface="Helvetica" panose="020B0604020202020204" pitchFamily="34" charset="0"/>
+                <a:cs typeface="Helvetica" panose="020B0604020202020204" pitchFamily="34" charset="0"/>
+              </a:rPr>
+              <a:t>Taslima </a:t>
+            </a:r>
+            <a:r>
+              <a:rPr lang="en-US" sz="2500" dirty="0" err="1" smtClean="0">
+                <a:latin typeface="Helvetica" panose="020B0604020202020204" pitchFamily="34" charset="0"/>
+                <a:cs typeface="Helvetica" panose="020B0604020202020204" pitchFamily="34" charset="0"/>
+              </a:rPr>
+              <a:t>Haque</a:t>
+            </a:r>
+            <a:r>
+              <a:rPr lang="en-US" sz="2500" dirty="0" smtClean="0">
+                <a:latin typeface="Helvetica" panose="020B0604020202020204" pitchFamily="34" charset="0"/>
+                <a:cs typeface="Helvetica" panose="020B0604020202020204" pitchFamily="34" charset="0"/>
+              </a:rPr>
+              <a:t>, Joe Napier, Adam Session, </a:t>
+            </a:r>
+          </a:p>
+          <a:p>
+            <a:r>
+              <a:rPr lang="en-US" sz="2500" dirty="0" smtClean="0">
+                <a:latin typeface="Helvetica" panose="020B0604020202020204" pitchFamily="34" charset="0"/>
+                <a:cs typeface="Helvetica" panose="020B0604020202020204" pitchFamily="34" charset="0"/>
+              </a:rPr>
+              <a:t>Michael </a:t>
+            </a:r>
+            <a:r>
+              <a:rPr lang="en-US" sz="2500" dirty="0" err="1" smtClean="0">
+                <a:latin typeface="Helvetica" panose="020B0604020202020204" pitchFamily="34" charset="0"/>
+                <a:cs typeface="Helvetica" panose="020B0604020202020204" pitchFamily="34" charset="0"/>
+              </a:rPr>
+              <a:t>Udvardi</a:t>
+            </a:r>
+            <a:r>
+              <a:rPr lang="en-US" sz="2500" dirty="0" smtClean="0">
+                <a:latin typeface="Helvetica" panose="020B0604020202020204" pitchFamily="34" charset="0"/>
+                <a:cs typeface="Helvetica" panose="020B0604020202020204" pitchFamily="34" charset="0"/>
+              </a:rPr>
+              <a:t>, Malay </a:t>
+            </a:r>
+            <a:r>
+              <a:rPr lang="en-US" sz="2500" dirty="0" err="1" smtClean="0">
+                <a:latin typeface="Helvetica" panose="020B0604020202020204" pitchFamily="34" charset="0"/>
+                <a:cs typeface="Helvetica" panose="020B0604020202020204" pitchFamily="34" charset="0"/>
+              </a:rPr>
+              <a:t>Saha</a:t>
+            </a:r>
+            <a:r>
+              <a:rPr lang="en-US" sz="2500" dirty="0" smtClean="0">
+                <a:latin typeface="Helvetica" panose="020B0604020202020204" pitchFamily="34" charset="0"/>
+                <a:cs typeface="Helvetica" panose="020B0604020202020204" pitchFamily="34" charset="0"/>
+              </a:rPr>
+              <a:t>, </a:t>
+            </a:r>
+            <a:r>
+              <a:rPr lang="en-US" sz="2500" dirty="0" err="1" smtClean="0">
+                <a:latin typeface="Helvetica" panose="020B0604020202020204" pitchFamily="34" charset="0"/>
+                <a:cs typeface="Helvetica" panose="020B0604020202020204" pitchFamily="34" charset="0"/>
+              </a:rPr>
+              <a:t>Yuhong</a:t>
+            </a:r>
+            <a:r>
+              <a:rPr lang="en-US" sz="2500" dirty="0" smtClean="0">
+                <a:latin typeface="Helvetica" panose="020B0604020202020204" pitchFamily="34" charset="0"/>
+                <a:cs typeface="Helvetica" panose="020B0604020202020204" pitchFamily="34" charset="0"/>
+              </a:rPr>
+              <a:t> Tang, </a:t>
+            </a:r>
+          </a:p>
+          <a:p>
+            <a:r>
+              <a:rPr lang="en-US" sz="2500" dirty="0" smtClean="0">
+                <a:latin typeface="Helvetica" panose="020B0604020202020204" pitchFamily="34" charset="0"/>
+                <a:cs typeface="Helvetica" panose="020B0604020202020204" pitchFamily="34" charset="0"/>
+              </a:rPr>
+              <a:t>Laura Bartley, </a:t>
+            </a:r>
+            <a:r>
+              <a:rPr lang="en-US" sz="2500" dirty="0" err="1" smtClean="0">
+                <a:latin typeface="Helvetica" panose="020B0604020202020204" pitchFamily="34" charset="0"/>
+                <a:cs typeface="Helvetica" panose="020B0604020202020204" pitchFamily="34" charset="0"/>
+              </a:rPr>
+              <a:t>Katrien</a:t>
+            </a:r>
+            <a:r>
+              <a:rPr lang="en-US" sz="2500" dirty="0" smtClean="0">
+                <a:latin typeface="Helvetica" panose="020B0604020202020204" pitchFamily="34" charset="0"/>
+                <a:cs typeface="Helvetica" panose="020B0604020202020204" pitchFamily="34" charset="0"/>
+              </a:rPr>
+              <a:t> </a:t>
+            </a:r>
+            <a:r>
+              <a:rPr lang="en-US" sz="2500" dirty="0" err="1" smtClean="0">
+                <a:latin typeface="Helvetica" panose="020B0604020202020204" pitchFamily="34" charset="0"/>
+                <a:cs typeface="Helvetica" panose="020B0604020202020204" pitchFamily="34" charset="0"/>
+              </a:rPr>
+              <a:t>Devos</a:t>
+            </a:r>
+            <a:r>
+              <a:rPr lang="en-US" sz="2500" dirty="0" smtClean="0">
+                <a:latin typeface="Helvetica" panose="020B0604020202020204" pitchFamily="34" charset="0"/>
+                <a:cs typeface="Helvetica" panose="020B0604020202020204" pitchFamily="34" charset="0"/>
+              </a:rPr>
+              <a:t>, Michael </a:t>
+            </a:r>
+            <a:r>
+              <a:rPr lang="en-US" sz="2500" dirty="0" err="1" smtClean="0">
+                <a:latin typeface="Helvetica" panose="020B0604020202020204" pitchFamily="34" charset="0"/>
+                <a:cs typeface="Helvetica" panose="020B0604020202020204" pitchFamily="34" charset="0"/>
+              </a:rPr>
+              <a:t>Casler</a:t>
+            </a:r>
+            <a:r>
+              <a:rPr lang="en-US" sz="2500" dirty="0" smtClean="0">
+                <a:latin typeface="Helvetica" panose="020B0604020202020204" pitchFamily="34" charset="0"/>
+                <a:cs typeface="Helvetica" panose="020B0604020202020204" pitchFamily="34" charset="0"/>
+              </a:rPr>
+              <a:t>, </a:t>
+            </a:r>
+          </a:p>
+          <a:p>
+            <a:r>
+              <a:rPr lang="en-US" sz="2500" dirty="0" err="1" smtClean="0">
+                <a:latin typeface="Helvetica" panose="020B0604020202020204" pitchFamily="34" charset="0"/>
+                <a:cs typeface="Helvetica" panose="020B0604020202020204" pitchFamily="34" charset="0"/>
+              </a:rPr>
+              <a:t>Jiming</a:t>
+            </a:r>
+            <a:r>
+              <a:rPr lang="en-US" sz="2500" dirty="0" smtClean="0">
+                <a:latin typeface="Helvetica" panose="020B0604020202020204" pitchFamily="34" charset="0"/>
+                <a:cs typeface="Helvetica" panose="020B0604020202020204" pitchFamily="34" charset="0"/>
+              </a:rPr>
+              <a:t> Jiang, David Lowry, </a:t>
+            </a:r>
+            <a:r>
+              <a:rPr lang="en-US" sz="2500" dirty="0" err="1" smtClean="0">
+                <a:latin typeface="Helvetica" panose="020B0604020202020204" pitchFamily="34" charset="0"/>
+                <a:cs typeface="Helvetica" panose="020B0604020202020204" pitchFamily="34" charset="0"/>
+              </a:rPr>
+              <a:t>Guohong</a:t>
+            </a:r>
+            <a:r>
+              <a:rPr lang="en-US" sz="2500" dirty="0" smtClean="0">
+                <a:latin typeface="Helvetica" panose="020B0604020202020204" pitchFamily="34" charset="0"/>
+                <a:cs typeface="Helvetica" panose="020B0604020202020204" pitchFamily="34" charset="0"/>
+              </a:rPr>
+              <a:t> Wu, </a:t>
+            </a:r>
+          </a:p>
+          <a:p>
+            <a:r>
+              <a:rPr lang="en-US" sz="2500" dirty="0" smtClean="0">
+                <a:latin typeface="Helvetica" panose="020B0604020202020204" pitchFamily="34" charset="0"/>
+                <a:cs typeface="Helvetica" panose="020B0604020202020204" pitchFamily="34" charset="0"/>
+              </a:rPr>
+              <a:t>David </a:t>
+            </a:r>
+            <a:r>
+              <a:rPr lang="en-US" sz="2500" dirty="0" err="1" smtClean="0">
+                <a:latin typeface="Helvetica" panose="020B0604020202020204" pitchFamily="34" charset="0"/>
+                <a:cs typeface="Helvetica" panose="020B0604020202020204" pitchFamily="34" charset="0"/>
+              </a:rPr>
+              <a:t>Kudma</a:t>
+            </a:r>
+            <a:r>
+              <a:rPr lang="en-US" sz="2500" dirty="0" smtClean="0">
+                <a:latin typeface="Helvetica" panose="020B0604020202020204" pitchFamily="34" charset="0"/>
+                <a:cs typeface="Helvetica" panose="020B0604020202020204" pitchFamily="34" charset="0"/>
+              </a:rPr>
+              <a:t>, Kerrie Barry, Jane </a:t>
+            </a:r>
+            <a:r>
+              <a:rPr lang="en-US" sz="2500" dirty="0" err="1" smtClean="0">
+                <a:latin typeface="Helvetica" panose="020B0604020202020204" pitchFamily="34" charset="0"/>
+                <a:cs typeface="Helvetica" panose="020B0604020202020204" pitchFamily="34" charset="0"/>
+              </a:rPr>
+              <a:t>Grimwood</a:t>
+            </a:r>
+            <a:r>
+              <a:rPr lang="en-US" sz="2500" dirty="0" smtClean="0">
+                <a:latin typeface="Helvetica" panose="020B0604020202020204" pitchFamily="34" charset="0"/>
+                <a:cs typeface="Helvetica" panose="020B0604020202020204" pitchFamily="34" charset="0"/>
+              </a:rPr>
+              <a:t>, </a:t>
+            </a:r>
+          </a:p>
+          <a:p>
+            <a:r>
+              <a:rPr lang="en-US" sz="2500" dirty="0" smtClean="0">
+                <a:latin typeface="Helvetica" panose="020B0604020202020204" pitchFamily="34" charset="0"/>
+                <a:cs typeface="Helvetica" panose="020B0604020202020204" pitchFamily="34" charset="0"/>
+              </a:rPr>
+              <a:t>Dan </a:t>
+            </a:r>
+            <a:r>
+              <a:rPr lang="en-US" sz="2500" dirty="0" err="1" smtClean="0">
+                <a:latin typeface="Helvetica" panose="020B0604020202020204" pitchFamily="34" charset="0"/>
+                <a:cs typeface="Helvetica" panose="020B0604020202020204" pitchFamily="34" charset="0"/>
+              </a:rPr>
+              <a:t>Rohksar</a:t>
+            </a:r>
+            <a:endParaRPr lang="en-US" sz="2500" dirty="0">
               <a:latin typeface="Helvetica" panose="020B0604020202020204" pitchFamily="34" charset="0"/>
               <a:cs typeface="Helvetica" panose="020B0604020202020204" pitchFamily="34" charset="0"/>
             </a:endParaRPr>
           </a:p>
         </p:txBody>
       </p:sp>
+      <p:sp>
+        <p:nvSpPr>
+          <p:cNvPr id="36" name="TextBox 35"/>
+          <p:cNvSpPr txBox="1"/>
+          <p:nvPr/>
+        </p:nvSpPr>
+        <p:spPr>
+          <a:xfrm>
+            <a:off x="21073965" y="4927831"/>
+            <a:ext cx="4046301" cy="738664"/>
+          </a:xfrm>
+          <a:prstGeom prst="rect">
+            <a:avLst/>
+          </a:prstGeom>
+          <a:noFill/>
+        </p:spPr>
+        <p:txBody>
+          <a:bodyPr wrap="none" rtlCol="0">
+            <a:spAutoFit/>
+          </a:bodyPr>
+          <a:lstStyle/>
+          <a:p>
+            <a:r>
+              <a:rPr lang="en-US" sz="4200" b="1" dirty="0" smtClean="0">
+                <a:solidFill>
+                  <a:srgbClr val="262B70"/>
+                </a:solidFill>
+                <a:latin typeface="Helvetica" panose="020B0604020202020204" pitchFamily="34" charset="0"/>
+                <a:cs typeface="Helvetica" panose="020B0604020202020204" pitchFamily="34" charset="0"/>
+              </a:rPr>
+              <a:t>Diversity Panel</a:t>
+            </a:r>
+            <a:endParaRPr lang="en-US" sz="4200" b="1" dirty="0">
+              <a:solidFill>
+                <a:srgbClr val="262B70"/>
+              </a:solidFill>
+              <a:latin typeface="Helvetica" panose="020B0604020202020204" pitchFamily="34" charset="0"/>
+              <a:cs typeface="Helvetica" panose="020B0604020202020204" pitchFamily="34" charset="0"/>
+            </a:endParaRPr>
+          </a:p>
+        </p:txBody>
+      </p:sp>
+      <p:sp>
+        <p:nvSpPr>
+          <p:cNvPr id="37" name="TextBox 36"/>
+          <p:cNvSpPr txBox="1"/>
+          <p:nvPr/>
+        </p:nvSpPr>
+        <p:spPr>
+          <a:xfrm>
+            <a:off x="16263453" y="11169893"/>
+            <a:ext cx="21005366" cy="738664"/>
+          </a:xfrm>
+          <a:prstGeom prst="rect">
+            <a:avLst/>
+          </a:prstGeom>
+          <a:noFill/>
+        </p:spPr>
+        <p:txBody>
+          <a:bodyPr wrap="none" rtlCol="0">
+            <a:spAutoFit/>
+          </a:bodyPr>
+          <a:lstStyle/>
+          <a:p>
+            <a:r>
+              <a:rPr lang="en-US" sz="4200" b="1" dirty="0" smtClean="0">
+                <a:solidFill>
+                  <a:srgbClr val="262B70"/>
+                </a:solidFill>
+                <a:latin typeface="Helvetica" panose="020B0604020202020204" pitchFamily="34" charset="0"/>
+                <a:cs typeface="Helvetica" panose="020B0604020202020204" pitchFamily="34" charset="0"/>
+              </a:rPr>
+              <a:t>Genome-Wide Association Studies for Environments at Plant Locations of Origin </a:t>
+            </a:r>
+            <a:endParaRPr lang="en-US" sz="4200" b="1" dirty="0">
+              <a:solidFill>
+                <a:srgbClr val="262B70"/>
+              </a:solidFill>
+              <a:latin typeface="Helvetica" panose="020B0604020202020204" pitchFamily="34" charset="0"/>
+              <a:cs typeface="Helvetica" panose="020B0604020202020204" pitchFamily="34" charset="0"/>
+            </a:endParaRPr>
+          </a:p>
+        </p:txBody>
+      </p:sp>
+      <p:sp>
+        <p:nvSpPr>
+          <p:cNvPr id="38" name="TextBox 37"/>
+          <p:cNvSpPr txBox="1"/>
+          <p:nvPr/>
+        </p:nvSpPr>
+        <p:spPr>
+          <a:xfrm>
+            <a:off x="1454288" y="11169893"/>
+            <a:ext cx="13685991" cy="738664"/>
+          </a:xfrm>
+          <a:prstGeom prst="rect">
+            <a:avLst/>
+          </a:prstGeom>
+          <a:noFill/>
+        </p:spPr>
+        <p:txBody>
+          <a:bodyPr wrap="none" rtlCol="0">
+            <a:spAutoFit/>
+          </a:bodyPr>
+          <a:lstStyle/>
+          <a:p>
+            <a:r>
+              <a:rPr lang="en-US" sz="4200" b="1" dirty="0" smtClean="0">
+                <a:solidFill>
+                  <a:srgbClr val="262B70"/>
+                </a:solidFill>
+                <a:latin typeface="Helvetica" panose="020B0604020202020204" pitchFamily="34" charset="0"/>
+                <a:cs typeface="Helvetica" panose="020B0604020202020204" pitchFamily="34" charset="0"/>
+              </a:rPr>
+              <a:t>Continent-Scale Adaptation Using Common Gardens</a:t>
+            </a:r>
+            <a:endParaRPr lang="en-US" sz="4200" b="1" dirty="0">
+              <a:solidFill>
+                <a:srgbClr val="262B70"/>
+              </a:solidFill>
+              <a:latin typeface="Helvetica" panose="020B0604020202020204" pitchFamily="34" charset="0"/>
+              <a:cs typeface="Helvetica" panose="020B0604020202020204" pitchFamily="34" charset="0"/>
+            </a:endParaRPr>
+          </a:p>
+        </p:txBody>
+      </p:sp>
+      <p:sp>
+        <p:nvSpPr>
+          <p:cNvPr id="39" name="TextBox 38"/>
+          <p:cNvSpPr txBox="1"/>
+          <p:nvPr/>
+        </p:nvSpPr>
+        <p:spPr>
+          <a:xfrm>
+            <a:off x="10572940" y="18500964"/>
+            <a:ext cx="19522588" cy="738664"/>
+          </a:xfrm>
+          <a:prstGeom prst="rect">
+            <a:avLst/>
+          </a:prstGeom>
+          <a:noFill/>
+        </p:spPr>
+        <p:txBody>
+          <a:bodyPr wrap="none" rtlCol="0">
+            <a:spAutoFit/>
+          </a:bodyPr>
+          <a:lstStyle/>
+          <a:p>
+            <a:r>
+              <a:rPr lang="en-US" sz="4200" b="1" dirty="0" smtClean="0">
+                <a:solidFill>
+                  <a:srgbClr val="262B70"/>
+                </a:solidFill>
+                <a:latin typeface="Helvetica" panose="020B0604020202020204" pitchFamily="34" charset="0"/>
+                <a:cs typeface="Helvetica" panose="020B0604020202020204" pitchFamily="34" charset="0"/>
+              </a:rPr>
+              <a:t>Genome-Wide Association Studies for Traits Involved in Climate Adaptation</a:t>
+            </a:r>
+            <a:endParaRPr lang="en-US" sz="4200" b="1" dirty="0">
+              <a:solidFill>
+                <a:srgbClr val="262B70"/>
+              </a:solidFill>
+              <a:latin typeface="Helvetica" panose="020B0604020202020204" pitchFamily="34" charset="0"/>
+              <a:cs typeface="Helvetica" panose="020B0604020202020204" pitchFamily="34" charset="0"/>
+            </a:endParaRPr>
+          </a:p>
+        </p:txBody>
+      </p:sp>
+      <p:sp>
+        <p:nvSpPr>
+          <p:cNvPr id="40" name="TextBox 39"/>
+          <p:cNvSpPr txBox="1"/>
+          <p:nvPr/>
+        </p:nvSpPr>
+        <p:spPr>
+          <a:xfrm>
+            <a:off x="31755129" y="26135708"/>
+            <a:ext cx="2190023" cy="738664"/>
+          </a:xfrm>
+          <a:prstGeom prst="rect">
+            <a:avLst/>
+          </a:prstGeom>
+          <a:noFill/>
+        </p:spPr>
+        <p:txBody>
+          <a:bodyPr wrap="none" rtlCol="0">
+            <a:spAutoFit/>
+          </a:bodyPr>
+          <a:lstStyle/>
+          <a:p>
+            <a:r>
+              <a:rPr lang="en-US" sz="4200" b="1" dirty="0" smtClean="0">
+                <a:solidFill>
+                  <a:srgbClr val="262B70"/>
+                </a:solidFill>
+                <a:latin typeface="Helvetica" panose="020B0604020202020204" pitchFamily="34" charset="0"/>
+                <a:cs typeface="Helvetica" panose="020B0604020202020204" pitchFamily="34" charset="0"/>
+              </a:rPr>
+              <a:t>Contact</a:t>
+            </a:r>
+            <a:endParaRPr lang="en-US" sz="4200" b="1" dirty="0">
+              <a:solidFill>
+                <a:srgbClr val="262B70"/>
+              </a:solidFill>
+              <a:latin typeface="Helvetica" panose="020B0604020202020204" pitchFamily="34" charset="0"/>
+              <a:cs typeface="Helvetica" panose="020B0604020202020204" pitchFamily="34" charset="0"/>
+            </a:endParaRPr>
+          </a:p>
+        </p:txBody>
+      </p:sp>
+      <p:sp>
+        <p:nvSpPr>
+          <p:cNvPr id="41" name="TextBox 40"/>
+          <p:cNvSpPr txBox="1"/>
+          <p:nvPr/>
+        </p:nvSpPr>
+        <p:spPr>
+          <a:xfrm>
+            <a:off x="19188448" y="26135708"/>
+            <a:ext cx="7817333" cy="738664"/>
+          </a:xfrm>
+          <a:prstGeom prst="rect">
+            <a:avLst/>
+          </a:prstGeom>
+          <a:noFill/>
+        </p:spPr>
+        <p:txBody>
+          <a:bodyPr wrap="none" rtlCol="0">
+            <a:spAutoFit/>
+          </a:bodyPr>
+          <a:lstStyle/>
+          <a:p>
+            <a:r>
+              <a:rPr lang="en-US" sz="4200" b="1" dirty="0" err="1" smtClean="0">
+                <a:solidFill>
+                  <a:srgbClr val="262B70"/>
+                </a:solidFill>
+                <a:latin typeface="Helvetica" panose="020B0604020202020204" pitchFamily="34" charset="0"/>
+                <a:cs typeface="Helvetica" panose="020B0604020202020204" pitchFamily="34" charset="0"/>
+              </a:rPr>
+              <a:t>switchgrassGWAS</a:t>
+            </a:r>
+            <a:r>
+              <a:rPr lang="en-US" sz="4200" b="1" dirty="0" smtClean="0">
+                <a:solidFill>
+                  <a:srgbClr val="262B70"/>
+                </a:solidFill>
+                <a:latin typeface="Helvetica" panose="020B0604020202020204" pitchFamily="34" charset="0"/>
+                <a:cs typeface="Helvetica" panose="020B0604020202020204" pitchFamily="34" charset="0"/>
+              </a:rPr>
+              <a:t> R Package</a:t>
+            </a:r>
+            <a:endParaRPr lang="en-US" sz="4200" b="1" dirty="0">
+              <a:solidFill>
+                <a:srgbClr val="262B70"/>
+              </a:solidFill>
+              <a:latin typeface="Helvetica" panose="020B0604020202020204" pitchFamily="34" charset="0"/>
+              <a:cs typeface="Helvetica" panose="020B0604020202020204" pitchFamily="34" charset="0"/>
+            </a:endParaRPr>
+          </a:p>
+        </p:txBody>
+      </p:sp>
       <p:pic>
         <p:nvPicPr>
-          <p:cNvPr id="49" name="Picture 48"/>
+          <p:cNvPr id="44" name="Picture 43"/>
           <p:cNvPicPr>
             <a:picLocks noChangeAspect="1"/>
           </p:cNvPicPr>
@@ -5051,8 +5126,8 @@
         </p:blipFill>
         <p:spPr>
           <a:xfrm>
-            <a:off x="16263453" y="13144104"/>
-            <a:ext cx="10058400" cy="3352799"/>
+            <a:off x="27853971" y="29331491"/>
+            <a:ext cx="9992126" cy="2716105"/>
           </a:xfrm>
           <a:prstGeom prst="rect">
             <a:avLst/>
@@ -5061,14 +5136,14 @@
       </p:pic>
       <p:sp>
         <p:nvSpPr>
-          <p:cNvPr id="51" name="TextBox 50"/>
+          <p:cNvPr id="45" name="TextBox 44"/>
           <p:cNvSpPr txBox="1"/>
           <p:nvPr/>
         </p:nvSpPr>
         <p:spPr>
           <a:xfrm>
-            <a:off x="10794843" y="16266714"/>
-            <a:ext cx="6209197" cy="907941"/>
+            <a:off x="28495423" y="27064872"/>
+            <a:ext cx="8709436" cy="1569660"/>
           </a:xfrm>
           <a:prstGeom prst="rect">
             <a:avLst/>
@@ -5076,6 +5151,343 @@
           <a:noFill/>
         </p:spPr>
         <p:txBody>
+          <a:bodyPr wrap="none" rtlCol="0">
+            <a:spAutoFit/>
+          </a:bodyPr>
+          <a:lstStyle/>
+          <a:p>
+            <a:pPr algn="ctr"/>
+            <a:r>
+              <a:rPr lang="en-US" sz="3200" dirty="0" smtClean="0">
+                <a:latin typeface="Helvetica" panose="020B0604020202020204" pitchFamily="34" charset="0"/>
+                <a:cs typeface="Helvetica" panose="020B0604020202020204" pitchFamily="34" charset="0"/>
+              </a:rPr>
+              <a:t>Alice MacQueen: alice.macqueen@utexas.edu</a:t>
+            </a:r>
+          </a:p>
+          <a:p>
+            <a:pPr algn="ctr"/>
+            <a:endParaRPr lang="en-US" sz="3200" dirty="0" smtClean="0">
+              <a:latin typeface="Helvetica" panose="020B0604020202020204" pitchFamily="34" charset="0"/>
+              <a:cs typeface="Helvetica" panose="020B0604020202020204" pitchFamily="34" charset="0"/>
+            </a:endParaRPr>
+          </a:p>
+          <a:p>
+            <a:pPr algn="ctr"/>
+            <a:r>
+              <a:rPr lang="en-US" sz="3200" dirty="0" smtClean="0">
+                <a:latin typeface="Helvetica" panose="020B0604020202020204" pitchFamily="34" charset="0"/>
+                <a:cs typeface="Helvetica" panose="020B0604020202020204" pitchFamily="34" charset="0"/>
+              </a:rPr>
+              <a:t>Tom </a:t>
+            </a:r>
+            <a:r>
+              <a:rPr lang="en-US" sz="3200" dirty="0" err="1" smtClean="0">
+                <a:latin typeface="Helvetica" panose="020B0604020202020204" pitchFamily="34" charset="0"/>
+                <a:cs typeface="Helvetica" panose="020B0604020202020204" pitchFamily="34" charset="0"/>
+              </a:rPr>
+              <a:t>Juenger</a:t>
+            </a:r>
+            <a:r>
+              <a:rPr lang="en-US" sz="3200" dirty="0" smtClean="0">
+                <a:latin typeface="Helvetica" panose="020B0604020202020204" pitchFamily="34" charset="0"/>
+                <a:cs typeface="Helvetica" panose="020B0604020202020204" pitchFamily="34" charset="0"/>
+              </a:rPr>
+              <a:t>: tjuenger@utexas.edu</a:t>
+            </a:r>
+            <a:endParaRPr lang="en-US" sz="3200" dirty="0">
+              <a:latin typeface="Helvetica" panose="020B0604020202020204" pitchFamily="34" charset="0"/>
+              <a:cs typeface="Helvetica" panose="020B0604020202020204" pitchFamily="34" charset="0"/>
+            </a:endParaRPr>
+          </a:p>
+        </p:txBody>
+      </p:sp>
+      <p:sp>
+        <p:nvSpPr>
+          <p:cNvPr id="46" name="Rectangle 45"/>
+          <p:cNvSpPr/>
+          <p:nvPr/>
+        </p:nvSpPr>
+        <p:spPr>
+          <a:xfrm>
+            <a:off x="17635747" y="27135126"/>
+            <a:ext cx="10056727" cy="584775"/>
+          </a:xfrm>
+          <a:prstGeom prst="rect">
+            <a:avLst/>
+          </a:prstGeom>
+        </p:spPr>
+        <p:txBody>
+          <a:bodyPr wrap="none">
+            <a:spAutoFit/>
+          </a:bodyPr>
+          <a:lstStyle/>
+          <a:p>
+            <a:pPr algn="ctr"/>
+            <a:r>
+              <a:rPr lang="en-US" sz="3200" dirty="0">
+                <a:latin typeface="Helvetica" panose="020B0604020202020204" pitchFamily="34" charset="0"/>
+                <a:cs typeface="Helvetica" panose="020B0604020202020204" pitchFamily="34" charset="0"/>
+              </a:rPr>
+              <a:t>https://github.com/Alice-MacQueen/switchgrassGWAS</a:t>
+            </a:r>
+          </a:p>
+        </p:txBody>
+      </p:sp>
+      <p:sp>
+        <p:nvSpPr>
+          <p:cNvPr id="47" name="Rectangle 46"/>
+          <p:cNvSpPr/>
+          <p:nvPr/>
+        </p:nvSpPr>
+        <p:spPr>
+          <a:xfrm>
+            <a:off x="17778902" y="28157262"/>
+            <a:ext cx="9770431" cy="3539430"/>
+          </a:xfrm>
+          <a:prstGeom prst="rect">
+            <a:avLst/>
+          </a:prstGeom>
+        </p:spPr>
+        <p:txBody>
+          <a:bodyPr wrap="none">
+            <a:spAutoFit/>
+          </a:bodyPr>
+          <a:lstStyle/>
+          <a:p>
+            <a:pPr marL="514350" indent="-514350">
+              <a:buAutoNum type="arabicPeriod"/>
+            </a:pPr>
+            <a:r>
+              <a:rPr lang="en-US" sz="3200" dirty="0" smtClean="0">
+                <a:latin typeface="Helvetica" panose="020B0604020202020204" pitchFamily="34" charset="0"/>
+                <a:cs typeface="Helvetica" panose="020B0604020202020204" pitchFamily="34" charset="0"/>
+              </a:rPr>
+              <a:t>Run Genome-Wide Association with `</a:t>
+            </a:r>
+            <a:r>
+              <a:rPr lang="en-US" sz="3200" i="1" dirty="0" err="1" smtClean="0">
+                <a:latin typeface="Helvetica" panose="020B0604020202020204" pitchFamily="34" charset="0"/>
+                <a:cs typeface="Helvetica" panose="020B0604020202020204" pitchFamily="34" charset="0"/>
+              </a:rPr>
+              <a:t>pvdiv_gwas</a:t>
+            </a:r>
+            <a:r>
+              <a:rPr lang="en-US" sz="3200" dirty="0" smtClean="0">
+                <a:latin typeface="Helvetica" panose="020B0604020202020204" pitchFamily="34" charset="0"/>
+                <a:cs typeface="Helvetica" panose="020B0604020202020204" pitchFamily="34" charset="0"/>
+              </a:rPr>
+              <a:t>`</a:t>
+            </a:r>
+          </a:p>
+          <a:p>
+            <a:pPr marL="514350" indent="-514350">
+              <a:buAutoNum type="arabicPeriod"/>
+            </a:pPr>
+            <a:r>
+              <a:rPr lang="en-US" sz="3200" dirty="0" smtClean="0">
+                <a:latin typeface="Helvetica" panose="020B0604020202020204" pitchFamily="34" charset="0"/>
+                <a:cs typeface="Helvetica" panose="020B0604020202020204" pitchFamily="34" charset="0"/>
+              </a:rPr>
+              <a:t>Find annotations with `</a:t>
+            </a:r>
+            <a:r>
+              <a:rPr lang="en-US" sz="3200" i="1" dirty="0" err="1" smtClean="0">
+                <a:latin typeface="Helvetica" panose="020B0604020202020204" pitchFamily="34" charset="0"/>
+                <a:cs typeface="Helvetica" panose="020B0604020202020204" pitchFamily="34" charset="0"/>
+              </a:rPr>
+              <a:t>pvdiv_table_topsnps</a:t>
+            </a:r>
+            <a:r>
+              <a:rPr lang="en-US" sz="3200" dirty="0" smtClean="0">
+                <a:latin typeface="Helvetica" panose="020B0604020202020204" pitchFamily="34" charset="0"/>
+                <a:cs typeface="Helvetica" panose="020B0604020202020204" pitchFamily="34" charset="0"/>
+              </a:rPr>
+              <a:t>`</a:t>
+            </a:r>
+          </a:p>
+          <a:p>
+            <a:pPr marL="514350" indent="-514350">
+              <a:buAutoNum type="arabicPeriod"/>
+            </a:pPr>
+            <a:r>
+              <a:rPr lang="en-US" sz="3200" dirty="0" smtClean="0">
+                <a:latin typeface="Helvetica" panose="020B0604020202020204" pitchFamily="34" charset="0"/>
+                <a:cs typeface="Helvetica" panose="020B0604020202020204" pitchFamily="34" charset="0"/>
+              </a:rPr>
+              <a:t>Analyze data at multiple sites using mash, with:</a:t>
+            </a:r>
+            <a:endParaRPr lang="en-US" sz="3200" dirty="0">
+              <a:latin typeface="Helvetica" panose="020B0604020202020204" pitchFamily="34" charset="0"/>
+              <a:cs typeface="Helvetica" panose="020B0604020202020204" pitchFamily="34" charset="0"/>
+            </a:endParaRPr>
+          </a:p>
+          <a:p>
+            <a:pPr lvl="3"/>
+            <a:r>
+              <a:rPr lang="en-US" sz="3200" dirty="0" smtClean="0">
+                <a:latin typeface="Helvetica" panose="020B0604020202020204" pitchFamily="34" charset="0"/>
+                <a:cs typeface="Helvetica" panose="020B0604020202020204" pitchFamily="34" charset="0"/>
+              </a:rPr>
+              <a:t>`</a:t>
+            </a:r>
+            <a:r>
+              <a:rPr lang="en-US" sz="3200" i="1" dirty="0" smtClean="0">
+                <a:latin typeface="Helvetica" panose="020B0604020202020204" pitchFamily="34" charset="0"/>
+                <a:cs typeface="Helvetica" panose="020B0604020202020204" pitchFamily="34" charset="0"/>
+              </a:rPr>
+              <a:t>pvdiv_bigsnp2mashr</a:t>
+            </a:r>
+            <a:r>
+              <a:rPr lang="en-US" sz="3200" dirty="0" smtClean="0">
+                <a:latin typeface="Helvetica" panose="020B0604020202020204" pitchFamily="34" charset="0"/>
+                <a:cs typeface="Helvetica" panose="020B0604020202020204" pitchFamily="34" charset="0"/>
+              </a:rPr>
+              <a:t>`</a:t>
+            </a:r>
+          </a:p>
+          <a:p>
+            <a:pPr lvl="3"/>
+            <a:r>
+              <a:rPr lang="en-US" sz="3200" dirty="0" smtClean="0">
+                <a:latin typeface="Helvetica" panose="020B0604020202020204" pitchFamily="34" charset="0"/>
+                <a:cs typeface="Helvetica" panose="020B0604020202020204" pitchFamily="34" charset="0"/>
+              </a:rPr>
+              <a:t>`</a:t>
+            </a:r>
+            <a:r>
+              <a:rPr lang="en-US" sz="3200" i="1" dirty="0" err="1" smtClean="0">
+                <a:latin typeface="Helvetica" panose="020B0604020202020204" pitchFamily="34" charset="0"/>
+                <a:cs typeface="Helvetica" panose="020B0604020202020204" pitchFamily="34" charset="0"/>
+              </a:rPr>
+              <a:t>mash_standard_run</a:t>
+            </a:r>
+            <a:r>
+              <a:rPr lang="en-US" sz="3200" dirty="0" smtClean="0">
+                <a:latin typeface="Helvetica" panose="020B0604020202020204" pitchFamily="34" charset="0"/>
+                <a:cs typeface="Helvetica" panose="020B0604020202020204" pitchFamily="34" charset="0"/>
+              </a:rPr>
+              <a:t>`</a:t>
+            </a:r>
+          </a:p>
+          <a:p>
+            <a:pPr lvl="3"/>
+            <a:r>
+              <a:rPr lang="en-US" sz="3200" dirty="0" smtClean="0">
+                <a:latin typeface="Helvetica" panose="020B0604020202020204" pitchFamily="34" charset="0"/>
+                <a:cs typeface="Helvetica" panose="020B0604020202020204" pitchFamily="34" charset="0"/>
+              </a:rPr>
+              <a:t>`</a:t>
+            </a:r>
+            <a:r>
+              <a:rPr lang="en-US" sz="3200" i="1" dirty="0" err="1" smtClean="0">
+                <a:latin typeface="Helvetica" panose="020B0604020202020204" pitchFamily="34" charset="0"/>
+                <a:cs typeface="Helvetica" panose="020B0604020202020204" pitchFamily="34" charset="0"/>
+              </a:rPr>
+              <a:t>mash_plot_manhattan_by_condition</a:t>
+            </a:r>
+            <a:r>
+              <a:rPr lang="en-US" sz="3200" dirty="0" smtClean="0">
+                <a:latin typeface="Helvetica" panose="020B0604020202020204" pitchFamily="34" charset="0"/>
+                <a:cs typeface="Helvetica" panose="020B0604020202020204" pitchFamily="34" charset="0"/>
+              </a:rPr>
+              <a:t>`</a:t>
+            </a:r>
+          </a:p>
+          <a:p>
+            <a:pPr lvl="3"/>
+            <a:r>
+              <a:rPr lang="en-US" sz="3200" dirty="0" smtClean="0">
+                <a:latin typeface="Helvetica" panose="020B0604020202020204" pitchFamily="34" charset="0"/>
+                <a:cs typeface="Helvetica" panose="020B0604020202020204" pitchFamily="34" charset="0"/>
+              </a:rPr>
+              <a:t>`</a:t>
+            </a:r>
+            <a:r>
+              <a:rPr lang="en-US" sz="3200" i="1" dirty="0" err="1" smtClean="0">
+                <a:latin typeface="Helvetica" panose="020B0604020202020204" pitchFamily="34" charset="0"/>
+                <a:cs typeface="Helvetica" panose="020B0604020202020204" pitchFamily="34" charset="0"/>
+              </a:rPr>
+              <a:t>mash_plot_effects</a:t>
+            </a:r>
+            <a:r>
+              <a:rPr lang="en-US" sz="3200" dirty="0" smtClean="0">
+                <a:latin typeface="Helvetica" panose="020B0604020202020204" pitchFamily="34" charset="0"/>
+                <a:cs typeface="Helvetica" panose="020B0604020202020204" pitchFamily="34" charset="0"/>
+              </a:rPr>
+              <a:t>`</a:t>
+            </a:r>
+          </a:p>
+        </p:txBody>
+      </p:sp>
+      <p:sp>
+        <p:nvSpPr>
+          <p:cNvPr id="48" name="TextBox 47"/>
+          <p:cNvSpPr txBox="1"/>
+          <p:nvPr/>
+        </p:nvSpPr>
+        <p:spPr>
+          <a:xfrm>
+            <a:off x="1858809" y="26980835"/>
+            <a:ext cx="13685991" cy="2062103"/>
+          </a:xfrm>
+          <a:prstGeom prst="rect">
+            <a:avLst/>
+          </a:prstGeom>
+          <a:noFill/>
+        </p:spPr>
+        <p:txBody>
+          <a:bodyPr wrap="square" rtlCol="0">
+            <a:spAutoFit/>
+          </a:bodyPr>
+          <a:lstStyle/>
+          <a:p>
+            <a:r>
+              <a:rPr lang="en-US" sz="3200" b="1" dirty="0" smtClean="0">
+                <a:latin typeface="Helvetica" panose="020B0604020202020204" pitchFamily="34" charset="0"/>
+                <a:cs typeface="Helvetica" panose="020B0604020202020204" pitchFamily="34" charset="0"/>
+              </a:rPr>
+              <a:t>Environmental GWAS and population structure are inextricably linked in this species.</a:t>
+            </a:r>
+          </a:p>
+          <a:p>
+            <a:endParaRPr lang="en-US" sz="3200" b="1" dirty="0">
+              <a:latin typeface="Helvetica" panose="020B0604020202020204" pitchFamily="34" charset="0"/>
+              <a:cs typeface="Helvetica" panose="020B0604020202020204" pitchFamily="34" charset="0"/>
+            </a:endParaRPr>
+          </a:p>
+          <a:p>
+            <a:r>
+              <a:rPr lang="en-US" sz="3200" b="1" dirty="0" smtClean="0">
+                <a:latin typeface="Helvetica" panose="020B0604020202020204" pitchFamily="34" charset="0"/>
+                <a:cs typeface="Helvetica" panose="020B0604020202020204" pitchFamily="34" charset="0"/>
+              </a:rPr>
+              <a:t>Strong signals for associations </a:t>
+            </a:r>
+            <a:endParaRPr lang="en-US" sz="3200" b="1" dirty="0">
+              <a:latin typeface="Helvetica" panose="020B0604020202020204" pitchFamily="34" charset="0"/>
+              <a:cs typeface="Helvetica" panose="020B0604020202020204" pitchFamily="34" charset="0"/>
+            </a:endParaRPr>
+          </a:p>
+        </p:txBody>
+      </p:sp>
+      <p:sp>
+        <p:nvSpPr>
+          <p:cNvPr id="51" name="TextBox 50"/>
+          <p:cNvSpPr txBox="1"/>
+          <p:nvPr/>
+        </p:nvSpPr>
+        <p:spPr>
+          <a:xfrm>
+            <a:off x="10794843" y="16266714"/>
+            <a:ext cx="6209197" cy="907941"/>
+          </a:xfrm>
+          <a:prstGeom prst="rect">
+            <a:avLst/>
+          </a:prstGeom>
+          <a:noFill/>
+        </p:spPr>
+        <p:txBody>
           <a:bodyPr wrap="square" rtlCol="0">
             <a:spAutoFit/>
           </a:bodyPr>
@@ -5113,7 +5525,7 @@
       </p:sp>
       <p:pic>
         <p:nvPicPr>
-          <p:cNvPr id="52" name="Picture 51"/>
+          <p:cNvPr id="2" name="Picture 1"/>
           <p:cNvPicPr>
             <a:picLocks noChangeAspect="1"/>
           </p:cNvPicPr>
@@ -5133,7 +5545,7 @@
         </p:blipFill>
         <p:spPr>
           <a:xfrm>
-            <a:off x="26850644" y="13144104"/>
+            <a:off x="1858809" y="21139510"/>
             <a:ext cx="10058400" cy="3352799"/>
           </a:xfrm>
           <a:prstGeom prst="rect">
@@ -5141,15 +5553,75 @@
           </a:prstGeom>
         </p:spPr>
       </p:pic>
-      <p:sp>
-        <p:nvSpPr>
-          <p:cNvPr id="53" name="TextBox 52"/>
+      <p:pic>
+        <p:nvPicPr>
+          <p:cNvPr id="3" name="Picture 2"/>
+          <p:cNvPicPr>
+            <a:picLocks noChangeAspect="1"/>
+          </p:cNvPicPr>
+          <p:nvPr/>
+        </p:nvPicPr>
+        <p:blipFill>
+          <a:blip r:embed="rId7" cstate="print">
+            <a:extLst>
+              <a:ext uri="{28A0092B-C50C-407E-A947-70E740481C1C}">
+                <a14:useLocalDpi xmlns:a14="http://schemas.microsoft.com/office/drawing/2010/main" val="0"/>
+              </a:ext>
+            </a:extLst>
+          </a:blip>
+          <a:stretch>
+            <a:fillRect/>
+          </a:stretch>
+        </p:blipFill>
+        <p:spPr>
+          <a:xfrm>
+            <a:off x="14159248" y="20976133"/>
+            <a:ext cx="10058400" cy="3352799"/>
+          </a:xfrm>
+          <a:prstGeom prst="rect">
+            <a:avLst/>
+          </a:prstGeom>
+        </p:spPr>
+      </p:pic>
+      <p:pic>
+        <p:nvPicPr>
+          <p:cNvPr id="4" name="Picture 3"/>
+          <p:cNvPicPr>
+            <a:picLocks noChangeAspect="1"/>
+          </p:cNvPicPr>
+          <p:nvPr/>
+        </p:nvPicPr>
+        <p:blipFill>
+          <a:blip r:embed="rId8" cstate="print">
+            <a:extLst>
+              <a:ext uri="{28A0092B-C50C-407E-A947-70E740481C1C}">
+                <a14:useLocalDpi xmlns:a14="http://schemas.microsoft.com/office/drawing/2010/main" val="0"/>
+              </a:ext>
+            </a:extLst>
+          </a:blip>
+          <a:stretch>
+            <a:fillRect/>
+          </a:stretch>
+        </p:blipFill>
+        <p:spPr>
+          <a:xfrm>
+            <a:off x="26042763" y="20823567"/>
+            <a:ext cx="10058400" cy="3352799"/>
+          </a:xfrm>
+          <a:prstGeom prst="rect">
+            <a:avLst/>
+          </a:prstGeom>
+        </p:spPr>
+      </p:pic>
+      <p:sp>
+        <p:nvSpPr>
+          <p:cNvPr id="43" name="TextBox 42"/>
           <p:cNvSpPr txBox="1"/>
           <p:nvPr/>
         </p:nvSpPr>
         <p:spPr>
           <a:xfrm>
-            <a:off x="26906559" y="16568308"/>
+            <a:off x="26042763" y="24244185"/>
             <a:ext cx="9194604" cy="523220"/>
           </a:xfrm>
           <a:prstGeom prst="rect">
@@ -5175,7 +5647,7 @@
                 <a:latin typeface="Helvetica" panose="020B0604020202020204" pitchFamily="34" charset="0"/>
                 <a:cs typeface="Helvetica" panose="020B0604020202020204" pitchFamily="34" charset="0"/>
               </a:rPr>
-              <a:t>Associations for BIO12, Annual Precipitation</a:t>
+              <a:t>Associations for 50% Greenup in Michigan</a:t>
             </a:r>
             <a:endParaRPr lang="en-US" sz="2500" i="1" dirty="0">
               <a:latin typeface="Helvetica" panose="020B0604020202020204" pitchFamily="34" charset="0"/>
@@ -5184,6 +5656,196 @@
           </a:p>
         </p:txBody>
       </p:sp>
+      <p:sp>
+        <p:nvSpPr>
+          <p:cNvPr id="50" name="TextBox 49"/>
+          <p:cNvSpPr txBox="1"/>
+          <p:nvPr/>
+        </p:nvSpPr>
+        <p:spPr>
+          <a:xfrm>
+            <a:off x="14159248" y="24328932"/>
+            <a:ext cx="9194604" cy="523220"/>
+          </a:xfrm>
+          <a:prstGeom prst="rect">
+            <a:avLst/>
+          </a:prstGeom>
+          <a:noFill/>
+        </p:spPr>
+        <p:txBody>
+          <a:bodyPr wrap="square" rtlCol="0">
+            <a:spAutoFit/>
+          </a:bodyPr>
+          <a:lstStyle/>
+          <a:p>
+            <a:r>
+              <a:rPr lang="en-US" sz="2800" b="1" dirty="0" smtClean="0">
+                <a:latin typeface="Helvetica" panose="020B0604020202020204" pitchFamily="34" charset="0"/>
+                <a:cs typeface="Helvetica" panose="020B0604020202020204" pitchFamily="34" charset="0"/>
+              </a:rPr>
+              <a:t>A </a:t>
+            </a:r>
+            <a:r>
+              <a:rPr lang="en-US" sz="2500" i="1" dirty="0" smtClean="0">
+                <a:latin typeface="Helvetica" panose="020B0604020202020204" pitchFamily="34" charset="0"/>
+                <a:cs typeface="Helvetica" panose="020B0604020202020204" pitchFamily="34" charset="0"/>
+              </a:rPr>
+              <a:t>Associations for biomass in Temple, Texas</a:t>
+            </a:r>
+            <a:endParaRPr lang="en-US" sz="2500" i="1" dirty="0">
+              <a:latin typeface="Helvetica" panose="020B0604020202020204" pitchFamily="34" charset="0"/>
+              <a:cs typeface="Helvetica" panose="020B0604020202020204" pitchFamily="34" charset="0"/>
+            </a:endParaRPr>
+          </a:p>
+        </p:txBody>
+      </p:sp>
+      <p:sp>
+        <p:nvSpPr>
+          <p:cNvPr id="54" name="TextBox 53"/>
+          <p:cNvSpPr txBox="1"/>
+          <p:nvPr/>
+        </p:nvSpPr>
+        <p:spPr>
+          <a:xfrm>
+            <a:off x="1828218" y="24491787"/>
+            <a:ext cx="11191095" cy="523220"/>
+          </a:xfrm>
+          <a:prstGeom prst="rect">
+            <a:avLst/>
+          </a:prstGeom>
+          <a:noFill/>
+        </p:spPr>
+        <p:txBody>
+          <a:bodyPr wrap="square" rtlCol="0">
+            <a:spAutoFit/>
+          </a:bodyPr>
+          <a:lstStyle/>
+          <a:p>
+            <a:r>
+              <a:rPr lang="en-US" sz="2800" b="1" dirty="0" smtClean="0">
+                <a:latin typeface="Helvetica" panose="020B0604020202020204" pitchFamily="34" charset="0"/>
+                <a:cs typeface="Helvetica" panose="020B0604020202020204" pitchFamily="34" charset="0"/>
+              </a:rPr>
+              <a:t>A </a:t>
+            </a:r>
+            <a:r>
+              <a:rPr lang="en-US" sz="2500" i="1" dirty="0" smtClean="0">
+                <a:latin typeface="Helvetica" panose="020B0604020202020204" pitchFamily="34" charset="0"/>
+                <a:cs typeface="Helvetica" panose="020B0604020202020204" pitchFamily="34" charset="0"/>
+              </a:rPr>
+              <a:t>Associations for the time between </a:t>
+            </a:r>
+            <a:r>
+              <a:rPr lang="en-US" sz="2500" i="1" dirty="0" err="1" smtClean="0">
+                <a:latin typeface="Helvetica" panose="020B0604020202020204" pitchFamily="34" charset="0"/>
+                <a:cs typeface="Helvetica" panose="020B0604020202020204" pitchFamily="34" charset="0"/>
+              </a:rPr>
+              <a:t>greenup</a:t>
+            </a:r>
+            <a:r>
+              <a:rPr lang="en-US" sz="2500" i="1" dirty="0" smtClean="0">
+                <a:latin typeface="Helvetica" panose="020B0604020202020204" pitchFamily="34" charset="0"/>
+                <a:cs typeface="Helvetica" panose="020B0604020202020204" pitchFamily="34" charset="0"/>
+              </a:rPr>
+              <a:t> and flowering in Temple, Texas</a:t>
+            </a:r>
+            <a:endParaRPr lang="en-US" sz="2500" i="1" dirty="0">
+              <a:latin typeface="Helvetica" panose="020B0604020202020204" pitchFamily="34" charset="0"/>
+              <a:cs typeface="Helvetica" panose="020B0604020202020204" pitchFamily="34" charset="0"/>
+            </a:endParaRPr>
+          </a:p>
+        </p:txBody>
+      </p:sp>
+      <p:pic>
+        <p:nvPicPr>
+          <p:cNvPr id="8" name="Picture 7"/>
+          <p:cNvPicPr>
+            <a:picLocks noChangeAspect="1"/>
+          </p:cNvPicPr>
+          <p:nvPr/>
+        </p:nvPicPr>
+        <p:blipFill>
+          <a:blip r:embed="rId9" cstate="print">
+            <a:extLst>
+              <a:ext uri="{28A0092B-C50C-407E-A947-70E740481C1C}">
+                <a14:useLocalDpi xmlns:a14="http://schemas.microsoft.com/office/drawing/2010/main" val="0"/>
+              </a:ext>
+            </a:extLst>
+          </a:blip>
+          <a:stretch>
+            <a:fillRect/>
+          </a:stretch>
+        </p:blipFill>
+        <p:spPr>
+          <a:xfrm>
+            <a:off x="33032700" y="11923475"/>
+            <a:ext cx="3373263" cy="5458353"/>
+          </a:xfrm>
+          <a:prstGeom prst="rect">
+            <a:avLst/>
+          </a:prstGeom>
+        </p:spPr>
+      </p:pic>
+      <p:pic>
+        <p:nvPicPr>
+          <p:cNvPr id="18" name="Picture 17"/>
+          <p:cNvPicPr>
+            <a:picLocks noChangeAspect="1"/>
+          </p:cNvPicPr>
+          <p:nvPr/>
+        </p:nvPicPr>
+        <p:blipFill>
+          <a:blip r:embed="rId10" cstate="print">
+            <a:extLst>
+              <a:ext uri="{28A0092B-C50C-407E-A947-70E740481C1C}">
+                <a14:useLocalDpi xmlns:a14="http://schemas.microsoft.com/office/drawing/2010/main" val="0"/>
+              </a:ext>
+            </a:extLst>
+          </a:blip>
+          <a:stretch>
+            <a:fillRect/>
+          </a:stretch>
+        </p:blipFill>
+        <p:spPr>
+          <a:xfrm>
+            <a:off x="16263453" y="14698683"/>
+            <a:ext cx="10058400" cy="2770945"/>
+          </a:xfrm>
+          <a:prstGeom prst="rect">
+            <a:avLst/>
+          </a:prstGeom>
+        </p:spPr>
+      </p:pic>
+      <p:pic>
+        <p:nvPicPr>
+          <p:cNvPr id="21" name="Picture 20"/>
+          <p:cNvPicPr>
+            <a:picLocks noChangeAspect="1"/>
+          </p:cNvPicPr>
+          <p:nvPr/>
+        </p:nvPicPr>
+        <p:blipFill>
+          <a:blip r:embed="rId11" cstate="print">
+            <a:extLst>
+              <a:ext uri="{28A0092B-C50C-407E-A947-70E740481C1C}">
+                <a14:useLocalDpi xmlns:a14="http://schemas.microsoft.com/office/drawing/2010/main" val="0"/>
+              </a:ext>
+            </a:extLst>
+          </a:blip>
+          <a:stretch>
+            <a:fillRect/>
+          </a:stretch>
+        </p:blipFill>
+        <p:spPr>
+          <a:xfrm>
+            <a:off x="16263453" y="12060957"/>
+            <a:ext cx="10058400" cy="2514599"/>
+          </a:xfrm>
+          <a:prstGeom prst="rect">
+            <a:avLst/>
+          </a:prstGeom>
+        </p:spPr>
+      </p:pic>
     </p:spTree>
     <p:extLst>
       <p:ext uri="{BB962C8B-B14F-4D97-AF65-F5344CB8AC3E}">
@@ -5456,4 +6118,265 @@
     </a:ext>
   </a:extLst>
 </a:theme>
+</file>
+
+<file path=ppt/theme/theme2.xml><?xml version="1.0" encoding="utf-8"?>
+<a:theme xmlns:a="http://schemas.openxmlformats.org/drawingml/2006/main" name="Office Theme">
+  <a:themeElements>
+    <a:clrScheme name="Office">
+      <a:dk1>
+        <a:sysClr val="windowText" lastClr="000000"/>
+      </a:dk1>
+      <a:lt1>
+        <a:sysClr val="window" lastClr="FFFFFF"/>
+      </a:lt1>
+      <a:dk2>
+        <a:srgbClr val="44546A"/>
+      </a:dk2>
+      <a:lt2>
+        <a:srgbClr val="E7E6E6"/>
+      </a:lt2>
+      <a:accent1>
+        <a:srgbClr val="5B9BD5"/>
+      </a:accent1>
+      <a:accent2>
+        <a:srgbClr val="ED7D31"/>
+      </a:accent2>
+      <a:accent3>
+        <a:srgbClr val="A5A5A5"/>
+      </a:accent3>
+      <a:accent4>
+        <a:srgbClr val="FFC000"/>
+      </a:accent4>
+      <a:accent5>
+        <a:srgbClr val="4472C4"/>
+      </a:accent5>
+      <a:accent6>
+        <a:srgbClr val="70AD47"/>
+      </a:accent6>
+      <a:hlink>
+        <a:srgbClr val="0563C1"/>
+      </a:hlink>
+      <a:folHlink>
+        <a:srgbClr val="954F72"/>
+      </a:folHlink>
+    </a:clrScheme>
+    <a:fontScheme name="Office">
+      <a:majorFont>
+        <a:latin typeface="Calibri Light" panose="020F0302020204030204"/>
+        <a:ea typeface=""/>
+        <a:cs typeface=""/>
+        <a:font script="Jpan" typeface="游ゴシック Light"/>
+        <a:font script="Hang" typeface="맑은 고딕"/>
+        <a:font script="Hans" typeface="等线 Light"/>
+        <a:font script="Hant" typeface="新細明體"/>
+        <a:font script="Arab" typeface="Times New Roman"/>
+        <a:font script="Hebr" typeface="Times New Roman"/>
+        <a:font script="Thai" typeface="Angsana New"/>
+        <a:font script="Ethi" typeface="Nyala"/>
+        <a:font script="Beng" typeface="Vrinda"/>
+        <a:font script="Gujr" typeface="Shruti"/>
+        <a:font script="Khmr" typeface="MoolBoran"/>
+        <a:font script="Knda" typeface="Tunga"/>
+        <a:font script="Guru" typeface="Raavi"/>
+        <a:font script="Cans" typeface="Euphemia"/>
+        <a:font script="Cher" typeface="Plantagenet Cherokee"/>
+        <a:font script="Yiii" typeface="Microsoft Yi Baiti"/>
+        <a:font script="Tibt" typeface="Microsoft Himalaya"/>
+        <a:font script="Thaa" typeface="MV Boli"/>
+        <a:font script="Deva" typeface="Mangal"/>
+        <a:font script="Telu" typeface="Gautami"/>
+        <a:font script="Taml" typeface="Latha"/>
+        <a:font script="Syrc" typeface="Estrangelo Edessa"/>
+        <a:font script="Orya" typeface="Kalinga"/>
+        <a:font script="Mlym" typeface="Kartika"/>
+        <a:font script="Laoo" typeface="DokChampa"/>
+        <a:font script="Sinh" typeface="Iskoola Pota"/>
+        <a:font script="Mong" typeface="Mongolian Baiti"/>
+        <a:font script="Viet" typeface="Times New Roman"/>
+        <a:font script="Uigh" typeface="Microsoft Uighur"/>
+        <a:font script="Geor" typeface="Sylfaen"/>
+      </a:majorFont>
+      <a:minorFont>
+        <a:latin typeface="Calibri" panose="020F0502020204030204"/>
+        <a:ea typeface=""/>
+        <a:cs typeface=""/>
+        <a:font script="Jpan" typeface="游ゴシック"/>
+        <a:font script="Hang" typeface="맑은 고딕"/>
+        <a:font script="Hans" typeface="等线"/>
+        <a:font script="Hant" typeface="新細明體"/>
+        <a:font script="Arab" typeface="Arial"/>
+        <a:font script="Hebr" typeface="Arial"/>
+        <a:font script="Thai" typeface="Cordia New"/>
+        <a:font script="Ethi" typeface="Nyala"/>
+        <a:font script="Beng" typeface="Vrinda"/>
+        <a:font script="Gujr" typeface="Shruti"/>
+        <a:font script="Khmr" typeface="DaunPenh"/>
+        <a:font script="Knda" typeface="Tunga"/>
+        <a:font script="Guru" typeface="Raavi"/>
+        <a:font script="Cans" typeface="Euphemia"/>
+        <a:font script="Cher" typeface="Plantagenet Cherokee"/>
+        <a:font script="Yiii" typeface="Microsoft Yi Baiti"/>
+        <a:font script="Tibt" typeface="Microsoft Himalaya"/>
+        <a:font script="Thaa" typeface="MV Boli"/>
+        <a:font script="Deva" typeface="Mangal"/>
+        <a:font script="Telu" typeface="Gautami"/>
+        <a:font script="Taml" typeface="Latha"/>
+        <a:font script="Syrc" typeface="Estrangelo Edessa"/>
+        <a:font script="Orya" typeface="Kalinga"/>
+        <a:font script="Mlym" typeface="Kartika"/>
+        <a:font script="Laoo" typeface="DokChampa"/>
+        <a:font script="Sinh" typeface="Iskoola Pota"/>
+        <a:font script="Mong" typeface="Mongolian Baiti"/>
+        <a:font script="Viet" typeface="Arial"/>
+        <a:font script="Uigh" typeface="Microsoft Uighur"/>
+        <a:font script="Geor" typeface="Sylfaen"/>
+      </a:minorFont>
+    </a:fontScheme>
+    <a:fmtScheme name="Office">
+      <a:fillStyleLst>
+        <a:solidFill>
+          <a:schemeClr val="phClr"/>
+        </a:solidFill>
+        <a:gradFill rotWithShape="1">
+          <a:gsLst>
+            <a:gs pos="0">
+              <a:schemeClr val="phClr">
+                <a:lumMod val="110000"/>
+                <a:satMod val="105000"/>
+                <a:tint val="67000"/>
+              </a:schemeClr>
+            </a:gs>
+            <a:gs pos="50000">
+              <a:schemeClr val="phClr">
+                <a:lumMod val="105000"/>
+                <a:satMod val="103000"/>
+                <a:tint val="73000"/>
+              </a:schemeClr>
+            </a:gs>
+            <a:gs pos="100000">
+              <a:schemeClr val="phClr">
+                <a:lumMod val="105000"/>
+                <a:satMod val="109000"/>
+                <a:tint val="81000"/>
+              </a:schemeClr>
+            </a:gs>
+          </a:gsLst>
+          <a:lin ang="5400000" scaled="0"/>
+        </a:gradFill>
+        <a:gradFill rotWithShape="1">
+          <a:gsLst>
+            <a:gs pos="0">
+              <a:schemeClr val="phClr">
+                <a:satMod val="103000"/>
+                <a:lumMod val="102000"/>
+                <a:tint val="94000"/>
+              </a:schemeClr>
+            </a:gs>
+            <a:gs pos="50000">
+              <a:schemeClr val="phClr">
+                <a:satMod val="110000"/>
+                <a:lumMod val="100000"/>
+                <a:shade val="100000"/>
+              </a:schemeClr>
+            </a:gs>
+            <a:gs pos="100000">
+              <a:schemeClr val="phClr">
+                <a:lumMod val="99000"/>
+                <a:satMod val="120000"/>
+                <a:shade val="78000"/>
+              </a:schemeClr>
+            </a:gs>
+          </a:gsLst>
+          <a:lin ang="5400000" scaled="0"/>
+        </a:gradFill>
+      </a:fillStyleLst>
+      <a:lnStyleLst>
+        <a:ln w="6350" cap="flat" cmpd="sng" algn="ctr">
+          <a:solidFill>
+            <a:schemeClr val="phClr"/>
+          </a:solidFill>
+          <a:prstDash val="solid"/>
+          <a:miter lim="800000"/>
+        </a:ln>
+        <a:ln w="12700" cap="flat" cmpd="sng" algn="ctr">
+          <a:solidFill>
+            <a:schemeClr val="phClr"/>
+          </a:solidFill>
+          <a:prstDash val="solid"/>
+          <a:miter lim="800000"/>
+        </a:ln>
+        <a:ln w="19050" cap="flat" cmpd="sng" algn="ctr">
+          <a:solidFill>
+            <a:schemeClr val="phClr"/>
+          </a:solidFill>
+          <a:prstDash val="solid"/>
+          <a:miter lim="800000"/>
+        </a:ln>
+      </a:lnStyleLst>
+      <a:effectStyleLst>
+        <a:effectStyle>
+          <a:effectLst/>
+        </a:effectStyle>
+        <a:effectStyle>
+          <a:effectLst/>
+        </a:effectStyle>
+        <a:effectStyle>
+          <a:effectLst>
+            <a:outerShdw blurRad="57150" dist="19050" dir="5400000" algn="ctr" rotWithShape="0">
+              <a:srgbClr val="000000">
+                <a:alpha val="63000"/>
+              </a:srgbClr>
+            </a:outerShdw>
+          </a:effectLst>
+        </a:effectStyle>
+      </a:effectStyleLst>
+      <a:bgFillStyleLst>
+        <a:solidFill>
+          <a:schemeClr val="phClr"/>
+        </a:solidFill>
+        <a:solidFill>
+          <a:schemeClr val="phClr">
+            <a:tint val="95000"/>
+            <a:satMod val="170000"/>
+          </a:schemeClr>
+        </a:solidFill>
+        <a:gradFill rotWithShape="1">
+          <a:gsLst>
+            <a:gs pos="0">
+              <a:schemeClr val="phClr">
+                <a:tint val="93000"/>
+                <a:satMod val="150000"/>
+                <a:shade val="98000"/>
+                <a:lumMod val="102000"/>
+              </a:schemeClr>
+            </a:gs>
+            <a:gs pos="50000">
+              <a:schemeClr val="phClr">
+                <a:tint val="98000"/>
+                <a:satMod val="130000"/>
+                <a:shade val="90000"/>
+                <a:lumMod val="103000"/>
+              </a:schemeClr>
+            </a:gs>
+            <a:gs pos="100000">
+              <a:schemeClr val="phClr">
+                <a:shade val="63000"/>
+                <a:satMod val="120000"/>
+              </a:schemeClr>
+            </a:gs>
+          </a:gsLst>
+          <a:lin ang="5400000" scaled="0"/>
+        </a:gradFill>
+      </a:bgFillStyleLst>
+    </a:fmtScheme>
+  </a:themeElements>
+  <a:objectDefaults/>
+  <a:extraClrSchemeLst/>
+  <a:extLst>
+    <a:ext uri="{05A4C25C-085E-4340-85A3-A5531E510DB2}">
+      <thm15:themeFamily xmlns:thm15="http://schemas.microsoft.com/office/thememl/2012/main" name="Office Theme" id="{62F939B6-93AF-4DB8-9C6B-D6C7DFDC589F}" vid="{4A3C46E8-61CC-4603-A589-7422A47A8E4A}"/>
+    </a:ext>
+  </a:extLst>
+</a:theme>
 </file>
</xml_diff>

<commit_message>
Figures for DOE Poster Final
</commit_message>
<xml_diff>
--- a/presentations/MacQueen_Juenger_DOE.pptx
+++ b/presentations/MacQueen_Juenger_DOE.pptx
@@ -197,7 +197,7 @@
           <a:p>
             <a:fld id="{4944184F-C803-4148-93A0-DFA06EF5EF58}" type="datetimeFigureOut">
               <a:rPr lang="en-US" smtClean="0"/>
-              <a:t>2/18/2020</a:t>
+              <a:t>2020-02-19</a:t>
             </a:fld>
             <a:endParaRPr lang="en-US"/>
           </a:p>
@@ -261,38 +261,37 @@
           <a:p>
             <a:pPr lvl="0"/>
             <a:r>
-              <a:rPr lang="en-US" smtClean="0"/>
+              <a:rPr lang="en-US"/>
               <a:t>Edit Master text styles</a:t>
             </a:r>
           </a:p>
           <a:p>
             <a:pPr lvl="1"/>
             <a:r>
-              <a:rPr lang="en-US" smtClean="0"/>
+              <a:rPr lang="en-US"/>
               <a:t>Second level</a:t>
             </a:r>
           </a:p>
           <a:p>
             <a:pPr lvl="2"/>
             <a:r>
-              <a:rPr lang="en-US" smtClean="0"/>
+              <a:rPr lang="en-US"/>
               <a:t>Third level</a:t>
             </a:r>
           </a:p>
           <a:p>
             <a:pPr lvl="3"/>
             <a:r>
-              <a:rPr lang="en-US" smtClean="0"/>
+              <a:rPr lang="en-US"/>
               <a:t>Fourth level</a:t>
             </a:r>
           </a:p>
           <a:p>
             <a:pPr lvl="4"/>
             <a:r>
-              <a:rPr lang="en-US" smtClean="0"/>
+              <a:rPr lang="en-US"/>
               <a:t>Fifth level</a:t>
             </a:r>
-            <a:endParaRPr lang="en-US"/>
           </a:p>
         </p:txBody>
       </p:sp>
@@ -510,10 +509,9 @@
           <a:lstStyle/>
           <a:p>
             <a:r>
-              <a:rPr lang="en-US" dirty="0" smtClean="0"/>
+              <a:rPr lang="en-US" dirty="0"/>
               <a:t>The alternate allele for this SNP near Cold Shock Protein 1 is associated with consistently warmer climates with higher rainfall that is more variable across the season. Its strongest effects are on mean diurnal temperature range, followed by temperature annual range and temperature seasonality.</a:t>
             </a:r>
-            <a:endParaRPr lang="en-US" dirty="0"/>
           </a:p>
         </p:txBody>
       </p:sp>
@@ -595,7 +593,7 @@
           </a:lstStyle>
           <a:p>
             <a:r>
-              <a:rPr lang="en-US" smtClean="0"/>
+              <a:rPr lang="en-US"/>
               <a:t>Click to edit Master title style</a:t>
             </a:r>
             <a:endParaRPr lang="en-US" dirty="0"/>
@@ -660,7 +658,7 @@
           </a:lstStyle>
           <a:p>
             <a:r>
-              <a:rPr lang="en-US" smtClean="0"/>
+              <a:rPr lang="en-US"/>
               <a:t>Click to edit Master subtitle style</a:t>
             </a:r>
             <a:endParaRPr lang="en-US" dirty="0"/>
@@ -684,7 +682,7 @@
           <a:p>
             <a:fld id="{C3D8989D-7557-47B7-BF73-5C0345B022EC}" type="datetimeFigureOut">
               <a:rPr lang="en-US" smtClean="0"/>
-              <a:t>2/18/2020</a:t>
+              <a:t>2020-02-19</a:t>
             </a:fld>
             <a:endParaRPr lang="en-US"/>
           </a:p>
@@ -778,7 +776,7 @@
           <a:lstStyle/>
           <a:p>
             <a:r>
-              <a:rPr lang="en-US" smtClean="0"/>
+              <a:rPr lang="en-US"/>
               <a:t>Click to edit Master title style</a:t>
             </a:r>
             <a:endParaRPr lang="en-US" dirty="0"/>
@@ -802,35 +800,35 @@
           <a:p>
             <a:pPr lvl="0"/>
             <a:r>
-              <a:rPr lang="en-US" smtClean="0"/>
+              <a:rPr lang="en-US"/>
               <a:t>Edit Master text styles</a:t>
             </a:r>
           </a:p>
           <a:p>
             <a:pPr lvl="1"/>
             <a:r>
-              <a:rPr lang="en-US" smtClean="0"/>
+              <a:rPr lang="en-US"/>
               <a:t>Second level</a:t>
             </a:r>
           </a:p>
           <a:p>
             <a:pPr lvl="2"/>
             <a:r>
-              <a:rPr lang="en-US" smtClean="0"/>
+              <a:rPr lang="en-US"/>
               <a:t>Third level</a:t>
             </a:r>
           </a:p>
           <a:p>
             <a:pPr lvl="3"/>
             <a:r>
-              <a:rPr lang="en-US" smtClean="0"/>
+              <a:rPr lang="en-US"/>
               <a:t>Fourth level</a:t>
             </a:r>
           </a:p>
           <a:p>
             <a:pPr lvl="4"/>
             <a:r>
-              <a:rPr lang="en-US" smtClean="0"/>
+              <a:rPr lang="en-US"/>
               <a:t>Fifth level</a:t>
             </a:r>
             <a:endParaRPr lang="en-US" dirty="0"/>
@@ -854,7 +852,7 @@
           <a:p>
             <a:fld id="{C3D8989D-7557-47B7-BF73-5C0345B022EC}" type="datetimeFigureOut">
               <a:rPr lang="en-US" smtClean="0"/>
-              <a:t>2/18/2020</a:t>
+              <a:t>2020-02-19</a:t>
             </a:fld>
             <a:endParaRPr lang="en-US"/>
           </a:p>
@@ -953,7 +951,7 @@
           <a:lstStyle/>
           <a:p>
             <a:r>
-              <a:rPr lang="en-US" smtClean="0"/>
+              <a:rPr lang="en-US"/>
               <a:t>Click to edit Master title style</a:t>
             </a:r>
             <a:endParaRPr lang="en-US" dirty="0"/>
@@ -982,35 +980,35 @@
           <a:p>
             <a:pPr lvl="0"/>
             <a:r>
-              <a:rPr lang="en-US" smtClean="0"/>
+              <a:rPr lang="en-US"/>
               <a:t>Edit Master text styles</a:t>
             </a:r>
           </a:p>
           <a:p>
             <a:pPr lvl="1"/>
             <a:r>
-              <a:rPr lang="en-US" smtClean="0"/>
+              <a:rPr lang="en-US"/>
               <a:t>Second level</a:t>
             </a:r>
           </a:p>
           <a:p>
             <a:pPr lvl="2"/>
             <a:r>
-              <a:rPr lang="en-US" smtClean="0"/>
+              <a:rPr lang="en-US"/>
               <a:t>Third level</a:t>
             </a:r>
           </a:p>
           <a:p>
             <a:pPr lvl="3"/>
             <a:r>
-              <a:rPr lang="en-US" smtClean="0"/>
+              <a:rPr lang="en-US"/>
               <a:t>Fourth level</a:t>
             </a:r>
           </a:p>
           <a:p>
             <a:pPr lvl="4"/>
             <a:r>
-              <a:rPr lang="en-US" smtClean="0"/>
+              <a:rPr lang="en-US"/>
               <a:t>Fifth level</a:t>
             </a:r>
             <a:endParaRPr lang="en-US" dirty="0"/>
@@ -1034,7 +1032,7 @@
           <a:p>
             <a:fld id="{C3D8989D-7557-47B7-BF73-5C0345B022EC}" type="datetimeFigureOut">
               <a:rPr lang="en-US" smtClean="0"/>
-              <a:t>2/18/2020</a:t>
+              <a:t>2020-02-19</a:t>
             </a:fld>
             <a:endParaRPr lang="en-US"/>
           </a:p>
@@ -1128,7 +1126,7 @@
           <a:lstStyle/>
           <a:p>
             <a:r>
-              <a:rPr lang="en-US" smtClean="0"/>
+              <a:rPr lang="en-US"/>
               <a:t>Click to edit Master title style</a:t>
             </a:r>
             <a:endParaRPr lang="en-US" dirty="0"/>
@@ -1152,35 +1150,35 @@
           <a:p>
             <a:pPr lvl="0"/>
             <a:r>
-              <a:rPr lang="en-US" smtClean="0"/>
+              <a:rPr lang="en-US"/>
               <a:t>Edit Master text styles</a:t>
             </a:r>
           </a:p>
           <a:p>
             <a:pPr lvl="1"/>
             <a:r>
-              <a:rPr lang="en-US" smtClean="0"/>
+              <a:rPr lang="en-US"/>
               <a:t>Second level</a:t>
             </a:r>
           </a:p>
           <a:p>
             <a:pPr lvl="2"/>
             <a:r>
-              <a:rPr lang="en-US" smtClean="0"/>
+              <a:rPr lang="en-US"/>
               <a:t>Third level</a:t>
             </a:r>
           </a:p>
           <a:p>
             <a:pPr lvl="3"/>
             <a:r>
-              <a:rPr lang="en-US" smtClean="0"/>
+              <a:rPr lang="en-US"/>
               <a:t>Fourth level</a:t>
             </a:r>
           </a:p>
           <a:p>
             <a:pPr lvl="4"/>
             <a:r>
-              <a:rPr lang="en-US" smtClean="0"/>
+              <a:rPr lang="en-US"/>
               <a:t>Fifth level</a:t>
             </a:r>
             <a:endParaRPr lang="en-US" dirty="0"/>
@@ -1204,7 +1202,7 @@
           <a:p>
             <a:fld id="{C3D8989D-7557-47B7-BF73-5C0345B022EC}" type="datetimeFigureOut">
               <a:rPr lang="en-US" smtClean="0"/>
-              <a:t>2/18/2020</a:t>
+              <a:t>2020-02-19</a:t>
             </a:fld>
             <a:endParaRPr lang="en-US"/>
           </a:p>
@@ -1307,7 +1305,7 @@
           </a:lstStyle>
           <a:p>
             <a:r>
-              <a:rPr lang="en-US" smtClean="0"/>
+              <a:rPr lang="en-US"/>
               <a:t>Click to edit Master title style</a:t>
             </a:r>
             <a:endParaRPr lang="en-US" dirty="0"/>
@@ -1425,7 +1423,7 @@
           <a:p>
             <a:pPr lvl="0"/>
             <a:r>
-              <a:rPr lang="en-US" smtClean="0"/>
+              <a:rPr lang="en-US"/>
               <a:t>Edit Master text styles</a:t>
             </a:r>
           </a:p>
@@ -1448,7 +1446,7 @@
           <a:p>
             <a:fld id="{C3D8989D-7557-47B7-BF73-5C0345B022EC}" type="datetimeFigureOut">
               <a:rPr lang="en-US" smtClean="0"/>
-              <a:t>2/18/2020</a:t>
+              <a:t>2020-02-19</a:t>
             </a:fld>
             <a:endParaRPr lang="en-US"/>
           </a:p>
@@ -1542,7 +1540,7 @@
           <a:lstStyle/>
           <a:p>
             <a:r>
-              <a:rPr lang="en-US" smtClean="0"/>
+              <a:rPr lang="en-US"/>
               <a:t>Click to edit Master title style</a:t>
             </a:r>
             <a:endParaRPr lang="en-US" dirty="0"/>
@@ -1571,35 +1569,35 @@
           <a:p>
             <a:pPr lvl="0"/>
             <a:r>
-              <a:rPr lang="en-US" smtClean="0"/>
+              <a:rPr lang="en-US"/>
               <a:t>Edit Master text styles</a:t>
             </a:r>
           </a:p>
           <a:p>
             <a:pPr lvl="1"/>
             <a:r>
-              <a:rPr lang="en-US" smtClean="0"/>
+              <a:rPr lang="en-US"/>
               <a:t>Second level</a:t>
             </a:r>
           </a:p>
           <a:p>
             <a:pPr lvl="2"/>
             <a:r>
-              <a:rPr lang="en-US" smtClean="0"/>
+              <a:rPr lang="en-US"/>
               <a:t>Third level</a:t>
             </a:r>
           </a:p>
           <a:p>
             <a:pPr lvl="3"/>
             <a:r>
-              <a:rPr lang="en-US" smtClean="0"/>
+              <a:rPr lang="en-US"/>
               <a:t>Fourth level</a:t>
             </a:r>
           </a:p>
           <a:p>
             <a:pPr lvl="4"/>
             <a:r>
-              <a:rPr lang="en-US" smtClean="0"/>
+              <a:rPr lang="en-US"/>
               <a:t>Fifth level</a:t>
             </a:r>
             <a:endParaRPr lang="en-US" dirty="0"/>
@@ -1628,35 +1626,35 @@
           <a:p>
             <a:pPr lvl="0"/>
             <a:r>
-              <a:rPr lang="en-US" smtClean="0"/>
+              <a:rPr lang="en-US"/>
               <a:t>Edit Master text styles</a:t>
             </a:r>
           </a:p>
           <a:p>
             <a:pPr lvl="1"/>
             <a:r>
-              <a:rPr lang="en-US" smtClean="0"/>
+              <a:rPr lang="en-US"/>
               <a:t>Second level</a:t>
             </a:r>
           </a:p>
           <a:p>
             <a:pPr lvl="2"/>
             <a:r>
-              <a:rPr lang="en-US" smtClean="0"/>
+              <a:rPr lang="en-US"/>
               <a:t>Third level</a:t>
             </a:r>
           </a:p>
           <a:p>
             <a:pPr lvl="3"/>
             <a:r>
-              <a:rPr lang="en-US" smtClean="0"/>
+              <a:rPr lang="en-US"/>
               <a:t>Fourth level</a:t>
             </a:r>
           </a:p>
           <a:p>
             <a:pPr lvl="4"/>
             <a:r>
-              <a:rPr lang="en-US" smtClean="0"/>
+              <a:rPr lang="en-US"/>
               <a:t>Fifth level</a:t>
             </a:r>
             <a:endParaRPr lang="en-US" dirty="0"/>
@@ -1680,7 +1678,7 @@
           <a:p>
             <a:fld id="{C3D8989D-7557-47B7-BF73-5C0345B022EC}" type="datetimeFigureOut">
               <a:rPr lang="en-US" smtClean="0"/>
-              <a:t>2/18/2020</a:t>
+              <a:t>2020-02-19</a:t>
             </a:fld>
             <a:endParaRPr lang="en-US"/>
           </a:p>
@@ -1779,7 +1777,7 @@
           <a:lstStyle/>
           <a:p>
             <a:r>
-              <a:rPr lang="en-US" smtClean="0"/>
+              <a:rPr lang="en-US"/>
               <a:t>Click to edit Master title style</a:t>
             </a:r>
             <a:endParaRPr lang="en-US" dirty="0"/>
@@ -1845,7 +1843,7 @@
           <a:p>
             <a:pPr lvl="0"/>
             <a:r>
-              <a:rPr lang="en-US" smtClean="0"/>
+              <a:rPr lang="en-US"/>
               <a:t>Edit Master text styles</a:t>
             </a:r>
           </a:p>
@@ -1873,35 +1871,35 @@
           <a:p>
             <a:pPr lvl="0"/>
             <a:r>
-              <a:rPr lang="en-US" smtClean="0"/>
+              <a:rPr lang="en-US"/>
               <a:t>Edit Master text styles</a:t>
             </a:r>
           </a:p>
           <a:p>
             <a:pPr lvl="1"/>
             <a:r>
-              <a:rPr lang="en-US" smtClean="0"/>
+              <a:rPr lang="en-US"/>
               <a:t>Second level</a:t>
             </a:r>
           </a:p>
           <a:p>
             <a:pPr lvl="2"/>
             <a:r>
-              <a:rPr lang="en-US" smtClean="0"/>
+              <a:rPr lang="en-US"/>
               <a:t>Third level</a:t>
             </a:r>
           </a:p>
           <a:p>
             <a:pPr lvl="3"/>
             <a:r>
-              <a:rPr lang="en-US" smtClean="0"/>
+              <a:rPr lang="en-US"/>
               <a:t>Fourth level</a:t>
             </a:r>
           </a:p>
           <a:p>
             <a:pPr lvl="4"/>
             <a:r>
-              <a:rPr lang="en-US" smtClean="0"/>
+              <a:rPr lang="en-US"/>
               <a:t>Fifth level</a:t>
             </a:r>
             <a:endParaRPr lang="en-US" dirty="0"/>
@@ -1967,7 +1965,7 @@
           <a:p>
             <a:pPr lvl="0"/>
             <a:r>
-              <a:rPr lang="en-US" smtClean="0"/>
+              <a:rPr lang="en-US"/>
               <a:t>Edit Master text styles</a:t>
             </a:r>
           </a:p>
@@ -1995,35 +1993,35 @@
           <a:p>
             <a:pPr lvl="0"/>
             <a:r>
-              <a:rPr lang="en-US" smtClean="0"/>
+              <a:rPr lang="en-US"/>
               <a:t>Edit Master text styles</a:t>
             </a:r>
           </a:p>
           <a:p>
             <a:pPr lvl="1"/>
             <a:r>
-              <a:rPr lang="en-US" smtClean="0"/>
+              <a:rPr lang="en-US"/>
               <a:t>Second level</a:t>
             </a:r>
           </a:p>
           <a:p>
             <a:pPr lvl="2"/>
             <a:r>
-              <a:rPr lang="en-US" smtClean="0"/>
+              <a:rPr lang="en-US"/>
               <a:t>Third level</a:t>
             </a:r>
           </a:p>
           <a:p>
             <a:pPr lvl="3"/>
             <a:r>
-              <a:rPr lang="en-US" smtClean="0"/>
+              <a:rPr lang="en-US"/>
               <a:t>Fourth level</a:t>
             </a:r>
           </a:p>
           <a:p>
             <a:pPr lvl="4"/>
             <a:r>
-              <a:rPr lang="en-US" smtClean="0"/>
+              <a:rPr lang="en-US"/>
               <a:t>Fifth level</a:t>
             </a:r>
             <a:endParaRPr lang="en-US" dirty="0"/>
@@ -2047,7 +2045,7 @@
           <a:p>
             <a:fld id="{C3D8989D-7557-47B7-BF73-5C0345B022EC}" type="datetimeFigureOut">
               <a:rPr lang="en-US" smtClean="0"/>
-              <a:t>2/18/2020</a:t>
+              <a:t>2020-02-19</a:t>
             </a:fld>
             <a:endParaRPr lang="en-US"/>
           </a:p>
@@ -2141,7 +2139,7 @@
           <a:lstStyle/>
           <a:p>
             <a:r>
-              <a:rPr lang="en-US" smtClean="0"/>
+              <a:rPr lang="en-US"/>
               <a:t>Click to edit Master title style</a:t>
             </a:r>
             <a:endParaRPr lang="en-US" dirty="0"/>
@@ -2165,7 +2163,7 @@
           <a:p>
             <a:fld id="{C3D8989D-7557-47B7-BF73-5C0345B022EC}" type="datetimeFigureOut">
               <a:rPr lang="en-US" smtClean="0"/>
-              <a:t>2/18/2020</a:t>
+              <a:t>2020-02-19</a:t>
             </a:fld>
             <a:endParaRPr lang="en-US"/>
           </a:p>
@@ -2260,7 +2258,7 @@
           <a:p>
             <a:fld id="{C3D8989D-7557-47B7-BF73-5C0345B022EC}" type="datetimeFigureOut">
               <a:rPr lang="en-US" smtClean="0"/>
-              <a:t>2/18/2020</a:t>
+              <a:t>2020-02-19</a:t>
             </a:fld>
             <a:endParaRPr lang="en-US"/>
           </a:p>
@@ -2363,7 +2361,7 @@
           </a:lstStyle>
           <a:p>
             <a:r>
-              <a:rPr lang="en-US" smtClean="0"/>
+              <a:rPr lang="en-US"/>
               <a:t>Click to edit Master title style</a:t>
             </a:r>
             <a:endParaRPr lang="en-US" dirty="0"/>
@@ -2420,35 +2418,35 @@
           <a:p>
             <a:pPr lvl="0"/>
             <a:r>
-              <a:rPr lang="en-US" smtClean="0"/>
+              <a:rPr lang="en-US"/>
               <a:t>Edit Master text styles</a:t>
             </a:r>
           </a:p>
           <a:p>
             <a:pPr lvl="1"/>
             <a:r>
-              <a:rPr lang="en-US" smtClean="0"/>
+              <a:rPr lang="en-US"/>
               <a:t>Second level</a:t>
             </a:r>
           </a:p>
           <a:p>
             <a:pPr lvl="2"/>
             <a:r>
-              <a:rPr lang="en-US" smtClean="0"/>
+              <a:rPr lang="en-US"/>
               <a:t>Third level</a:t>
             </a:r>
           </a:p>
           <a:p>
             <a:pPr lvl="3"/>
             <a:r>
-              <a:rPr lang="en-US" smtClean="0"/>
+              <a:rPr lang="en-US"/>
               <a:t>Fourth level</a:t>
             </a:r>
           </a:p>
           <a:p>
             <a:pPr lvl="4"/>
             <a:r>
-              <a:rPr lang="en-US" smtClean="0"/>
+              <a:rPr lang="en-US"/>
               <a:t>Fifth level</a:t>
             </a:r>
             <a:endParaRPr lang="en-US" dirty="0"/>
@@ -2514,7 +2512,7 @@
           <a:p>
             <a:pPr lvl="0"/>
             <a:r>
-              <a:rPr lang="en-US" smtClean="0"/>
+              <a:rPr lang="en-US"/>
               <a:t>Edit Master text styles</a:t>
             </a:r>
           </a:p>
@@ -2537,7 +2535,7 @@
           <a:p>
             <a:fld id="{C3D8989D-7557-47B7-BF73-5C0345B022EC}" type="datetimeFigureOut">
               <a:rPr lang="en-US" smtClean="0"/>
-              <a:t>2/18/2020</a:t>
+              <a:t>2020-02-19</a:t>
             </a:fld>
             <a:endParaRPr lang="en-US"/>
           </a:p>
@@ -2640,7 +2638,7 @@
           </a:lstStyle>
           <a:p>
             <a:r>
-              <a:rPr lang="en-US" smtClean="0"/>
+              <a:rPr lang="en-US"/>
               <a:t>Click to edit Master title style</a:t>
             </a:r>
             <a:endParaRPr lang="en-US" dirty="0"/>
@@ -2705,7 +2703,7 @@
           </a:lstStyle>
           <a:p>
             <a:r>
-              <a:rPr lang="en-US" smtClean="0"/>
+              <a:rPr lang="en-US"/>
               <a:t>Click icon to add picture</a:t>
             </a:r>
             <a:endParaRPr lang="en-US" dirty="0"/>
@@ -2771,7 +2769,7 @@
           <a:p>
             <a:pPr lvl="0"/>
             <a:r>
-              <a:rPr lang="en-US" smtClean="0"/>
+              <a:rPr lang="en-US"/>
               <a:t>Edit Master text styles</a:t>
             </a:r>
           </a:p>
@@ -2794,7 +2792,7 @@
           <a:p>
             <a:fld id="{C3D8989D-7557-47B7-BF73-5C0345B022EC}" type="datetimeFigureOut">
               <a:rPr lang="en-US" smtClean="0"/>
-              <a:t>2/18/2020</a:t>
+              <a:t>2020-02-19</a:t>
             </a:fld>
             <a:endParaRPr lang="en-US"/>
           </a:p>
@@ -2903,7 +2901,7 @@
           <a:lstStyle/>
           <a:p>
             <a:r>
-              <a:rPr lang="en-US" smtClean="0"/>
+              <a:rPr lang="en-US"/>
               <a:t>Click to edit Master title style</a:t>
             </a:r>
             <a:endParaRPr lang="en-US" dirty="0"/>
@@ -2937,35 +2935,35 @@
           <a:p>
             <a:pPr lvl="0"/>
             <a:r>
-              <a:rPr lang="en-US" smtClean="0"/>
+              <a:rPr lang="en-US"/>
               <a:t>Edit Master text styles</a:t>
             </a:r>
           </a:p>
           <a:p>
             <a:pPr lvl="1"/>
             <a:r>
-              <a:rPr lang="en-US" smtClean="0"/>
+              <a:rPr lang="en-US"/>
               <a:t>Second level</a:t>
             </a:r>
           </a:p>
           <a:p>
             <a:pPr lvl="2"/>
             <a:r>
-              <a:rPr lang="en-US" smtClean="0"/>
+              <a:rPr lang="en-US"/>
               <a:t>Third level</a:t>
             </a:r>
           </a:p>
           <a:p>
             <a:pPr lvl="3"/>
             <a:r>
-              <a:rPr lang="en-US" smtClean="0"/>
+              <a:rPr lang="en-US"/>
               <a:t>Fourth level</a:t>
             </a:r>
           </a:p>
           <a:p>
             <a:pPr lvl="4"/>
             <a:r>
-              <a:rPr lang="en-US" smtClean="0"/>
+              <a:rPr lang="en-US"/>
               <a:t>Fifth level</a:t>
             </a:r>
             <a:endParaRPr lang="en-US" dirty="0"/>
@@ -3007,7 +3005,7 @@
           <a:p>
             <a:fld id="{C3D8989D-7557-47B7-BF73-5C0345B022EC}" type="datetimeFigureOut">
               <a:rPr lang="en-US" smtClean="0"/>
-              <a:t>2/18/2020</a:t>
+              <a:t>2020-02-19</a:t>
             </a:fld>
             <a:endParaRPr lang="en-US"/>
           </a:p>
@@ -3619,7 +3617,7 @@
         <p:spPr>
           <a:xfrm>
             <a:off x="1049768" y="10934700"/>
-            <a:ext cx="14495032" cy="7082200"/>
+            <a:ext cx="14880043" cy="7082200"/>
           </a:xfrm>
           <a:prstGeom prst="rect">
             <a:avLst/>
@@ -3666,8 +3664,8 @@
         </p:nvSpPr>
         <p:spPr>
           <a:xfrm>
-            <a:off x="15849600" y="10914172"/>
-            <a:ext cx="21526500" cy="7102728"/>
+            <a:off x="16194505" y="10914172"/>
+            <a:ext cx="21181595" cy="7102728"/>
           </a:xfrm>
           <a:prstGeom prst="rect">
             <a:avLst/>
@@ -3715,7 +3713,7 @@
         <p:spPr>
           <a:xfrm>
             <a:off x="15849600" y="4679912"/>
-            <a:ext cx="14495032" cy="5946120"/>
+            <a:ext cx="14630400" cy="5946120"/>
           </a:xfrm>
           <a:prstGeom prst="rect">
             <a:avLst/>
@@ -3825,7 +3823,7 @@
           <a:lstStyle/>
           <a:p>
             <a:r>
-              <a:rPr lang="en-US" sz="7200" dirty="0" smtClean="0">
+              <a:rPr lang="en-US" sz="7200" dirty="0">
                 <a:solidFill>
                   <a:srgbClr val="292D6A"/>
                 </a:solidFill>
@@ -3834,13 +3832,6 @@
               </a:rPr>
               <a:t>Genetics of Climate Adaptation Using Genome-Wide Association in Switchgrass</a:t>
             </a:r>
-            <a:endParaRPr lang="en-US" sz="7200" dirty="0">
-              <a:solidFill>
-                <a:srgbClr val="292D6A"/>
-              </a:solidFill>
-              <a:latin typeface="Helvetica" panose="020B0604020202020204" pitchFamily="34" charset="0"/>
-              <a:cs typeface="Helvetica" panose="020B0604020202020204" pitchFamily="34" charset="0"/>
-            </a:endParaRPr>
           </a:p>
         </p:txBody>
       </p:sp>
@@ -3867,98 +3858,98 @@
           <a:lstStyle/>
           <a:p>
             <a:r>
-              <a:rPr lang="en-US" sz="3600" dirty="0" smtClean="0">
+              <a:rPr lang="en-US" sz="3600" dirty="0">
                 <a:latin typeface="Helvetica" panose="020B0604020202020204" pitchFamily="34" charset="0"/>
                 <a:cs typeface="Helvetica" panose="020B0604020202020204" pitchFamily="34" charset="0"/>
               </a:rPr>
               <a:t>Tom Juenger</a:t>
             </a:r>
             <a:r>
-              <a:rPr lang="en-US" sz="3600" baseline="30000" dirty="0" smtClean="0">
+              <a:rPr lang="en-US" sz="3600" baseline="30000" dirty="0">
                 <a:latin typeface="Helvetica" panose="020B0604020202020204" pitchFamily="34" charset="0"/>
                 <a:cs typeface="Helvetica" panose="020B0604020202020204" pitchFamily="34" charset="0"/>
               </a:rPr>
               <a:t>1</a:t>
             </a:r>
             <a:r>
-              <a:rPr lang="en-US" sz="3600" dirty="0" smtClean="0">
+              <a:rPr lang="en-US" sz="3600" dirty="0">
                 <a:latin typeface="Helvetica" panose="020B0604020202020204" pitchFamily="34" charset="0"/>
                 <a:cs typeface="Helvetica" panose="020B0604020202020204" pitchFamily="34" charset="0"/>
               </a:rPr>
               <a:t>, Alice MacQueen</a:t>
             </a:r>
             <a:r>
-              <a:rPr lang="en-US" sz="3600" baseline="30000" dirty="0" smtClean="0">
+              <a:rPr lang="en-US" sz="3600" baseline="30000" dirty="0">
                 <a:latin typeface="Helvetica" panose="020B0604020202020204" pitchFamily="34" charset="0"/>
                 <a:cs typeface="Helvetica" panose="020B0604020202020204" pitchFamily="34" charset="0"/>
               </a:rPr>
               <a:t>1</a:t>
             </a:r>
             <a:r>
-              <a:rPr lang="en-US" sz="3600" dirty="0" smtClean="0">
+              <a:rPr lang="en-US" sz="3600" dirty="0">
                 <a:latin typeface="Helvetica" panose="020B0604020202020204" pitchFamily="34" charset="0"/>
                 <a:cs typeface="Helvetica" panose="020B0604020202020204" pitchFamily="34" charset="0"/>
               </a:rPr>
               <a:t>*, The Switchgrass Genomics Team**, Jason Bonette</a:t>
             </a:r>
             <a:r>
-              <a:rPr lang="en-US" sz="3600" baseline="30000" dirty="0" smtClean="0">
+              <a:rPr lang="en-US" sz="3600" baseline="30000" dirty="0">
                 <a:latin typeface="Helvetica" panose="020B0604020202020204" pitchFamily="34" charset="0"/>
                 <a:cs typeface="Helvetica" panose="020B0604020202020204" pitchFamily="34" charset="0"/>
               </a:rPr>
               <a:t>1</a:t>
             </a:r>
             <a:r>
-              <a:rPr lang="en-US" sz="3600" dirty="0" smtClean="0">
+              <a:rPr lang="en-US" sz="3600" dirty="0">
                 <a:latin typeface="Helvetica" panose="020B0604020202020204" pitchFamily="34" charset="0"/>
                 <a:cs typeface="Helvetica" panose="020B0604020202020204" pitchFamily="34" charset="0"/>
               </a:rPr>
               <a:t>, John Lovell</a:t>
             </a:r>
             <a:r>
-              <a:rPr lang="en-US" sz="3600" baseline="30000" dirty="0" smtClean="0">
+              <a:rPr lang="en-US" sz="3600" baseline="30000" dirty="0">
                 <a:latin typeface="Helvetica" panose="020B0604020202020204" pitchFamily="34" charset="0"/>
                 <a:cs typeface="Helvetica" panose="020B0604020202020204" pitchFamily="34" charset="0"/>
               </a:rPr>
               <a:t>2</a:t>
             </a:r>
             <a:r>
-              <a:rPr lang="en-US" sz="3600" dirty="0" smtClean="0">
+              <a:rPr lang="en-US" sz="3600" dirty="0">
                 <a:latin typeface="Helvetica" panose="020B0604020202020204" pitchFamily="34" charset="0"/>
                 <a:cs typeface="Helvetica" panose="020B0604020202020204" pitchFamily="34" charset="0"/>
               </a:rPr>
               <a:t>, </a:t>
             </a:r>
             <a:r>
-              <a:rPr lang="en-US" sz="3600" dirty="0" err="1" smtClean="0">
+              <a:rPr lang="en-US" sz="3600" dirty="0" err="1">
                 <a:latin typeface="Helvetica" panose="020B0604020202020204" pitchFamily="34" charset="0"/>
                 <a:cs typeface="Helvetica" panose="020B0604020202020204" pitchFamily="34" charset="0"/>
               </a:rPr>
               <a:t>Sujan</a:t>
             </a:r>
             <a:r>
-              <a:rPr lang="en-US" sz="3600" dirty="0" smtClean="0">
+              <a:rPr lang="en-US" sz="3600" dirty="0">
                 <a:latin typeface="Helvetica" panose="020B0604020202020204" pitchFamily="34" charset="0"/>
                 <a:cs typeface="Helvetica" panose="020B0604020202020204" pitchFamily="34" charset="0"/>
               </a:rPr>
               <a:t> Mamidi</a:t>
             </a:r>
             <a:r>
-              <a:rPr lang="en-US" sz="3600" baseline="30000" dirty="0" smtClean="0">
+              <a:rPr lang="en-US" sz="3600" baseline="30000" dirty="0">
                 <a:latin typeface="Helvetica" panose="020B0604020202020204" pitchFamily="34" charset="0"/>
                 <a:cs typeface="Helvetica" panose="020B0604020202020204" pitchFamily="34" charset="0"/>
               </a:rPr>
               <a:t>2</a:t>
             </a:r>
             <a:r>
-              <a:rPr lang="en-US" sz="3600" dirty="0" smtClean="0">
+              <a:rPr lang="en-US" sz="3600" dirty="0">
                 <a:latin typeface="Helvetica" panose="020B0604020202020204" pitchFamily="34" charset="0"/>
                 <a:cs typeface="Helvetica" panose="020B0604020202020204" pitchFamily="34" charset="0"/>
               </a:rPr>
               <a:t>, and Jeremy Schmutz</a:t>
             </a:r>
             <a:r>
-              <a:rPr lang="en-US" sz="3600" baseline="30000" dirty="0" smtClean="0">
+              <a:rPr lang="en-US" sz="3600" baseline="30000" dirty="0">
                 <a:latin typeface="Helvetica" panose="020B0604020202020204" pitchFamily="34" charset="0"/>
                 <a:cs typeface="Helvetica" panose="020B0604020202020204" pitchFamily="34" charset="0"/>
               </a:rPr>
@@ -3994,16 +3985,12 @@
           <a:lstStyle/>
           <a:p>
             <a:r>
-              <a:rPr lang="en-US" sz="3600" b="1" dirty="0" smtClean="0">
+              <a:rPr lang="en-US" sz="3600" b="1" dirty="0">
                 <a:latin typeface="Helvetica" panose="020B0604020202020204" pitchFamily="34" charset="0"/>
                 <a:cs typeface="Helvetica" panose="020B0604020202020204" pitchFamily="34" charset="0"/>
               </a:rPr>
               <a:t>DOE BER DESC0014156</a:t>
             </a:r>
-            <a:endParaRPr lang="en-US" sz="3600" b="1" dirty="0">
-              <a:latin typeface="Helvetica" panose="020B0604020202020204" pitchFamily="34" charset="0"/>
-              <a:cs typeface="Helvetica" panose="020B0604020202020204" pitchFamily="34" charset="0"/>
-            </a:endParaRPr>
           </a:p>
         </p:txBody>
       </p:sp>
@@ -4030,7 +4017,7 @@
           <a:lstStyle/>
           <a:p>
             <a:r>
-              <a:rPr lang="en-US" sz="3600" dirty="0" smtClean="0">
+              <a:rPr lang="en-US" sz="3600" dirty="0">
                 <a:latin typeface="Helvetica" panose="020B0604020202020204" pitchFamily="34" charset="0"/>
                 <a:cs typeface="Helvetica" panose="020B0604020202020204" pitchFamily="34" charset="0"/>
               </a:rPr>
@@ -4039,16 +4026,12 @@
           </a:p>
           <a:p>
             <a:r>
-              <a:rPr lang="en-US" sz="3600" dirty="0" smtClean="0">
+              <a:rPr lang="en-US" sz="3600" dirty="0">
                 <a:latin typeface="Helvetica" panose="020B0604020202020204" pitchFamily="34" charset="0"/>
                 <a:cs typeface="Helvetica" panose="020B0604020202020204" pitchFamily="34" charset="0"/>
               </a:rPr>
               <a:t>across continental scale environmental gradients’</a:t>
             </a:r>
-            <a:endParaRPr lang="en-US" sz="3600" dirty="0">
-              <a:latin typeface="Helvetica" panose="020B0604020202020204" pitchFamily="34" charset="0"/>
-              <a:cs typeface="Helvetica" panose="020B0604020202020204" pitchFamily="34" charset="0"/>
-            </a:endParaRPr>
           </a:p>
         </p:txBody>
       </p:sp>
@@ -4075,7 +4058,7 @@
           <a:lstStyle/>
           <a:p>
             <a:r>
-              <a:rPr lang="en-US" sz="4200" b="1" dirty="0" smtClean="0">
+              <a:rPr lang="en-US" sz="4200" b="1" dirty="0">
                 <a:solidFill>
                   <a:srgbClr val="262B70"/>
                 </a:solidFill>
@@ -4084,13 +4067,6 @@
               </a:rPr>
               <a:t>Take-home message</a:t>
             </a:r>
-            <a:endParaRPr lang="en-US" sz="4200" b="1" dirty="0">
-              <a:solidFill>
-                <a:srgbClr val="262B70"/>
-              </a:solidFill>
-              <a:latin typeface="Helvetica" panose="020B0604020202020204" pitchFamily="34" charset="0"/>
-              <a:cs typeface="Helvetica" panose="020B0604020202020204" pitchFamily="34" charset="0"/>
-            </a:endParaRPr>
           </a:p>
         </p:txBody>
       </p:sp>
@@ -4102,8 +4078,8 @@
         </p:nvSpPr>
         <p:spPr>
           <a:xfrm>
-            <a:off x="1454288" y="5879910"/>
-            <a:ext cx="13685991" cy="3708708"/>
+            <a:off x="1454288" y="5777040"/>
+            <a:ext cx="13900012" cy="4693593"/>
           </a:xfrm>
           <a:prstGeom prst="rect">
             <a:avLst/>
@@ -4117,114 +4093,75 @@
           <a:lstStyle/>
           <a:p>
             <a:r>
-              <a:rPr lang="en-US" sz="3200" b="1" dirty="0" smtClean="0">
+              <a:rPr lang="en-US" sz="3200" b="1" dirty="0">
                 <a:latin typeface="Helvetica" panose="020B0604020202020204" pitchFamily="34" charset="0"/>
                 <a:cs typeface="Helvetica" panose="020B0604020202020204" pitchFamily="34" charset="0"/>
               </a:rPr>
               <a:t>BIOFUELS: </a:t>
             </a:r>
             <a:r>
-              <a:rPr lang="en-US" sz="3200" dirty="0" smtClean="0">
+              <a:rPr lang="en-US" sz="3200" dirty="0">
                 <a:latin typeface="Helvetica" panose="020B0604020202020204" pitchFamily="34" charset="0"/>
                 <a:cs typeface="Helvetica" panose="020B0604020202020204" pitchFamily="34" charset="0"/>
               </a:rPr>
               <a:t>Switchgrass (</a:t>
             </a:r>
             <a:r>
-              <a:rPr lang="en-US" sz="3200" dirty="0" err="1" smtClean="0">
-                <a:latin typeface="Helvetica" panose="020B0604020202020204" pitchFamily="34" charset="0"/>
-                <a:cs typeface="Helvetica" panose="020B0604020202020204" pitchFamily="34" charset="0"/>
-              </a:rPr>
-              <a:t>Panicum</a:t>
-            </a:r>
-            <a:r>
-              <a:rPr lang="en-US" sz="3200" dirty="0" smtClean="0">
+              <a:rPr lang="en-US" sz="3200" i="1" dirty="0">
+                <a:latin typeface="Helvetica" panose="020B0604020202020204" pitchFamily="34" charset="0"/>
+                <a:cs typeface="Helvetica" panose="020B0604020202020204" pitchFamily="34" charset="0"/>
+              </a:rPr>
+              <a:t>Panicum virgatum</a:t>
+            </a:r>
+            <a:r>
+              <a:rPr lang="en-US" sz="3200" dirty="0">
+                <a:latin typeface="Helvetica" panose="020B0604020202020204" pitchFamily="34" charset="0"/>
+                <a:cs typeface="Helvetica" panose="020B0604020202020204" pitchFamily="34" charset="0"/>
+              </a:rPr>
+              <a:t>) is the model herbaceous</a:t>
+            </a:r>
+          </a:p>
+          <a:p>
+            <a:r>
+              <a:rPr lang="en-US" sz="3200" dirty="0">
+                <a:latin typeface="Helvetica" panose="020B0604020202020204" pitchFamily="34" charset="0"/>
+                <a:cs typeface="Helvetica" panose="020B0604020202020204" pitchFamily="34" charset="0"/>
+              </a:rPr>
+              <a:t>   bioenergy crop; it has high biomass yields and is productive on marginal</a:t>
+            </a:r>
+          </a:p>
+          <a:p>
+            <a:r>
+              <a:rPr lang="en-US" sz="3200" dirty="0">
+                <a:latin typeface="Helvetica" panose="020B0604020202020204" pitchFamily="34" charset="0"/>
+                <a:cs typeface="Helvetica" panose="020B0604020202020204" pitchFamily="34" charset="0"/>
+              </a:rPr>
+              <a:t>   lands; its ethanol yield can exceed that of maize on a per acre basis.</a:t>
+            </a:r>
+          </a:p>
+          <a:p>
+            <a:r>
+              <a:rPr lang="en-US" sz="1100" dirty="0">
                 <a:latin typeface="Helvetica" panose="020B0604020202020204" pitchFamily="34" charset="0"/>
                 <a:cs typeface="Helvetica" panose="020B0604020202020204" pitchFamily="34" charset="0"/>
               </a:rPr>
               <a:t> </a:t>
             </a:r>
-            <a:r>
-              <a:rPr lang="en-US" sz="3200" dirty="0" err="1" smtClean="0">
-                <a:latin typeface="Helvetica" panose="020B0604020202020204" pitchFamily="34" charset="0"/>
-                <a:cs typeface="Helvetica" panose="020B0604020202020204" pitchFamily="34" charset="0"/>
-              </a:rPr>
-              <a:t>virgatum</a:t>
-            </a:r>
-            <a:r>
-              <a:rPr lang="en-US" sz="3200" dirty="0" smtClean="0">
-                <a:latin typeface="Helvetica" panose="020B0604020202020204" pitchFamily="34" charset="0"/>
-                <a:cs typeface="Helvetica" panose="020B0604020202020204" pitchFamily="34" charset="0"/>
-              </a:rPr>
-              <a:t>) biomass can be effectively</a:t>
-            </a:r>
-          </a:p>
-          <a:p>
-            <a:r>
-              <a:rPr lang="en-US" sz="3200" dirty="0" smtClean="0">
-                <a:latin typeface="Helvetica" panose="020B0604020202020204" pitchFamily="34" charset="0"/>
-                <a:cs typeface="Helvetica" panose="020B0604020202020204" pitchFamily="34" charset="0"/>
-              </a:rPr>
-              <a:t>   converted into ethanol and other </a:t>
-            </a:r>
-            <a:r>
-              <a:rPr lang="en-US" sz="3200" dirty="0" err="1" smtClean="0">
-                <a:latin typeface="Helvetica" panose="020B0604020202020204" pitchFamily="34" charset="0"/>
-                <a:cs typeface="Helvetica" panose="020B0604020202020204" pitchFamily="34" charset="0"/>
-              </a:rPr>
-              <a:t>bioproducts</a:t>
-            </a:r>
-            <a:r>
-              <a:rPr lang="en-US" sz="3200" dirty="0" smtClean="0">
-                <a:latin typeface="Helvetica" panose="020B0604020202020204" pitchFamily="34" charset="0"/>
-                <a:cs typeface="Helvetica" panose="020B0604020202020204" pitchFamily="34" charset="0"/>
-              </a:rPr>
-              <a:t>; ethanol yield can exceed</a:t>
-            </a:r>
-          </a:p>
-          <a:p>
+          </a:p>
+          <a:p>
+            <a:r>
+              <a:rPr lang="en-US" sz="3200" b="1" dirty="0">
+                <a:latin typeface="Helvetica" panose="020B0604020202020204" pitchFamily="34" charset="0"/>
+                <a:cs typeface="Helvetica" panose="020B0604020202020204" pitchFamily="34" charset="0"/>
+              </a:rPr>
+              <a:t>CLIMATE ADAPTATION: </a:t>
+            </a:r>
             <a:r>
               <a:rPr lang="en-US" sz="3200" dirty="0">
                 <a:latin typeface="Helvetica" panose="020B0604020202020204" pitchFamily="34" charset="0"/>
                 <a:cs typeface="Helvetica" panose="020B0604020202020204" pitchFamily="34" charset="0"/>
               </a:rPr>
-              <a:t> </a:t>
-            </a:r>
-            <a:r>
-              <a:rPr lang="en-US" sz="3200" dirty="0" smtClean="0">
-                <a:latin typeface="Helvetica" panose="020B0604020202020204" pitchFamily="34" charset="0"/>
-                <a:cs typeface="Helvetica" panose="020B0604020202020204" pitchFamily="34" charset="0"/>
-              </a:rPr>
-              <a:t>  that of maize on a per acre basis.</a:t>
-            </a:r>
-          </a:p>
-          <a:p>
-            <a:r>
-              <a:rPr lang="en-US" sz="1100" dirty="0">
-                <a:latin typeface="Helvetica" panose="020B0604020202020204" pitchFamily="34" charset="0"/>
-                <a:cs typeface="Helvetica" panose="020B0604020202020204" pitchFamily="34" charset="0"/>
-              </a:rPr>
-              <a:t> </a:t>
-            </a:r>
-            <a:endParaRPr lang="en-US" sz="1100" dirty="0" smtClean="0">
-              <a:latin typeface="Helvetica" panose="020B0604020202020204" pitchFamily="34" charset="0"/>
-              <a:cs typeface="Helvetica" panose="020B0604020202020204" pitchFamily="34" charset="0"/>
-            </a:endParaRPr>
-          </a:p>
-          <a:p>
-            <a:r>
-              <a:rPr lang="en-US" sz="3200" b="1" dirty="0" smtClean="0">
-                <a:latin typeface="Helvetica" panose="020B0604020202020204" pitchFamily="34" charset="0"/>
-                <a:cs typeface="Helvetica" panose="020B0604020202020204" pitchFamily="34" charset="0"/>
-              </a:rPr>
-              <a:t>CLIMATE ADAPTATION: </a:t>
-            </a:r>
-            <a:r>
-              <a:rPr lang="en-US" sz="3200" dirty="0" smtClean="0">
-                <a:latin typeface="Helvetica" panose="020B0604020202020204" pitchFamily="34" charset="0"/>
-                <a:cs typeface="Helvetica" panose="020B0604020202020204" pitchFamily="34" charset="0"/>
-              </a:rPr>
-              <a:t>Natural switchgrass populations span &gt;3,000 km</a:t>
+              <a:t>Natural switchgrass populations are found across</a:t>
             </a:r>
           </a:p>
           <a:p>
@@ -4233,14 +4170,7 @@
                 <a:latin typeface="Helvetica" panose="020B0604020202020204" pitchFamily="34" charset="0"/>
                 <a:cs typeface="Helvetica" panose="020B0604020202020204" pitchFamily="34" charset="0"/>
               </a:rPr>
-              <a:t> </a:t>
-            </a:r>
-            <a:r>
-              <a:rPr lang="en-US" sz="3200" dirty="0" smtClean="0">
-                <a:latin typeface="Helvetica" panose="020B0604020202020204" pitchFamily="34" charset="0"/>
-                <a:cs typeface="Helvetica" panose="020B0604020202020204" pitchFamily="34" charset="0"/>
-              </a:rPr>
-              <a:t>  of latitude. Natural selection to climate has shaped the genetics of these</a:t>
+              <a:t>   North America east of the Rocky Mountains, and span eight USDA cold</a:t>
             </a:r>
           </a:p>
           <a:p>
@@ -4249,24 +4179,26 @@
                 <a:latin typeface="Helvetica" panose="020B0604020202020204" pitchFamily="34" charset="0"/>
                 <a:cs typeface="Helvetica" panose="020B0604020202020204" pitchFamily="34" charset="0"/>
               </a:rPr>
-              <a:t> </a:t>
-            </a:r>
-            <a:r>
-              <a:rPr lang="en-US" sz="3200" dirty="0" smtClean="0">
-                <a:latin typeface="Helvetica" panose="020B0604020202020204" pitchFamily="34" charset="0"/>
-                <a:cs typeface="Helvetica" panose="020B0604020202020204" pitchFamily="34" charset="0"/>
-              </a:rPr>
-              <a:t>  populations and shaped phenotypic groupings into </a:t>
-            </a:r>
-            <a:r>
-              <a:rPr lang="en-US" sz="3200" b="1" i="1" dirty="0" smtClean="0">
+              <a:t>   hardiness zones. Natural selection to climate has shaped the genetics of</a:t>
+            </a:r>
+          </a:p>
+          <a:p>
+            <a:r>
+              <a:rPr lang="en-US" sz="3200" dirty="0">
+                <a:latin typeface="Helvetica" panose="020B0604020202020204" pitchFamily="34" charset="0"/>
+                <a:cs typeface="Helvetica" panose="020B0604020202020204" pitchFamily="34" charset="0"/>
+              </a:rPr>
+              <a:t>   these populations and shaped phenotypic groupings into </a:t>
+            </a:r>
+            <a:r>
+              <a:rPr lang="en-US" sz="3200" b="1" i="1" dirty="0">
                 <a:latin typeface="Helvetica" panose="020B0604020202020204" pitchFamily="34" charset="0"/>
                 <a:cs typeface="Helvetica" panose="020B0604020202020204" pitchFamily="34" charset="0"/>
               </a:rPr>
               <a:t>upland</a:t>
             </a:r>
             <a:r>
-              <a:rPr lang="en-US" sz="3200" dirty="0" smtClean="0">
+              <a:rPr lang="en-US" sz="3200" dirty="0">
                 <a:latin typeface="Helvetica" panose="020B0604020202020204" pitchFamily="34" charset="0"/>
                 <a:cs typeface="Helvetica" panose="020B0604020202020204" pitchFamily="34" charset="0"/>
               </a:rPr>
@@ -4279,28 +4211,44 @@
                 <a:latin typeface="Helvetica" panose="020B0604020202020204" pitchFamily="34" charset="0"/>
                 <a:cs typeface="Helvetica" panose="020B0604020202020204" pitchFamily="34" charset="0"/>
               </a:rPr>
-              <a:t> </a:t>
-            </a:r>
-            <a:r>
-              <a:rPr lang="en-US" sz="3200" dirty="0" smtClean="0">
-                <a:latin typeface="Helvetica" panose="020B0604020202020204" pitchFamily="34" charset="0"/>
-                <a:cs typeface="Helvetica" panose="020B0604020202020204" pitchFamily="34" charset="0"/>
-              </a:rPr>
-              <a:t>  northern) and </a:t>
-            </a:r>
-            <a:r>
-              <a:rPr lang="en-US" sz="3200" b="1" i="1" dirty="0" smtClean="0">
+              <a:t>   northern), </a:t>
+            </a:r>
+            <a:r>
+              <a:rPr lang="en-US" sz="3200" b="1" i="1" dirty="0">
                 <a:latin typeface="Helvetica" panose="020B0604020202020204" pitchFamily="34" charset="0"/>
                 <a:cs typeface="Helvetica" panose="020B0604020202020204" pitchFamily="34" charset="0"/>
               </a:rPr>
               <a:t>lowland</a:t>
             </a:r>
             <a:r>
-              <a:rPr lang="en-US" sz="3200" dirty="0" smtClean="0">
-                <a:latin typeface="Helvetica" panose="020B0604020202020204" pitchFamily="34" charset="0"/>
-                <a:cs typeface="Helvetica" panose="020B0604020202020204" pitchFamily="34" charset="0"/>
-              </a:rPr>
-              <a:t> (mostly southern) ecotypes.</a:t>
+              <a:rPr lang="en-US" sz="3200" dirty="0">
+                <a:latin typeface="Helvetica" panose="020B0604020202020204" pitchFamily="34" charset="0"/>
+                <a:cs typeface="Helvetica" panose="020B0604020202020204" pitchFamily="34" charset="0"/>
+              </a:rPr>
+              <a:t> (mostly southern), and </a:t>
+            </a:r>
+            <a:r>
+              <a:rPr lang="en-US" sz="3200" b="1" i="1" dirty="0">
+                <a:latin typeface="Helvetica" panose="020B0604020202020204" pitchFamily="34" charset="0"/>
+                <a:cs typeface="Helvetica" panose="020B0604020202020204" pitchFamily="34" charset="0"/>
+              </a:rPr>
+              <a:t>coastal</a:t>
+            </a:r>
+            <a:r>
+              <a:rPr lang="en-US" sz="3200" dirty="0">
+                <a:latin typeface="Helvetica" panose="020B0604020202020204" pitchFamily="34" charset="0"/>
+                <a:cs typeface="Helvetica" panose="020B0604020202020204" pitchFamily="34" charset="0"/>
+              </a:rPr>
+              <a:t> ecotypes. These</a:t>
+            </a:r>
+          </a:p>
+          <a:p>
+            <a:r>
+              <a:rPr lang="en-US" sz="3200" dirty="0">
+                <a:latin typeface="Helvetica" panose="020B0604020202020204" pitchFamily="34" charset="0"/>
+                <a:cs typeface="Helvetica" panose="020B0604020202020204" pitchFamily="34" charset="0"/>
+              </a:rPr>
+              <a:t>   ecotypes likely have different adaptations to climate.</a:t>
             </a:r>
             <a:endParaRPr lang="en-US" sz="3200" b="1" dirty="0">
               <a:latin typeface="Helvetica" panose="020B0604020202020204" pitchFamily="34" charset="0"/>
@@ -4332,7 +4280,7 @@
           <a:lstStyle/>
           <a:p>
             <a:r>
-              <a:rPr lang="en-US" sz="4200" b="1" dirty="0" smtClean="0">
+              <a:rPr lang="en-US" sz="4200" b="1" dirty="0">
                 <a:solidFill>
                   <a:srgbClr val="262B70"/>
                 </a:solidFill>
@@ -4341,13 +4289,6 @@
               </a:rPr>
               <a:t>Why Switchgrass?</a:t>
             </a:r>
-            <a:endParaRPr lang="en-US" sz="4200" b="1" dirty="0">
-              <a:solidFill>
-                <a:srgbClr val="262B70"/>
-              </a:solidFill>
-              <a:latin typeface="Helvetica" panose="020B0604020202020204" pitchFamily="34" charset="0"/>
-              <a:cs typeface="Helvetica" panose="020B0604020202020204" pitchFamily="34" charset="0"/>
-            </a:endParaRPr>
           </a:p>
         </p:txBody>
       </p:sp>
@@ -4434,7 +4375,7 @@
           <a:lstStyle/>
           <a:p>
             <a:r>
-              <a:rPr lang="en-US" sz="2500" dirty="0" smtClean="0">
+              <a:rPr lang="en-US" sz="2500" dirty="0">
                 <a:latin typeface="Helvetica" panose="020B0604020202020204" pitchFamily="34" charset="0"/>
                 <a:cs typeface="Helvetica" panose="020B0604020202020204" pitchFamily="34" charset="0"/>
               </a:rPr>
@@ -4443,21 +4384,21 @@
           </a:p>
           <a:p>
             <a:r>
-              <a:rPr lang="en-US" sz="2500" dirty="0" smtClean="0">
+              <a:rPr lang="en-US" sz="2500" dirty="0">
                 <a:latin typeface="Helvetica" panose="020B0604020202020204" pitchFamily="34" charset="0"/>
                 <a:cs typeface="Helvetica" panose="020B0604020202020204" pitchFamily="34" charset="0"/>
               </a:rPr>
               <a:t>2: </a:t>
             </a:r>
             <a:r>
-              <a:rPr lang="en-US" sz="2500" dirty="0" err="1" smtClean="0">
+              <a:rPr lang="en-US" sz="2500" dirty="0" err="1">
                 <a:latin typeface="Helvetica" panose="020B0604020202020204" pitchFamily="34" charset="0"/>
                 <a:cs typeface="Helvetica" panose="020B0604020202020204" pitchFamily="34" charset="0"/>
               </a:rPr>
               <a:t>HudsonAlpha</a:t>
             </a:r>
             <a:r>
-              <a:rPr lang="en-US" sz="2500" dirty="0" smtClean="0">
+              <a:rPr lang="en-US" sz="2500" dirty="0">
                 <a:latin typeface="Helvetica" panose="020B0604020202020204" pitchFamily="34" charset="0"/>
                 <a:cs typeface="Helvetica" panose="020B0604020202020204" pitchFamily="34" charset="0"/>
               </a:rPr>
@@ -4466,11 +4407,327 @@
           </a:p>
           <a:p>
             <a:r>
-              <a:rPr lang="en-US" sz="2500" dirty="0" smtClean="0">
+              <a:rPr lang="en-US" sz="2500" dirty="0">
                 <a:latin typeface="Helvetica" panose="020B0604020202020204" pitchFamily="34" charset="0"/>
                 <a:cs typeface="Helvetica" panose="020B0604020202020204" pitchFamily="34" charset="0"/>
               </a:rPr>
               <a:t>and Joint Genome Institute</a:t>
+            </a:r>
+          </a:p>
+        </p:txBody>
+      </p:sp>
+      <p:sp>
+        <p:nvSpPr>
+          <p:cNvPr id="32" name="TextBox 31"/>
+          <p:cNvSpPr txBox="1"/>
+          <p:nvPr/>
+        </p:nvSpPr>
+        <p:spPr>
+          <a:xfrm>
+            <a:off x="30849082" y="6853550"/>
+            <a:ext cx="6870022" cy="3939540"/>
+          </a:xfrm>
+          <a:prstGeom prst="rect">
+            <a:avLst/>
+          </a:prstGeom>
+          <a:noFill/>
+        </p:spPr>
+        <p:txBody>
+          <a:bodyPr wrap="none" rtlCol="0">
+            <a:spAutoFit/>
+          </a:bodyPr>
+          <a:lstStyle/>
+          <a:p>
+            <a:r>
+              <a:rPr lang="en-US" sz="2500" dirty="0">
+                <a:latin typeface="Helvetica" panose="020B0604020202020204" pitchFamily="34" charset="0"/>
+                <a:cs typeface="Helvetica" panose="020B0604020202020204" pitchFamily="34" charset="0"/>
+              </a:rPr>
+              <a:t>*Presenting Author</a:t>
+            </a:r>
+          </a:p>
+          <a:p>
+            <a:r>
+              <a:rPr lang="en-US" sz="2500" dirty="0">
+                <a:latin typeface="Helvetica" panose="020B0604020202020204" pitchFamily="34" charset="0"/>
+                <a:cs typeface="Helvetica" panose="020B0604020202020204" pitchFamily="34" charset="0"/>
+              </a:rPr>
+              <a:t>**Switchgrass genomics team members: </a:t>
+            </a:r>
+          </a:p>
+          <a:p>
+            <a:r>
+              <a:rPr lang="en-US" sz="2500" dirty="0">
+                <a:latin typeface="Helvetica" panose="020B0604020202020204" pitchFamily="34" charset="0"/>
+                <a:cs typeface="Helvetica" panose="020B0604020202020204" pitchFamily="34" charset="0"/>
+              </a:rPr>
+              <a:t>Jerry Jenkins, Chris </a:t>
+            </a:r>
+            <a:r>
+              <a:rPr lang="en-US" sz="2500" dirty="0" err="1">
+                <a:latin typeface="Helvetica" panose="020B0604020202020204" pitchFamily="34" charset="0"/>
+                <a:cs typeface="Helvetica" panose="020B0604020202020204" pitchFamily="34" charset="0"/>
+              </a:rPr>
+              <a:t>Plott</a:t>
+            </a:r>
+            <a:r>
+              <a:rPr lang="en-US" sz="2500" dirty="0">
+                <a:latin typeface="Helvetica" panose="020B0604020202020204" pitchFamily="34" charset="0"/>
+                <a:cs typeface="Helvetica" panose="020B0604020202020204" pitchFamily="34" charset="0"/>
+              </a:rPr>
+              <a:t>, </a:t>
+            </a:r>
+            <a:r>
+              <a:rPr lang="en-US" sz="2500" dirty="0" err="1">
+                <a:latin typeface="Helvetica" panose="020B0604020202020204" pitchFamily="34" charset="0"/>
+                <a:cs typeface="Helvetica" panose="020B0604020202020204" pitchFamily="34" charset="0"/>
+              </a:rPr>
+              <a:t>Shengqiang</a:t>
+            </a:r>
+            <a:r>
+              <a:rPr lang="en-US" sz="2500" dirty="0">
+                <a:latin typeface="Helvetica" panose="020B0604020202020204" pitchFamily="34" charset="0"/>
+                <a:cs typeface="Helvetica" panose="020B0604020202020204" pitchFamily="34" charset="0"/>
+              </a:rPr>
+              <a:t> Shu, </a:t>
+            </a:r>
+          </a:p>
+          <a:p>
+            <a:r>
+              <a:rPr lang="en-US" sz="2500" dirty="0" err="1">
+                <a:latin typeface="Helvetica" panose="020B0604020202020204" pitchFamily="34" charset="0"/>
+                <a:cs typeface="Helvetica" panose="020B0604020202020204" pitchFamily="34" charset="0"/>
+              </a:rPr>
+              <a:t>Avinash</a:t>
+            </a:r>
+            <a:r>
+              <a:rPr lang="en-US" sz="2500" dirty="0">
+                <a:latin typeface="Helvetica" panose="020B0604020202020204" pitchFamily="34" charset="0"/>
+                <a:cs typeface="Helvetica" panose="020B0604020202020204" pitchFamily="34" charset="0"/>
+              </a:rPr>
+              <a:t> </a:t>
+            </a:r>
+            <a:r>
+              <a:rPr lang="en-US" sz="2500" dirty="0" err="1">
+                <a:latin typeface="Helvetica" panose="020B0604020202020204" pitchFamily="34" charset="0"/>
+                <a:cs typeface="Helvetica" panose="020B0604020202020204" pitchFamily="34" charset="0"/>
+              </a:rPr>
+              <a:t>Sreedasyam</a:t>
+            </a:r>
+            <a:r>
+              <a:rPr lang="en-US" sz="2500" dirty="0">
+                <a:latin typeface="Helvetica" panose="020B0604020202020204" pitchFamily="34" charset="0"/>
+                <a:cs typeface="Helvetica" panose="020B0604020202020204" pitchFamily="34" charset="0"/>
+              </a:rPr>
+              <a:t>, Adam Healey, Li Zhang, </a:t>
+            </a:r>
+          </a:p>
+          <a:p>
+            <a:r>
+              <a:rPr lang="en-US" sz="2500" dirty="0">
+                <a:latin typeface="Helvetica" panose="020B0604020202020204" pitchFamily="34" charset="0"/>
+                <a:cs typeface="Helvetica" panose="020B0604020202020204" pitchFamily="34" charset="0"/>
+              </a:rPr>
+              <a:t>Taslima </a:t>
+            </a:r>
+            <a:r>
+              <a:rPr lang="en-US" sz="2500" dirty="0" err="1">
+                <a:latin typeface="Helvetica" panose="020B0604020202020204" pitchFamily="34" charset="0"/>
+                <a:cs typeface="Helvetica" panose="020B0604020202020204" pitchFamily="34" charset="0"/>
+              </a:rPr>
+              <a:t>Haque</a:t>
+            </a:r>
+            <a:r>
+              <a:rPr lang="en-US" sz="2500" dirty="0">
+                <a:latin typeface="Helvetica" panose="020B0604020202020204" pitchFamily="34" charset="0"/>
+                <a:cs typeface="Helvetica" panose="020B0604020202020204" pitchFamily="34" charset="0"/>
+              </a:rPr>
+              <a:t>, Joe Napier, Adam Session, </a:t>
+            </a:r>
+          </a:p>
+          <a:p>
+            <a:r>
+              <a:rPr lang="en-US" sz="2500" dirty="0">
+                <a:latin typeface="Helvetica" panose="020B0604020202020204" pitchFamily="34" charset="0"/>
+                <a:cs typeface="Helvetica" panose="020B0604020202020204" pitchFamily="34" charset="0"/>
+              </a:rPr>
+              <a:t>Michael </a:t>
+            </a:r>
+            <a:r>
+              <a:rPr lang="en-US" sz="2500" dirty="0" err="1">
+                <a:latin typeface="Helvetica" panose="020B0604020202020204" pitchFamily="34" charset="0"/>
+                <a:cs typeface="Helvetica" panose="020B0604020202020204" pitchFamily="34" charset="0"/>
+              </a:rPr>
+              <a:t>Udvardi</a:t>
+            </a:r>
+            <a:r>
+              <a:rPr lang="en-US" sz="2500" dirty="0">
+                <a:latin typeface="Helvetica" panose="020B0604020202020204" pitchFamily="34" charset="0"/>
+                <a:cs typeface="Helvetica" panose="020B0604020202020204" pitchFamily="34" charset="0"/>
+              </a:rPr>
+              <a:t>, Malay </a:t>
+            </a:r>
+            <a:r>
+              <a:rPr lang="en-US" sz="2500" dirty="0" err="1">
+                <a:latin typeface="Helvetica" panose="020B0604020202020204" pitchFamily="34" charset="0"/>
+                <a:cs typeface="Helvetica" panose="020B0604020202020204" pitchFamily="34" charset="0"/>
+              </a:rPr>
+              <a:t>Saha</a:t>
+            </a:r>
+            <a:r>
+              <a:rPr lang="en-US" sz="2500" dirty="0">
+                <a:latin typeface="Helvetica" panose="020B0604020202020204" pitchFamily="34" charset="0"/>
+                <a:cs typeface="Helvetica" panose="020B0604020202020204" pitchFamily="34" charset="0"/>
+              </a:rPr>
+              <a:t>, </a:t>
+            </a:r>
+            <a:r>
+              <a:rPr lang="en-US" sz="2500" dirty="0" err="1">
+                <a:latin typeface="Helvetica" panose="020B0604020202020204" pitchFamily="34" charset="0"/>
+                <a:cs typeface="Helvetica" panose="020B0604020202020204" pitchFamily="34" charset="0"/>
+              </a:rPr>
+              <a:t>Yuhong</a:t>
+            </a:r>
+            <a:r>
+              <a:rPr lang="en-US" sz="2500" dirty="0">
+                <a:latin typeface="Helvetica" panose="020B0604020202020204" pitchFamily="34" charset="0"/>
+                <a:cs typeface="Helvetica" panose="020B0604020202020204" pitchFamily="34" charset="0"/>
+              </a:rPr>
+              <a:t> Tang, </a:t>
+            </a:r>
+          </a:p>
+          <a:p>
+            <a:r>
+              <a:rPr lang="en-US" sz="2500" dirty="0">
+                <a:latin typeface="Helvetica" panose="020B0604020202020204" pitchFamily="34" charset="0"/>
+                <a:cs typeface="Helvetica" panose="020B0604020202020204" pitchFamily="34" charset="0"/>
+              </a:rPr>
+              <a:t>Laura Bartley, </a:t>
+            </a:r>
+            <a:r>
+              <a:rPr lang="en-US" sz="2500" dirty="0" err="1">
+                <a:latin typeface="Helvetica" panose="020B0604020202020204" pitchFamily="34" charset="0"/>
+                <a:cs typeface="Helvetica" panose="020B0604020202020204" pitchFamily="34" charset="0"/>
+              </a:rPr>
+              <a:t>Katrien</a:t>
+            </a:r>
+            <a:r>
+              <a:rPr lang="en-US" sz="2500" dirty="0">
+                <a:latin typeface="Helvetica" panose="020B0604020202020204" pitchFamily="34" charset="0"/>
+                <a:cs typeface="Helvetica" panose="020B0604020202020204" pitchFamily="34" charset="0"/>
+              </a:rPr>
+              <a:t> </a:t>
+            </a:r>
+            <a:r>
+              <a:rPr lang="en-US" sz="2500" dirty="0" err="1">
+                <a:latin typeface="Helvetica" panose="020B0604020202020204" pitchFamily="34" charset="0"/>
+                <a:cs typeface="Helvetica" panose="020B0604020202020204" pitchFamily="34" charset="0"/>
+              </a:rPr>
+              <a:t>Devos</a:t>
+            </a:r>
+            <a:r>
+              <a:rPr lang="en-US" sz="2500" dirty="0">
+                <a:latin typeface="Helvetica" panose="020B0604020202020204" pitchFamily="34" charset="0"/>
+                <a:cs typeface="Helvetica" panose="020B0604020202020204" pitchFamily="34" charset="0"/>
+              </a:rPr>
+              <a:t>, Michael </a:t>
+            </a:r>
+            <a:r>
+              <a:rPr lang="en-US" sz="2500" dirty="0" err="1">
+                <a:latin typeface="Helvetica" panose="020B0604020202020204" pitchFamily="34" charset="0"/>
+                <a:cs typeface="Helvetica" panose="020B0604020202020204" pitchFamily="34" charset="0"/>
+              </a:rPr>
+              <a:t>Casler</a:t>
+            </a:r>
+            <a:r>
+              <a:rPr lang="en-US" sz="2500" dirty="0">
+                <a:latin typeface="Helvetica" panose="020B0604020202020204" pitchFamily="34" charset="0"/>
+                <a:cs typeface="Helvetica" panose="020B0604020202020204" pitchFamily="34" charset="0"/>
+              </a:rPr>
+              <a:t>, </a:t>
+            </a:r>
+          </a:p>
+          <a:p>
+            <a:r>
+              <a:rPr lang="en-US" sz="2500" dirty="0" err="1">
+                <a:latin typeface="Helvetica" panose="020B0604020202020204" pitchFamily="34" charset="0"/>
+                <a:cs typeface="Helvetica" panose="020B0604020202020204" pitchFamily="34" charset="0"/>
+              </a:rPr>
+              <a:t>Jiming</a:t>
+            </a:r>
+            <a:r>
+              <a:rPr lang="en-US" sz="2500" dirty="0">
+                <a:latin typeface="Helvetica" panose="020B0604020202020204" pitchFamily="34" charset="0"/>
+                <a:cs typeface="Helvetica" panose="020B0604020202020204" pitchFamily="34" charset="0"/>
+              </a:rPr>
+              <a:t> Jiang, David Lowry, </a:t>
+            </a:r>
+            <a:r>
+              <a:rPr lang="en-US" sz="2500" dirty="0" err="1">
+                <a:latin typeface="Helvetica" panose="020B0604020202020204" pitchFamily="34" charset="0"/>
+                <a:cs typeface="Helvetica" panose="020B0604020202020204" pitchFamily="34" charset="0"/>
+              </a:rPr>
+              <a:t>Guohong</a:t>
+            </a:r>
+            <a:r>
+              <a:rPr lang="en-US" sz="2500" dirty="0">
+                <a:latin typeface="Helvetica" panose="020B0604020202020204" pitchFamily="34" charset="0"/>
+                <a:cs typeface="Helvetica" panose="020B0604020202020204" pitchFamily="34" charset="0"/>
+              </a:rPr>
+              <a:t> Wu, </a:t>
+            </a:r>
+          </a:p>
+          <a:p>
+            <a:r>
+              <a:rPr lang="en-US" sz="2500" dirty="0">
+                <a:latin typeface="Helvetica" panose="020B0604020202020204" pitchFamily="34" charset="0"/>
+                <a:cs typeface="Helvetica" panose="020B0604020202020204" pitchFamily="34" charset="0"/>
+              </a:rPr>
+              <a:t>David </a:t>
+            </a:r>
+            <a:r>
+              <a:rPr lang="en-US" sz="2500" dirty="0" err="1">
+                <a:latin typeface="Helvetica" panose="020B0604020202020204" pitchFamily="34" charset="0"/>
+                <a:cs typeface="Helvetica" panose="020B0604020202020204" pitchFamily="34" charset="0"/>
+              </a:rPr>
+              <a:t>Kudma</a:t>
+            </a:r>
+            <a:r>
+              <a:rPr lang="en-US" sz="2500" dirty="0">
+                <a:latin typeface="Helvetica" panose="020B0604020202020204" pitchFamily="34" charset="0"/>
+                <a:cs typeface="Helvetica" panose="020B0604020202020204" pitchFamily="34" charset="0"/>
+              </a:rPr>
+              <a:t>, Kerrie Barry, Jane </a:t>
+            </a:r>
+            <a:r>
+              <a:rPr lang="en-US" sz="2500" dirty="0" err="1">
+                <a:latin typeface="Helvetica" panose="020B0604020202020204" pitchFamily="34" charset="0"/>
+                <a:cs typeface="Helvetica" panose="020B0604020202020204" pitchFamily="34" charset="0"/>
+              </a:rPr>
+              <a:t>Grimwood</a:t>
+            </a:r>
+            <a:r>
+              <a:rPr lang="en-US" sz="2500" dirty="0">
+                <a:latin typeface="Helvetica" panose="020B0604020202020204" pitchFamily="34" charset="0"/>
+                <a:cs typeface="Helvetica" panose="020B0604020202020204" pitchFamily="34" charset="0"/>
+              </a:rPr>
+              <a:t>, </a:t>
+            </a:r>
+          </a:p>
+          <a:p>
+            <a:r>
+              <a:rPr lang="en-US" sz="2500" dirty="0">
+                <a:latin typeface="Helvetica" panose="020B0604020202020204" pitchFamily="34" charset="0"/>
+                <a:cs typeface="Helvetica" panose="020B0604020202020204" pitchFamily="34" charset="0"/>
+              </a:rPr>
+              <a:t>Dan </a:t>
+            </a:r>
+            <a:r>
+              <a:rPr lang="en-US" sz="2500" dirty="0" err="1">
+                <a:latin typeface="Helvetica" panose="020B0604020202020204" pitchFamily="34" charset="0"/>
+                <a:cs typeface="Helvetica" panose="020B0604020202020204" pitchFamily="34" charset="0"/>
+              </a:rPr>
+              <a:t>Rohksar</a:t>
             </a:r>
             <a:endParaRPr lang="en-US" sz="2500" dirty="0">
               <a:latin typeface="Helvetica" panose="020B0604020202020204" pitchFamily="34" charset="0"/>
@@ -4481,57 +4738,14 @@
       </p:sp>
       <p:sp>
         <p:nvSpPr>
-          <p:cNvPr id="15" name="TextBox 14"/>
+          <p:cNvPr id="36" name="TextBox 35"/>
           <p:cNvSpPr txBox="1"/>
           <p:nvPr/>
         </p:nvSpPr>
         <p:spPr>
           <a:xfrm>
-            <a:off x="16263453" y="16568308"/>
-            <a:ext cx="9194604" cy="523220"/>
-          </a:xfrm>
-          <a:prstGeom prst="rect">
-            <a:avLst/>
-          </a:prstGeom>
-          <a:noFill/>
-        </p:spPr>
-        <p:txBody>
-          <a:bodyPr wrap="square" rtlCol="0">
-            <a:spAutoFit/>
-          </a:bodyPr>
-          <a:lstStyle/>
-          <a:p>
-            <a:r>
-              <a:rPr lang="en-US" sz="2800" b="1" dirty="0" smtClean="0">
-                <a:latin typeface="Helvetica" panose="020B0604020202020204" pitchFamily="34" charset="0"/>
-                <a:cs typeface="Helvetica" panose="020B0604020202020204" pitchFamily="34" charset="0"/>
-              </a:rPr>
-              <a:t>A </a:t>
-            </a:r>
-            <a:r>
-              <a:rPr lang="en-US" sz="2500" i="1" dirty="0" smtClean="0">
-                <a:latin typeface="Helvetica" panose="020B0604020202020204" pitchFamily="34" charset="0"/>
-                <a:cs typeface="Helvetica" panose="020B0604020202020204" pitchFamily="34" charset="0"/>
-              </a:rPr>
-              <a:t>Associations for BIO5, Max Temperature of Warmest Month</a:t>
-            </a:r>
-            <a:endParaRPr lang="en-US" sz="2500" i="1" dirty="0">
-              <a:latin typeface="Helvetica" panose="020B0604020202020204" pitchFamily="34" charset="0"/>
-              <a:cs typeface="Helvetica" panose="020B0604020202020204" pitchFamily="34" charset="0"/>
-            </a:endParaRPr>
-          </a:p>
-        </p:txBody>
-      </p:sp>
-      <p:sp>
-        <p:nvSpPr>
-          <p:cNvPr id="32" name="TextBox 31"/>
-          <p:cNvSpPr txBox="1"/>
-          <p:nvPr/>
-        </p:nvSpPr>
-        <p:spPr>
-          <a:xfrm>
-            <a:off x="30849082" y="6853550"/>
-            <a:ext cx="6870022" cy="3939540"/>
+            <a:off x="16159065" y="4927831"/>
+            <a:ext cx="2460930" cy="1384995"/>
           </a:xfrm>
           <a:prstGeom prst="rect">
             <a:avLst/>
@@ -4545,313 +4759,40 @@
           <a:lstStyle/>
           <a:p>
             <a:r>
-              <a:rPr lang="en-US" sz="2500" dirty="0" smtClean="0">
-                <a:latin typeface="Helvetica" panose="020B0604020202020204" pitchFamily="34" charset="0"/>
-                <a:cs typeface="Helvetica" panose="020B0604020202020204" pitchFamily="34" charset="0"/>
-              </a:rPr>
-              <a:t>*Presenting Author</a:t>
-            </a:r>
-          </a:p>
-          <a:p>
-            <a:r>
-              <a:rPr lang="en-US" sz="2500" dirty="0" smtClean="0">
-                <a:latin typeface="Helvetica" panose="020B0604020202020204" pitchFamily="34" charset="0"/>
-                <a:cs typeface="Helvetica" panose="020B0604020202020204" pitchFamily="34" charset="0"/>
-              </a:rPr>
-              <a:t>**Switchgrass genomics team members: </a:t>
-            </a:r>
-          </a:p>
-          <a:p>
-            <a:r>
-              <a:rPr lang="en-US" sz="2500" dirty="0" smtClean="0">
-                <a:latin typeface="Helvetica" panose="020B0604020202020204" pitchFamily="34" charset="0"/>
-                <a:cs typeface="Helvetica" panose="020B0604020202020204" pitchFamily="34" charset="0"/>
-              </a:rPr>
-              <a:t>Jerry Jenkins, Chris </a:t>
-            </a:r>
-            <a:r>
-              <a:rPr lang="en-US" sz="2500" dirty="0" err="1" smtClean="0">
-                <a:latin typeface="Helvetica" panose="020B0604020202020204" pitchFamily="34" charset="0"/>
-                <a:cs typeface="Helvetica" panose="020B0604020202020204" pitchFamily="34" charset="0"/>
-              </a:rPr>
-              <a:t>Plott</a:t>
-            </a:r>
-            <a:r>
-              <a:rPr lang="en-US" sz="2500" dirty="0" smtClean="0">
-                <a:latin typeface="Helvetica" panose="020B0604020202020204" pitchFamily="34" charset="0"/>
-                <a:cs typeface="Helvetica" panose="020B0604020202020204" pitchFamily="34" charset="0"/>
-              </a:rPr>
-              <a:t>, </a:t>
-            </a:r>
-            <a:r>
-              <a:rPr lang="en-US" sz="2500" dirty="0" err="1" smtClean="0">
-                <a:latin typeface="Helvetica" panose="020B0604020202020204" pitchFamily="34" charset="0"/>
-                <a:cs typeface="Helvetica" panose="020B0604020202020204" pitchFamily="34" charset="0"/>
-              </a:rPr>
-              <a:t>Shengqiang</a:t>
-            </a:r>
-            <a:r>
-              <a:rPr lang="en-US" sz="2500" dirty="0" smtClean="0">
-                <a:latin typeface="Helvetica" panose="020B0604020202020204" pitchFamily="34" charset="0"/>
-                <a:cs typeface="Helvetica" panose="020B0604020202020204" pitchFamily="34" charset="0"/>
-              </a:rPr>
-              <a:t> Shu, </a:t>
-            </a:r>
-          </a:p>
-          <a:p>
-            <a:r>
-              <a:rPr lang="en-US" sz="2500" dirty="0" err="1" smtClean="0">
-                <a:latin typeface="Helvetica" panose="020B0604020202020204" pitchFamily="34" charset="0"/>
-                <a:cs typeface="Helvetica" panose="020B0604020202020204" pitchFamily="34" charset="0"/>
-              </a:rPr>
-              <a:t>Avinash</a:t>
-            </a:r>
-            <a:r>
-              <a:rPr lang="en-US" sz="2500" dirty="0" smtClean="0">
-                <a:latin typeface="Helvetica" panose="020B0604020202020204" pitchFamily="34" charset="0"/>
-                <a:cs typeface="Helvetica" panose="020B0604020202020204" pitchFamily="34" charset="0"/>
-              </a:rPr>
-              <a:t> </a:t>
-            </a:r>
-            <a:r>
-              <a:rPr lang="en-US" sz="2500" dirty="0" err="1" smtClean="0">
-                <a:latin typeface="Helvetica" panose="020B0604020202020204" pitchFamily="34" charset="0"/>
-                <a:cs typeface="Helvetica" panose="020B0604020202020204" pitchFamily="34" charset="0"/>
-              </a:rPr>
-              <a:t>Sreedasyam</a:t>
-            </a:r>
-            <a:r>
-              <a:rPr lang="en-US" sz="2500" dirty="0" smtClean="0">
-                <a:latin typeface="Helvetica" panose="020B0604020202020204" pitchFamily="34" charset="0"/>
-                <a:cs typeface="Helvetica" panose="020B0604020202020204" pitchFamily="34" charset="0"/>
-              </a:rPr>
-              <a:t>, Adam Healey, Li Zhang, </a:t>
-            </a:r>
-          </a:p>
-          <a:p>
-            <a:r>
-              <a:rPr lang="en-US" sz="2500" dirty="0" smtClean="0">
-                <a:latin typeface="Helvetica" panose="020B0604020202020204" pitchFamily="34" charset="0"/>
-                <a:cs typeface="Helvetica" panose="020B0604020202020204" pitchFamily="34" charset="0"/>
-              </a:rPr>
-              <a:t>Taslima </a:t>
-            </a:r>
-            <a:r>
-              <a:rPr lang="en-US" sz="2500" dirty="0" err="1" smtClean="0">
-                <a:latin typeface="Helvetica" panose="020B0604020202020204" pitchFamily="34" charset="0"/>
-                <a:cs typeface="Helvetica" panose="020B0604020202020204" pitchFamily="34" charset="0"/>
-              </a:rPr>
-              <a:t>Haque</a:t>
-            </a:r>
-            <a:r>
-              <a:rPr lang="en-US" sz="2500" dirty="0" smtClean="0">
-                <a:latin typeface="Helvetica" panose="020B0604020202020204" pitchFamily="34" charset="0"/>
-                <a:cs typeface="Helvetica" panose="020B0604020202020204" pitchFamily="34" charset="0"/>
-              </a:rPr>
-              <a:t>, Joe Napier, Adam Session, </a:t>
-            </a:r>
-          </a:p>
-          <a:p>
-            <a:r>
-              <a:rPr lang="en-US" sz="2500" dirty="0" smtClean="0">
-                <a:latin typeface="Helvetica" panose="020B0604020202020204" pitchFamily="34" charset="0"/>
-                <a:cs typeface="Helvetica" panose="020B0604020202020204" pitchFamily="34" charset="0"/>
-              </a:rPr>
-              <a:t>Michael </a:t>
-            </a:r>
-            <a:r>
-              <a:rPr lang="en-US" sz="2500" dirty="0" err="1" smtClean="0">
-                <a:latin typeface="Helvetica" panose="020B0604020202020204" pitchFamily="34" charset="0"/>
-                <a:cs typeface="Helvetica" panose="020B0604020202020204" pitchFamily="34" charset="0"/>
-              </a:rPr>
-              <a:t>Udvardi</a:t>
-            </a:r>
-            <a:r>
-              <a:rPr lang="en-US" sz="2500" dirty="0" smtClean="0">
-                <a:latin typeface="Helvetica" panose="020B0604020202020204" pitchFamily="34" charset="0"/>
-                <a:cs typeface="Helvetica" panose="020B0604020202020204" pitchFamily="34" charset="0"/>
-              </a:rPr>
-              <a:t>, Malay </a:t>
-            </a:r>
-            <a:r>
-              <a:rPr lang="en-US" sz="2500" dirty="0" err="1" smtClean="0">
-                <a:latin typeface="Helvetica" panose="020B0604020202020204" pitchFamily="34" charset="0"/>
-                <a:cs typeface="Helvetica" panose="020B0604020202020204" pitchFamily="34" charset="0"/>
-              </a:rPr>
-              <a:t>Saha</a:t>
-            </a:r>
-            <a:r>
-              <a:rPr lang="en-US" sz="2500" dirty="0" smtClean="0">
-                <a:latin typeface="Helvetica" panose="020B0604020202020204" pitchFamily="34" charset="0"/>
-                <a:cs typeface="Helvetica" panose="020B0604020202020204" pitchFamily="34" charset="0"/>
-              </a:rPr>
-              <a:t>, </a:t>
-            </a:r>
-            <a:r>
-              <a:rPr lang="en-US" sz="2500" dirty="0" err="1" smtClean="0">
-                <a:latin typeface="Helvetica" panose="020B0604020202020204" pitchFamily="34" charset="0"/>
-                <a:cs typeface="Helvetica" panose="020B0604020202020204" pitchFamily="34" charset="0"/>
-              </a:rPr>
-              <a:t>Yuhong</a:t>
-            </a:r>
-            <a:r>
-              <a:rPr lang="en-US" sz="2500" dirty="0" smtClean="0">
-                <a:latin typeface="Helvetica" panose="020B0604020202020204" pitchFamily="34" charset="0"/>
-                <a:cs typeface="Helvetica" panose="020B0604020202020204" pitchFamily="34" charset="0"/>
-              </a:rPr>
-              <a:t> Tang, </a:t>
-            </a:r>
-          </a:p>
-          <a:p>
-            <a:r>
-              <a:rPr lang="en-US" sz="2500" dirty="0" smtClean="0">
-                <a:latin typeface="Helvetica" panose="020B0604020202020204" pitchFamily="34" charset="0"/>
-                <a:cs typeface="Helvetica" panose="020B0604020202020204" pitchFamily="34" charset="0"/>
-              </a:rPr>
-              <a:t>Laura Bartley, </a:t>
-            </a:r>
-            <a:r>
-              <a:rPr lang="en-US" sz="2500" dirty="0" err="1" smtClean="0">
-                <a:latin typeface="Helvetica" panose="020B0604020202020204" pitchFamily="34" charset="0"/>
-                <a:cs typeface="Helvetica" panose="020B0604020202020204" pitchFamily="34" charset="0"/>
-              </a:rPr>
-              <a:t>Katrien</a:t>
-            </a:r>
-            <a:r>
-              <a:rPr lang="en-US" sz="2500" dirty="0" smtClean="0">
-                <a:latin typeface="Helvetica" panose="020B0604020202020204" pitchFamily="34" charset="0"/>
-                <a:cs typeface="Helvetica" panose="020B0604020202020204" pitchFamily="34" charset="0"/>
-              </a:rPr>
-              <a:t> </a:t>
-            </a:r>
-            <a:r>
-              <a:rPr lang="en-US" sz="2500" dirty="0" err="1" smtClean="0">
-                <a:latin typeface="Helvetica" panose="020B0604020202020204" pitchFamily="34" charset="0"/>
-                <a:cs typeface="Helvetica" panose="020B0604020202020204" pitchFamily="34" charset="0"/>
-              </a:rPr>
-              <a:t>Devos</a:t>
-            </a:r>
-            <a:r>
-              <a:rPr lang="en-US" sz="2500" dirty="0" smtClean="0">
-                <a:latin typeface="Helvetica" panose="020B0604020202020204" pitchFamily="34" charset="0"/>
-                <a:cs typeface="Helvetica" panose="020B0604020202020204" pitchFamily="34" charset="0"/>
-              </a:rPr>
-              <a:t>, Michael </a:t>
-            </a:r>
-            <a:r>
-              <a:rPr lang="en-US" sz="2500" dirty="0" err="1" smtClean="0">
-                <a:latin typeface="Helvetica" panose="020B0604020202020204" pitchFamily="34" charset="0"/>
-                <a:cs typeface="Helvetica" panose="020B0604020202020204" pitchFamily="34" charset="0"/>
-              </a:rPr>
-              <a:t>Casler</a:t>
-            </a:r>
-            <a:r>
-              <a:rPr lang="en-US" sz="2500" dirty="0" smtClean="0">
-                <a:latin typeface="Helvetica" panose="020B0604020202020204" pitchFamily="34" charset="0"/>
-                <a:cs typeface="Helvetica" panose="020B0604020202020204" pitchFamily="34" charset="0"/>
-              </a:rPr>
-              <a:t>, </a:t>
-            </a:r>
-          </a:p>
-          <a:p>
-            <a:r>
-              <a:rPr lang="en-US" sz="2500" dirty="0" err="1" smtClean="0">
-                <a:latin typeface="Helvetica" panose="020B0604020202020204" pitchFamily="34" charset="0"/>
-                <a:cs typeface="Helvetica" panose="020B0604020202020204" pitchFamily="34" charset="0"/>
-              </a:rPr>
-              <a:t>Jiming</a:t>
-            </a:r>
-            <a:r>
-              <a:rPr lang="en-US" sz="2500" dirty="0" smtClean="0">
-                <a:latin typeface="Helvetica" panose="020B0604020202020204" pitchFamily="34" charset="0"/>
-                <a:cs typeface="Helvetica" panose="020B0604020202020204" pitchFamily="34" charset="0"/>
-              </a:rPr>
-              <a:t> Jiang, David Lowry, </a:t>
-            </a:r>
-            <a:r>
-              <a:rPr lang="en-US" sz="2500" dirty="0" err="1" smtClean="0">
-                <a:latin typeface="Helvetica" panose="020B0604020202020204" pitchFamily="34" charset="0"/>
-                <a:cs typeface="Helvetica" panose="020B0604020202020204" pitchFamily="34" charset="0"/>
-              </a:rPr>
-              <a:t>Guohong</a:t>
-            </a:r>
-            <a:r>
-              <a:rPr lang="en-US" sz="2500" dirty="0" smtClean="0">
-                <a:latin typeface="Helvetica" panose="020B0604020202020204" pitchFamily="34" charset="0"/>
-                <a:cs typeface="Helvetica" panose="020B0604020202020204" pitchFamily="34" charset="0"/>
-              </a:rPr>
-              <a:t> Wu, </a:t>
-            </a:r>
-          </a:p>
-          <a:p>
-            <a:r>
-              <a:rPr lang="en-US" sz="2500" dirty="0" smtClean="0">
-                <a:latin typeface="Helvetica" panose="020B0604020202020204" pitchFamily="34" charset="0"/>
-                <a:cs typeface="Helvetica" panose="020B0604020202020204" pitchFamily="34" charset="0"/>
-              </a:rPr>
-              <a:t>David </a:t>
-            </a:r>
-            <a:r>
-              <a:rPr lang="en-US" sz="2500" dirty="0" err="1" smtClean="0">
-                <a:latin typeface="Helvetica" panose="020B0604020202020204" pitchFamily="34" charset="0"/>
-                <a:cs typeface="Helvetica" panose="020B0604020202020204" pitchFamily="34" charset="0"/>
-              </a:rPr>
-              <a:t>Kudma</a:t>
-            </a:r>
-            <a:r>
-              <a:rPr lang="en-US" sz="2500" dirty="0" smtClean="0">
-                <a:latin typeface="Helvetica" panose="020B0604020202020204" pitchFamily="34" charset="0"/>
-                <a:cs typeface="Helvetica" panose="020B0604020202020204" pitchFamily="34" charset="0"/>
-              </a:rPr>
-              <a:t>, Kerrie Barry, Jane </a:t>
-            </a:r>
-            <a:r>
-              <a:rPr lang="en-US" sz="2500" dirty="0" err="1" smtClean="0">
-                <a:latin typeface="Helvetica" panose="020B0604020202020204" pitchFamily="34" charset="0"/>
-                <a:cs typeface="Helvetica" panose="020B0604020202020204" pitchFamily="34" charset="0"/>
-              </a:rPr>
-              <a:t>Grimwood</a:t>
-            </a:r>
-            <a:r>
-              <a:rPr lang="en-US" sz="2500" dirty="0" smtClean="0">
-                <a:latin typeface="Helvetica" panose="020B0604020202020204" pitchFamily="34" charset="0"/>
-                <a:cs typeface="Helvetica" panose="020B0604020202020204" pitchFamily="34" charset="0"/>
-              </a:rPr>
-              <a:t>, </a:t>
-            </a:r>
-          </a:p>
-          <a:p>
-            <a:r>
-              <a:rPr lang="en-US" sz="2500" dirty="0" smtClean="0">
-                <a:latin typeface="Helvetica" panose="020B0604020202020204" pitchFamily="34" charset="0"/>
-                <a:cs typeface="Helvetica" panose="020B0604020202020204" pitchFamily="34" charset="0"/>
-              </a:rPr>
-              <a:t>Dan </a:t>
-            </a:r>
-            <a:r>
-              <a:rPr lang="en-US" sz="2500" dirty="0" err="1" smtClean="0">
-                <a:latin typeface="Helvetica" panose="020B0604020202020204" pitchFamily="34" charset="0"/>
-                <a:cs typeface="Helvetica" panose="020B0604020202020204" pitchFamily="34" charset="0"/>
-              </a:rPr>
-              <a:t>Rohksar</a:t>
-            </a:r>
-            <a:endParaRPr lang="en-US" sz="2500" dirty="0">
-              <a:latin typeface="Helvetica" panose="020B0604020202020204" pitchFamily="34" charset="0"/>
-              <a:cs typeface="Helvetica" panose="020B0604020202020204" pitchFamily="34" charset="0"/>
-            </a:endParaRPr>
-          </a:p>
-        </p:txBody>
-      </p:sp>
-      <p:sp>
-        <p:nvSpPr>
-          <p:cNvPr id="36" name="TextBox 35"/>
+              <a:rPr lang="en-US" sz="4200" b="1" dirty="0">
+                <a:solidFill>
+                  <a:srgbClr val="262B70"/>
+                </a:solidFill>
+                <a:latin typeface="Helvetica" panose="020B0604020202020204" pitchFamily="34" charset="0"/>
+                <a:cs typeface="Helvetica" panose="020B0604020202020204" pitchFamily="34" charset="0"/>
+              </a:rPr>
+              <a:t>Diversity</a:t>
+            </a:r>
+          </a:p>
+          <a:p>
+            <a:r>
+              <a:rPr lang="en-US" sz="4200" b="1" dirty="0">
+                <a:solidFill>
+                  <a:srgbClr val="262B70"/>
+                </a:solidFill>
+                <a:latin typeface="Helvetica" panose="020B0604020202020204" pitchFamily="34" charset="0"/>
+                <a:cs typeface="Helvetica" panose="020B0604020202020204" pitchFamily="34" charset="0"/>
+              </a:rPr>
+              <a:t>Panel</a:t>
+            </a:r>
+          </a:p>
+        </p:txBody>
+      </p:sp>
+      <p:sp>
+        <p:nvSpPr>
+          <p:cNvPr id="37" name="TextBox 36"/>
           <p:cNvSpPr txBox="1"/>
           <p:nvPr/>
         </p:nvSpPr>
         <p:spPr>
           <a:xfrm>
-            <a:off x="21073965" y="4927831"/>
-            <a:ext cx="4046301" cy="738664"/>
+            <a:off x="16568253" y="11169893"/>
+            <a:ext cx="21005366" cy="738664"/>
           </a:xfrm>
           <a:prstGeom prst="rect">
             <a:avLst/>
@@ -4865,35 +4806,28 @@
           <a:lstStyle/>
           <a:p>
             <a:r>
-              <a:rPr lang="en-US" sz="4200" b="1" dirty="0" smtClean="0">
+              <a:rPr lang="en-US" sz="4200" b="1" dirty="0">
                 <a:solidFill>
                   <a:srgbClr val="262B70"/>
                 </a:solidFill>
                 <a:latin typeface="Helvetica" panose="020B0604020202020204" pitchFamily="34" charset="0"/>
                 <a:cs typeface="Helvetica" panose="020B0604020202020204" pitchFamily="34" charset="0"/>
               </a:rPr>
-              <a:t>Diversity Panel</a:t>
-            </a:r>
-            <a:endParaRPr lang="en-US" sz="4200" b="1" dirty="0">
-              <a:solidFill>
-                <a:srgbClr val="262B70"/>
-              </a:solidFill>
-              <a:latin typeface="Helvetica" panose="020B0604020202020204" pitchFamily="34" charset="0"/>
-              <a:cs typeface="Helvetica" panose="020B0604020202020204" pitchFamily="34" charset="0"/>
-            </a:endParaRPr>
-          </a:p>
-        </p:txBody>
-      </p:sp>
-      <p:sp>
-        <p:nvSpPr>
-          <p:cNvPr id="37" name="TextBox 36"/>
+              <a:t>Genome-Wide Association Studies of Environments at Plant Locations of Origin </a:t>
+            </a:r>
+          </a:p>
+        </p:txBody>
+      </p:sp>
+      <p:sp>
+        <p:nvSpPr>
+          <p:cNvPr id="38" name="TextBox 37"/>
           <p:cNvSpPr txBox="1"/>
           <p:nvPr/>
         </p:nvSpPr>
         <p:spPr>
           <a:xfrm>
-            <a:off x="16263453" y="11169893"/>
-            <a:ext cx="21005366" cy="738664"/>
+            <a:off x="1492388" y="11169893"/>
+            <a:ext cx="13685991" cy="738664"/>
           </a:xfrm>
           <a:prstGeom prst="rect">
             <a:avLst/>
@@ -4907,35 +4841,28 @@
           <a:lstStyle/>
           <a:p>
             <a:r>
-              <a:rPr lang="en-US" sz="4200" b="1" dirty="0" smtClean="0">
+              <a:rPr lang="en-US" sz="4200" b="1" dirty="0">
                 <a:solidFill>
                   <a:srgbClr val="262B70"/>
                 </a:solidFill>
                 <a:latin typeface="Helvetica" panose="020B0604020202020204" pitchFamily="34" charset="0"/>
                 <a:cs typeface="Helvetica" panose="020B0604020202020204" pitchFamily="34" charset="0"/>
               </a:rPr>
-              <a:t>Genome-Wide Association Studies for Environments at Plant Locations of Origin </a:t>
-            </a:r>
-            <a:endParaRPr lang="en-US" sz="4200" b="1" dirty="0">
-              <a:solidFill>
-                <a:srgbClr val="262B70"/>
-              </a:solidFill>
-              <a:latin typeface="Helvetica" panose="020B0604020202020204" pitchFamily="34" charset="0"/>
-              <a:cs typeface="Helvetica" panose="020B0604020202020204" pitchFamily="34" charset="0"/>
-            </a:endParaRPr>
-          </a:p>
-        </p:txBody>
-      </p:sp>
-      <p:sp>
-        <p:nvSpPr>
-          <p:cNvPr id="38" name="TextBox 37"/>
+              <a:t>Continent-Scale Adaptation Using Common Gardens</a:t>
+            </a:r>
+          </a:p>
+        </p:txBody>
+      </p:sp>
+      <p:sp>
+        <p:nvSpPr>
+          <p:cNvPr id="39" name="TextBox 38"/>
           <p:cNvSpPr txBox="1"/>
           <p:nvPr/>
         </p:nvSpPr>
         <p:spPr>
           <a:xfrm>
-            <a:off x="1454288" y="11169893"/>
-            <a:ext cx="13685991" cy="738664"/>
+            <a:off x="6153340" y="18386664"/>
+            <a:ext cx="22515394" cy="738664"/>
           </a:xfrm>
           <a:prstGeom prst="rect">
             <a:avLst/>
@@ -4949,35 +4876,28 @@
           <a:lstStyle/>
           <a:p>
             <a:r>
-              <a:rPr lang="en-US" sz="4200" b="1" dirty="0" smtClean="0">
+              <a:rPr lang="en-US" sz="4200" b="1" dirty="0">
                 <a:solidFill>
                   <a:srgbClr val="262B70"/>
                 </a:solidFill>
                 <a:latin typeface="Helvetica" panose="020B0604020202020204" pitchFamily="34" charset="0"/>
                 <a:cs typeface="Helvetica" panose="020B0604020202020204" pitchFamily="34" charset="0"/>
               </a:rPr>
-              <a:t>Continent-Scale Adaptation Using Common Gardens</a:t>
-            </a:r>
-            <a:endParaRPr lang="en-US" sz="4200" b="1" dirty="0">
-              <a:solidFill>
-                <a:srgbClr val="262B70"/>
-              </a:solidFill>
-              <a:latin typeface="Helvetica" panose="020B0604020202020204" pitchFamily="34" charset="0"/>
-              <a:cs typeface="Helvetica" panose="020B0604020202020204" pitchFamily="34" charset="0"/>
-            </a:endParaRPr>
-          </a:p>
-        </p:txBody>
-      </p:sp>
-      <p:sp>
-        <p:nvSpPr>
-          <p:cNvPr id="39" name="TextBox 38"/>
+              <a:t>Genome-Wide Association Studies for Common Garden Traits Show Climate Adaptation</a:t>
+            </a:r>
+          </a:p>
+        </p:txBody>
+      </p:sp>
+      <p:sp>
+        <p:nvSpPr>
+          <p:cNvPr id="40" name="TextBox 39"/>
           <p:cNvSpPr txBox="1"/>
           <p:nvPr/>
         </p:nvSpPr>
         <p:spPr>
           <a:xfrm>
-            <a:off x="10572940" y="18500964"/>
-            <a:ext cx="19522588" cy="738664"/>
+            <a:off x="31755129" y="26135708"/>
+            <a:ext cx="2190023" cy="738664"/>
           </a:xfrm>
           <a:prstGeom prst="rect">
             <a:avLst/>
@@ -4991,35 +4911,28 @@
           <a:lstStyle/>
           <a:p>
             <a:r>
-              <a:rPr lang="en-US" sz="4200" b="1" dirty="0" smtClean="0">
+              <a:rPr lang="en-US" sz="4200" b="1" dirty="0">
                 <a:solidFill>
                   <a:srgbClr val="262B70"/>
                 </a:solidFill>
                 <a:latin typeface="Helvetica" panose="020B0604020202020204" pitchFamily="34" charset="0"/>
                 <a:cs typeface="Helvetica" panose="020B0604020202020204" pitchFamily="34" charset="0"/>
               </a:rPr>
-              <a:t>Genome-Wide Association Studies for Traits Involved in Climate Adaptation</a:t>
-            </a:r>
-            <a:endParaRPr lang="en-US" sz="4200" b="1" dirty="0">
-              <a:solidFill>
-                <a:srgbClr val="262B70"/>
-              </a:solidFill>
-              <a:latin typeface="Helvetica" panose="020B0604020202020204" pitchFamily="34" charset="0"/>
-              <a:cs typeface="Helvetica" panose="020B0604020202020204" pitchFamily="34" charset="0"/>
-            </a:endParaRPr>
-          </a:p>
-        </p:txBody>
-      </p:sp>
-      <p:sp>
-        <p:nvSpPr>
-          <p:cNvPr id="40" name="TextBox 39"/>
+              <a:t>Contact</a:t>
+            </a:r>
+          </a:p>
+        </p:txBody>
+      </p:sp>
+      <p:sp>
+        <p:nvSpPr>
+          <p:cNvPr id="41" name="TextBox 40"/>
           <p:cNvSpPr txBox="1"/>
           <p:nvPr/>
         </p:nvSpPr>
         <p:spPr>
           <a:xfrm>
-            <a:off x="31755129" y="26135708"/>
-            <a:ext cx="2190023" cy="738664"/>
+            <a:off x="18807448" y="26135708"/>
+            <a:ext cx="7817333" cy="738664"/>
           </a:xfrm>
           <a:prstGeom prst="rect">
             <a:avLst/>
@@ -5033,74 +4946,25 @@
           <a:lstStyle/>
           <a:p>
             <a:r>
-              <a:rPr lang="en-US" sz="4200" b="1" dirty="0" smtClean="0">
+              <a:rPr lang="en-US" sz="4200" b="1" dirty="0" err="1">
                 <a:solidFill>
                   <a:srgbClr val="262B70"/>
                 </a:solidFill>
                 <a:latin typeface="Helvetica" panose="020B0604020202020204" pitchFamily="34" charset="0"/>
                 <a:cs typeface="Helvetica" panose="020B0604020202020204" pitchFamily="34" charset="0"/>
               </a:rPr>
-              <a:t>Contact</a:t>
-            </a:r>
-            <a:endParaRPr lang="en-US" sz="4200" b="1" dirty="0">
-              <a:solidFill>
-                <a:srgbClr val="262B70"/>
-              </a:solidFill>
-              <a:latin typeface="Helvetica" panose="020B0604020202020204" pitchFamily="34" charset="0"/>
-              <a:cs typeface="Helvetica" panose="020B0604020202020204" pitchFamily="34" charset="0"/>
-            </a:endParaRPr>
-          </a:p>
-        </p:txBody>
-      </p:sp>
-      <p:sp>
-        <p:nvSpPr>
-          <p:cNvPr id="41" name="TextBox 40"/>
-          <p:cNvSpPr txBox="1"/>
-          <p:nvPr/>
-        </p:nvSpPr>
-        <p:spPr>
-          <a:xfrm>
-            <a:off x="19188448" y="26135708"/>
-            <a:ext cx="7817333" cy="738664"/>
-          </a:xfrm>
-          <a:prstGeom prst="rect">
-            <a:avLst/>
-          </a:prstGeom>
-          <a:noFill/>
-        </p:spPr>
-        <p:txBody>
-          <a:bodyPr wrap="none" rtlCol="0">
-            <a:spAutoFit/>
-          </a:bodyPr>
-          <a:lstStyle/>
-          <a:p>
-            <a:r>
-              <a:rPr lang="en-US" sz="4200" b="1" dirty="0" err="1" smtClean="0">
+              <a:t>switchgrassGWAS</a:t>
+            </a:r>
+            <a:r>
+              <a:rPr lang="en-US" sz="4200" b="1" dirty="0">
                 <a:solidFill>
                   <a:srgbClr val="262B70"/>
                 </a:solidFill>
                 <a:latin typeface="Helvetica" panose="020B0604020202020204" pitchFamily="34" charset="0"/>
                 <a:cs typeface="Helvetica" panose="020B0604020202020204" pitchFamily="34" charset="0"/>
               </a:rPr>
-              <a:t>switchgrassGWAS</a:t>
-            </a:r>
-            <a:r>
-              <a:rPr lang="en-US" sz="4200" b="1" dirty="0" smtClean="0">
-                <a:solidFill>
-                  <a:srgbClr val="262B70"/>
-                </a:solidFill>
-                <a:latin typeface="Helvetica" panose="020B0604020202020204" pitchFamily="34" charset="0"/>
-                <a:cs typeface="Helvetica" panose="020B0604020202020204" pitchFamily="34" charset="0"/>
-              </a:rPr>
               <a:t> R Package</a:t>
             </a:r>
-            <a:endParaRPr lang="en-US" sz="4200" b="1" dirty="0">
-              <a:solidFill>
-                <a:srgbClr val="262B70"/>
-              </a:solidFill>
-              <a:latin typeface="Helvetica" panose="020B0604020202020204" pitchFamily="34" charset="0"/>
-              <a:cs typeface="Helvetica" panose="020B0604020202020204" pitchFamily="34" charset="0"/>
-            </a:endParaRPr>
           </a:p>
         </p:txBody>
       </p:sp>
@@ -5158,7 +5022,7 @@
           <a:p>
             <a:pPr algn="ctr"/>
             <a:r>
-              <a:rPr lang="en-US" sz="3200" dirty="0" smtClean="0">
+              <a:rPr lang="en-US" sz="3200" dirty="0">
                 <a:latin typeface="Helvetica" panose="020B0604020202020204" pitchFamily="34" charset="0"/>
                 <a:cs typeface="Helvetica" panose="020B0604020202020204" pitchFamily="34" charset="0"/>
               </a:rPr>
@@ -5167,39 +5031,35 @@
           </a:p>
           <a:p>
             <a:pPr algn="ctr"/>
-            <a:endParaRPr lang="en-US" sz="3200" dirty="0" smtClean="0">
-              <a:latin typeface="Helvetica" panose="020B0604020202020204" pitchFamily="34" charset="0"/>
-              <a:cs typeface="Helvetica" panose="020B0604020202020204" pitchFamily="34" charset="0"/>
-            </a:endParaRPr>
-          </a:p>
-          <a:p>
-            <a:pPr algn="ctr"/>
-            <a:r>
-              <a:rPr lang="en-US" sz="3200" dirty="0" smtClean="0">
-                <a:latin typeface="Helvetica" panose="020B0604020202020204" pitchFamily="34" charset="0"/>
-                <a:cs typeface="Helvetica" panose="020B0604020202020204" pitchFamily="34" charset="0"/>
-              </a:rPr>
-              <a:t>Tom </a:t>
-            </a:r>
-            <a:r>
-              <a:rPr lang="en-US" sz="3200" dirty="0" err="1" smtClean="0">
-                <a:latin typeface="Helvetica" panose="020B0604020202020204" pitchFamily="34" charset="0"/>
-                <a:cs typeface="Helvetica" panose="020B0604020202020204" pitchFamily="34" charset="0"/>
-              </a:rPr>
-              <a:t>Juenger</a:t>
-            </a:r>
-            <a:r>
-              <a:rPr lang="en-US" sz="3200" dirty="0" smtClean="0">
-                <a:latin typeface="Helvetica" panose="020B0604020202020204" pitchFamily="34" charset="0"/>
-                <a:cs typeface="Helvetica" panose="020B0604020202020204" pitchFamily="34" charset="0"/>
-              </a:rPr>
-              <a:t>: tjuenger@utexas.edu</a:t>
-            </a:r>
             <a:endParaRPr lang="en-US" sz="3200" dirty="0">
               <a:latin typeface="Helvetica" panose="020B0604020202020204" pitchFamily="34" charset="0"/>
               <a:cs typeface="Helvetica" panose="020B0604020202020204" pitchFamily="34" charset="0"/>
             </a:endParaRPr>
           </a:p>
+          <a:p>
+            <a:pPr algn="ctr"/>
+            <a:r>
+              <a:rPr lang="en-US" sz="3200" dirty="0">
+                <a:latin typeface="Helvetica" panose="020B0604020202020204" pitchFamily="34" charset="0"/>
+                <a:cs typeface="Helvetica" panose="020B0604020202020204" pitchFamily="34" charset="0"/>
+              </a:rPr>
+              <a:t>Tom </a:t>
+            </a:r>
+            <a:r>
+              <a:rPr lang="en-US" sz="3200" dirty="0" err="1">
+                <a:latin typeface="Helvetica" panose="020B0604020202020204" pitchFamily="34" charset="0"/>
+                <a:cs typeface="Helvetica" panose="020B0604020202020204" pitchFamily="34" charset="0"/>
+              </a:rPr>
+              <a:t>Juenger</a:t>
+            </a:r>
+            <a:r>
+              <a:rPr lang="en-US" sz="3200" dirty="0">
+                <a:latin typeface="Helvetica" panose="020B0604020202020204" pitchFamily="34" charset="0"/>
+                <a:cs typeface="Helvetica" panose="020B0604020202020204" pitchFamily="34" charset="0"/>
+              </a:rPr>
+              <a:t>: tjuenger@utexas.edu</a:t>
+            </a:r>
+          </a:p>
         </p:txBody>
       </p:sp>
       <p:sp>
@@ -5259,21 +5119,21 @@
               <a:buAutoNum type="arabicPeriod"/>
             </a:pPr>
             <a:r>
-              <a:rPr lang="en-US" sz="3200" dirty="0" smtClean="0">
+              <a:rPr lang="en-US" sz="3200" dirty="0">
                 <a:latin typeface="Helvetica" panose="020B0604020202020204" pitchFamily="34" charset="0"/>
                 <a:cs typeface="Helvetica" panose="020B0604020202020204" pitchFamily="34" charset="0"/>
               </a:rPr>
               <a:t>Run Genome-Wide Association with `</a:t>
             </a:r>
             <a:r>
-              <a:rPr lang="en-US" sz="3200" i="1" dirty="0" err="1" smtClean="0">
+              <a:rPr lang="en-US" sz="3200" i="1" dirty="0" err="1">
                 <a:latin typeface="Helvetica" panose="020B0604020202020204" pitchFamily="34" charset="0"/>
                 <a:cs typeface="Helvetica" panose="020B0604020202020204" pitchFamily="34" charset="0"/>
               </a:rPr>
               <a:t>pvdiv_gwas</a:t>
             </a:r>
             <a:r>
-              <a:rPr lang="en-US" sz="3200" dirty="0" smtClean="0">
+              <a:rPr lang="en-US" sz="3200" dirty="0">
                 <a:latin typeface="Helvetica" panose="020B0604020202020204" pitchFamily="34" charset="0"/>
                 <a:cs typeface="Helvetica" panose="020B0604020202020204" pitchFamily="34" charset="0"/>
               </a:rPr>
@@ -5285,21 +5145,21 @@
               <a:buAutoNum type="arabicPeriod"/>
             </a:pPr>
             <a:r>
-              <a:rPr lang="en-US" sz="3200" dirty="0" smtClean="0">
+              <a:rPr lang="en-US" sz="3200" dirty="0">
                 <a:latin typeface="Helvetica" panose="020B0604020202020204" pitchFamily="34" charset="0"/>
                 <a:cs typeface="Helvetica" panose="020B0604020202020204" pitchFamily="34" charset="0"/>
               </a:rPr>
               <a:t>Find annotations with `</a:t>
             </a:r>
             <a:r>
-              <a:rPr lang="en-US" sz="3200" i="1" dirty="0" err="1" smtClean="0">
+              <a:rPr lang="en-US" sz="3200" i="1" dirty="0" err="1">
                 <a:latin typeface="Helvetica" panose="020B0604020202020204" pitchFamily="34" charset="0"/>
                 <a:cs typeface="Helvetica" panose="020B0604020202020204" pitchFamily="34" charset="0"/>
               </a:rPr>
               <a:t>pvdiv_table_topsnps</a:t>
             </a:r>
             <a:r>
-              <a:rPr lang="en-US" sz="3200" dirty="0" smtClean="0">
+              <a:rPr lang="en-US" sz="3200" dirty="0">
                 <a:latin typeface="Helvetica" panose="020B0604020202020204" pitchFamily="34" charset="0"/>
                 <a:cs typeface="Helvetica" panose="020B0604020202020204" pitchFamily="34" charset="0"/>
               </a:rPr>
@@ -5311,35 +5171,31 @@
               <a:buAutoNum type="arabicPeriod"/>
             </a:pPr>
             <a:r>
-              <a:rPr lang="en-US" sz="3200" dirty="0" smtClean="0">
+              <a:rPr lang="en-US" sz="3200" dirty="0">
                 <a:latin typeface="Helvetica" panose="020B0604020202020204" pitchFamily="34" charset="0"/>
                 <a:cs typeface="Helvetica" panose="020B0604020202020204" pitchFamily="34" charset="0"/>
               </a:rPr>
               <a:t>Analyze data at multiple sites using mash, with:</a:t>
             </a:r>
-            <a:endParaRPr lang="en-US" sz="3200" dirty="0">
-              <a:latin typeface="Helvetica" panose="020B0604020202020204" pitchFamily="34" charset="0"/>
-              <a:cs typeface="Helvetica" panose="020B0604020202020204" pitchFamily="34" charset="0"/>
-            </a:endParaRPr>
           </a:p>
           <a:p>
             <a:pPr lvl="3"/>
             <a:r>
-              <a:rPr lang="en-US" sz="3200" dirty="0" smtClean="0">
+              <a:rPr lang="en-US" sz="3200" dirty="0">
                 <a:latin typeface="Helvetica" panose="020B0604020202020204" pitchFamily="34" charset="0"/>
                 <a:cs typeface="Helvetica" panose="020B0604020202020204" pitchFamily="34" charset="0"/>
               </a:rPr>
               <a:t>`</a:t>
             </a:r>
             <a:r>
-              <a:rPr lang="en-US" sz="3200" i="1" dirty="0" smtClean="0">
+              <a:rPr lang="en-US" sz="3200" i="1" dirty="0">
                 <a:latin typeface="Helvetica" panose="020B0604020202020204" pitchFamily="34" charset="0"/>
                 <a:cs typeface="Helvetica" panose="020B0604020202020204" pitchFamily="34" charset="0"/>
               </a:rPr>
               <a:t>pvdiv_bigsnp2mashr</a:t>
             </a:r>
             <a:r>
-              <a:rPr lang="en-US" sz="3200" dirty="0" smtClean="0">
+              <a:rPr lang="en-US" sz="3200" dirty="0">
                 <a:latin typeface="Helvetica" panose="020B0604020202020204" pitchFamily="34" charset="0"/>
                 <a:cs typeface="Helvetica" panose="020B0604020202020204" pitchFamily="34" charset="0"/>
               </a:rPr>
@@ -5349,21 +5205,21 @@
           <a:p>
             <a:pPr lvl="3"/>
             <a:r>
-              <a:rPr lang="en-US" sz="3200" dirty="0" smtClean="0">
+              <a:rPr lang="en-US" sz="3200" dirty="0">
                 <a:latin typeface="Helvetica" panose="020B0604020202020204" pitchFamily="34" charset="0"/>
                 <a:cs typeface="Helvetica" panose="020B0604020202020204" pitchFamily="34" charset="0"/>
               </a:rPr>
               <a:t>`</a:t>
             </a:r>
             <a:r>
-              <a:rPr lang="en-US" sz="3200" i="1" dirty="0" err="1" smtClean="0">
+              <a:rPr lang="en-US" sz="3200" i="1" dirty="0" err="1">
                 <a:latin typeface="Helvetica" panose="020B0604020202020204" pitchFamily="34" charset="0"/>
                 <a:cs typeface="Helvetica" panose="020B0604020202020204" pitchFamily="34" charset="0"/>
               </a:rPr>
               <a:t>mash_standard_run</a:t>
             </a:r>
             <a:r>
-              <a:rPr lang="en-US" sz="3200" dirty="0" smtClean="0">
+              <a:rPr lang="en-US" sz="3200" dirty="0">
                 <a:latin typeface="Helvetica" panose="020B0604020202020204" pitchFamily="34" charset="0"/>
                 <a:cs typeface="Helvetica" panose="020B0604020202020204" pitchFamily="34" charset="0"/>
               </a:rPr>
@@ -5373,21 +5229,21 @@
           <a:p>
             <a:pPr lvl="3"/>
             <a:r>
-              <a:rPr lang="en-US" sz="3200" dirty="0" smtClean="0">
+              <a:rPr lang="en-US" sz="3200" dirty="0">
                 <a:latin typeface="Helvetica" panose="020B0604020202020204" pitchFamily="34" charset="0"/>
                 <a:cs typeface="Helvetica" panose="020B0604020202020204" pitchFamily="34" charset="0"/>
               </a:rPr>
               <a:t>`</a:t>
             </a:r>
             <a:r>
-              <a:rPr lang="en-US" sz="3200" i="1" dirty="0" err="1" smtClean="0">
+              <a:rPr lang="en-US" sz="3200" i="1" dirty="0" err="1">
                 <a:latin typeface="Helvetica" panose="020B0604020202020204" pitchFamily="34" charset="0"/>
                 <a:cs typeface="Helvetica" panose="020B0604020202020204" pitchFamily="34" charset="0"/>
               </a:rPr>
               <a:t>mash_plot_manhattan_by_condition</a:t>
             </a:r>
             <a:r>
-              <a:rPr lang="en-US" sz="3200" dirty="0" smtClean="0">
+              <a:rPr lang="en-US" sz="3200" dirty="0">
                 <a:latin typeface="Helvetica" panose="020B0604020202020204" pitchFamily="34" charset="0"/>
                 <a:cs typeface="Helvetica" panose="020B0604020202020204" pitchFamily="34" charset="0"/>
               </a:rPr>
@@ -5397,21 +5253,21 @@
           <a:p>
             <a:pPr lvl="3"/>
             <a:r>
-              <a:rPr lang="en-US" sz="3200" dirty="0" smtClean="0">
+              <a:rPr lang="en-US" sz="3200" dirty="0">
                 <a:latin typeface="Helvetica" panose="020B0604020202020204" pitchFamily="34" charset="0"/>
                 <a:cs typeface="Helvetica" panose="020B0604020202020204" pitchFamily="34" charset="0"/>
               </a:rPr>
               <a:t>`</a:t>
             </a:r>
             <a:r>
-              <a:rPr lang="en-US" sz="3200" i="1" dirty="0" err="1" smtClean="0">
+              <a:rPr lang="en-US" sz="3200" i="1" dirty="0" err="1">
                 <a:latin typeface="Helvetica" panose="020B0604020202020204" pitchFamily="34" charset="0"/>
                 <a:cs typeface="Helvetica" panose="020B0604020202020204" pitchFamily="34" charset="0"/>
               </a:rPr>
               <a:t>mash_plot_effects</a:t>
             </a:r>
             <a:r>
-              <a:rPr lang="en-US" sz="3200" dirty="0" smtClean="0">
+              <a:rPr lang="en-US" sz="3200" dirty="0">
                 <a:latin typeface="Helvetica" panose="020B0604020202020204" pitchFamily="34" charset="0"/>
                 <a:cs typeface="Helvetica" panose="020B0604020202020204" pitchFamily="34" charset="0"/>
               </a:rPr>
@@ -5428,8 +5284,8 @@
         </p:nvSpPr>
         <p:spPr>
           <a:xfrm>
-            <a:off x="1858809" y="26980835"/>
-            <a:ext cx="13685991" cy="2062103"/>
+            <a:off x="1485901" y="27171335"/>
+            <a:ext cx="15049500" cy="4524315"/>
           </a:xfrm>
           <a:prstGeom prst="rect">
             <a:avLst/>
@@ -5443,11 +5299,11 @@
           <a:lstStyle/>
           <a:p>
             <a:r>
-              <a:rPr lang="en-US" sz="3200" b="1" dirty="0" smtClean="0">
-                <a:latin typeface="Helvetica" panose="020B0604020202020204" pitchFamily="34" charset="0"/>
-                <a:cs typeface="Helvetica" panose="020B0604020202020204" pitchFamily="34" charset="0"/>
-              </a:rPr>
-              <a:t>Environmental GWAS and population structure are inextricably linked in this species.</a:t>
+              <a:rPr lang="en-US" sz="3200" b="1" dirty="0">
+                <a:latin typeface="Helvetica" panose="020B0604020202020204" pitchFamily="34" charset="0"/>
+                <a:cs typeface="Helvetica" panose="020B0604020202020204" pitchFamily="34" charset="0"/>
+              </a:rPr>
+              <a:t>Winter survival in the northern U.S. is a major selective agent in switchgrass.</a:t>
             </a:r>
           </a:p>
           <a:p>
@@ -5458,17 +5314,28 @@
           </a:p>
           <a:p>
             <a:r>
-              <a:rPr lang="en-US" sz="3200" b="1" dirty="0" smtClean="0">
-                <a:latin typeface="Helvetica" panose="020B0604020202020204" pitchFamily="34" charset="0"/>
-                <a:cs typeface="Helvetica" panose="020B0604020202020204" pitchFamily="34" charset="0"/>
-              </a:rPr>
-              <a:t>Strong signals for associations </a:t>
-            </a:r>
+              <a:rPr lang="en-US" sz="3200" b="1" dirty="0">
+                <a:latin typeface="Helvetica" panose="020B0604020202020204" pitchFamily="34" charset="0"/>
+                <a:cs typeface="Helvetica" panose="020B0604020202020204" pitchFamily="34" charset="0"/>
+              </a:rPr>
+              <a:t>Environmental GWAS show allelic effects that partition plants into “winter kill” and “non-winter kill” locations; e.g., warmer climates with more consistent temperatures (and more variable precipitation) versus cooler climates with more variable temperatures and more consistent precipitation. </a:t>
+            </a:r>
+          </a:p>
+          <a:p>
             <a:endParaRPr lang="en-US" sz="3200" b="1" dirty="0">
               <a:latin typeface="Helvetica" panose="020B0604020202020204" pitchFamily="34" charset="0"/>
               <a:cs typeface="Helvetica" panose="020B0604020202020204" pitchFamily="34" charset="0"/>
             </a:endParaRPr>
           </a:p>
+          <a:p>
+            <a:r>
+              <a:rPr lang="en-US" sz="3200" b="1" dirty="0">
+                <a:latin typeface="Helvetica" panose="020B0604020202020204" pitchFamily="34" charset="0"/>
+                <a:cs typeface="Helvetica" panose="020B0604020202020204" pitchFamily="34" charset="0"/>
+              </a:rPr>
+              <a:t>Common garden phenotypes show genotype by environment interactions and strong signals of genetic association that vary by location. </a:t>
+            </a:r>
+          </a:p>
         </p:txBody>
       </p:sp>
       <p:sp>
@@ -5479,8 +5346,8 @@
         </p:nvSpPr>
         <p:spPr>
           <a:xfrm>
-            <a:off x="10794843" y="16266714"/>
-            <a:ext cx="6209197" cy="907941"/>
+            <a:off x="1193801" y="16183532"/>
+            <a:ext cx="14592299" cy="1769715"/>
           </a:xfrm>
           <a:prstGeom prst="rect">
             <a:avLst/>
@@ -5494,68 +5361,617 @@
           <a:lstStyle/>
           <a:p>
             <a:r>
-              <a:rPr lang="en-US" sz="2800" b="1" dirty="0" smtClean="0">
-                <a:latin typeface="Helvetica" panose="020B0604020202020204" pitchFamily="34" charset="0"/>
-                <a:cs typeface="Helvetica" panose="020B0604020202020204" pitchFamily="34" charset="0"/>
-              </a:rPr>
-              <a:t>A </a:t>
-            </a:r>
-            <a:r>
-              <a:rPr lang="en-US" sz="2500" i="1" dirty="0" smtClean="0">
-                <a:latin typeface="Helvetica" panose="020B0604020202020204" pitchFamily="34" charset="0"/>
-                <a:cs typeface="Helvetica" panose="020B0604020202020204" pitchFamily="34" charset="0"/>
-              </a:rPr>
-              <a:t>Example of figure </a:t>
-            </a:r>
-          </a:p>
-          <a:p>
-            <a:r>
-              <a:rPr lang="en-US" sz="2500" i="1" dirty="0" smtClean="0">
-                <a:latin typeface="Helvetica" panose="020B0604020202020204" pitchFamily="34" charset="0"/>
-                <a:cs typeface="Helvetica" panose="020B0604020202020204" pitchFamily="34" charset="0"/>
-              </a:rPr>
-              <a:t>text/annotation size.</a:t>
-            </a:r>
-            <a:endParaRPr lang="en-US" sz="2500" i="1" dirty="0">
+              <a:rPr lang="en-US" sz="2800" b="1" dirty="0">
+                <a:latin typeface="Helvetica" panose="020B0604020202020204" pitchFamily="34" charset="0"/>
+                <a:cs typeface="Helvetica" panose="020B0604020202020204" pitchFamily="34" charset="0"/>
+              </a:rPr>
+              <a:t>A</a:t>
+            </a:r>
+            <a:r>
+              <a:rPr lang="en-US" sz="2500" b="1" dirty="0">
+                <a:latin typeface="Helvetica" panose="020B0604020202020204" pitchFamily="34" charset="0"/>
+                <a:cs typeface="Helvetica" panose="020B0604020202020204" pitchFamily="34" charset="0"/>
+              </a:rPr>
+              <a:t> </a:t>
+            </a:r>
+            <a:r>
+              <a:rPr lang="en-US" sz="2500" i="1" dirty="0">
+                <a:latin typeface="Helvetica" panose="020B0604020202020204" pitchFamily="34" charset="0"/>
+                <a:cs typeface="Helvetica" panose="020B0604020202020204" pitchFamily="34" charset="0"/>
+              </a:rPr>
+              <a:t>The diversity panel was planted at ten common garden locations in 2018.</a:t>
+            </a:r>
+          </a:p>
+          <a:p>
+            <a:r>
+              <a:rPr lang="en-US" sz="2800" b="1" dirty="0">
+                <a:latin typeface="Helvetica" panose="020B0604020202020204" pitchFamily="34" charset="0"/>
+                <a:cs typeface="Helvetica" panose="020B0604020202020204" pitchFamily="34" charset="0"/>
+              </a:rPr>
+              <a:t>B</a:t>
+            </a:r>
+            <a:r>
+              <a:rPr lang="en-US" sz="2500" b="1" dirty="0">
+                <a:latin typeface="Helvetica" panose="020B0604020202020204" pitchFamily="34" charset="0"/>
+                <a:cs typeface="Helvetica" panose="020B0604020202020204" pitchFamily="34" charset="0"/>
+              </a:rPr>
+              <a:t> </a:t>
+            </a:r>
+            <a:r>
+              <a:rPr lang="en-US" sz="2500" i="1" dirty="0">
+                <a:latin typeface="Helvetica" panose="020B0604020202020204" pitchFamily="34" charset="0"/>
+                <a:cs typeface="Helvetica" panose="020B0604020202020204" pitchFamily="34" charset="0"/>
+              </a:rPr>
+              <a:t>Four northern common garden locations had significant overwinter plant death in winter 2018-2019.</a:t>
+            </a:r>
+          </a:p>
+          <a:p>
+            <a:r>
+              <a:rPr lang="en-US" sz="2800" b="1" dirty="0">
+                <a:latin typeface="Helvetica" panose="020B0604020202020204" pitchFamily="34" charset="0"/>
+                <a:cs typeface="Helvetica" panose="020B0604020202020204" pitchFamily="34" charset="0"/>
+              </a:rPr>
+              <a:t>C</a:t>
+            </a:r>
+            <a:r>
+              <a:rPr lang="en-US" sz="2500" b="1" dirty="0">
+                <a:latin typeface="Helvetica" panose="020B0604020202020204" pitchFamily="34" charset="0"/>
+                <a:cs typeface="Helvetica" panose="020B0604020202020204" pitchFamily="34" charset="0"/>
+              </a:rPr>
+              <a:t> </a:t>
+            </a:r>
+            <a:r>
+              <a:rPr lang="en-US" sz="2500" i="1" dirty="0">
+                <a:latin typeface="Helvetica" panose="020B0604020202020204" pitchFamily="34" charset="0"/>
+                <a:cs typeface="Helvetica" panose="020B0604020202020204" pitchFamily="34" charset="0"/>
+              </a:rPr>
+              <a:t>Specific gulf alleles were lost at high frequency in the north in the winter of 2018/2019. The fraction of alleles lost varied across the genome (first four chromosomes are shown).</a:t>
+            </a:r>
+            <a:endParaRPr lang="en-US" sz="2500" dirty="0">
               <a:latin typeface="Helvetica" panose="020B0604020202020204" pitchFamily="34" charset="0"/>
               <a:cs typeface="Helvetica" panose="020B0604020202020204" pitchFamily="34" charset="0"/>
             </a:endParaRPr>
           </a:p>
         </p:txBody>
       </p:sp>
+      <p:sp>
+        <p:nvSpPr>
+          <p:cNvPr id="43" name="TextBox 42"/>
+          <p:cNvSpPr txBox="1"/>
+          <p:nvPr/>
+        </p:nvSpPr>
+        <p:spPr>
+          <a:xfrm>
+            <a:off x="10273516" y="22463137"/>
+            <a:ext cx="8085857" cy="2923877"/>
+          </a:xfrm>
+          <a:prstGeom prst="rect">
+            <a:avLst/>
+          </a:prstGeom>
+          <a:noFill/>
+        </p:spPr>
+        <p:txBody>
+          <a:bodyPr wrap="square" rtlCol="0">
+            <a:spAutoFit/>
+          </a:bodyPr>
+          <a:lstStyle/>
+          <a:p>
+            <a:r>
+              <a:rPr lang="en-US" sz="2800" b="1" dirty="0">
+                <a:latin typeface="Helvetica" panose="020B0604020202020204" pitchFamily="34" charset="0"/>
+                <a:cs typeface="Helvetica" panose="020B0604020202020204" pitchFamily="34" charset="0"/>
+              </a:rPr>
+              <a:t>A </a:t>
+            </a:r>
+            <a:r>
+              <a:rPr lang="en-US" sz="2500" i="1" dirty="0">
+                <a:latin typeface="Helvetica" panose="020B0604020202020204" pitchFamily="34" charset="0"/>
+                <a:cs typeface="Helvetica" panose="020B0604020202020204" pitchFamily="34" charset="0"/>
+              </a:rPr>
+              <a:t>Greenup shows environment and ecotype by environment effects. Sites are arranged in latitudinal order and bars are colored by plant ecotype. </a:t>
+            </a:r>
+          </a:p>
+          <a:p>
+            <a:r>
+              <a:rPr lang="en-US" sz="2800" b="1" dirty="0">
+                <a:latin typeface="Helvetica" panose="020B0604020202020204" pitchFamily="34" charset="0"/>
+                <a:cs typeface="Helvetica" panose="020B0604020202020204" pitchFamily="34" charset="0"/>
+              </a:rPr>
+              <a:t>B</a:t>
+            </a:r>
+            <a:r>
+              <a:rPr lang="en-US" sz="2500" i="1" dirty="0">
+                <a:latin typeface="Helvetica" panose="020B0604020202020204" pitchFamily="34" charset="0"/>
+                <a:cs typeface="Helvetica" panose="020B0604020202020204" pitchFamily="34" charset="0"/>
+              </a:rPr>
+              <a:t> Manhattan plot for the starred distribution in </a:t>
+            </a:r>
+            <a:r>
+              <a:rPr lang="en-US" sz="2800" b="1" dirty="0">
+                <a:latin typeface="Helvetica" panose="020B0604020202020204" pitchFamily="34" charset="0"/>
+                <a:cs typeface="Helvetica" panose="020B0604020202020204" pitchFamily="34" charset="0"/>
+              </a:rPr>
+              <a:t>A</a:t>
+            </a:r>
+            <a:r>
+              <a:rPr lang="en-US" sz="2500" i="1" dirty="0">
+                <a:latin typeface="Helvetica" panose="020B0604020202020204" pitchFamily="34" charset="0"/>
+                <a:cs typeface="Helvetica" panose="020B0604020202020204" pitchFamily="34" charset="0"/>
+              </a:rPr>
+              <a:t>.</a:t>
+            </a:r>
+          </a:p>
+          <a:p>
+            <a:r>
+              <a:rPr lang="en-US" sz="2800" b="1" dirty="0">
+                <a:latin typeface="Helvetica" panose="020B0604020202020204" pitchFamily="34" charset="0"/>
+                <a:cs typeface="Helvetica" panose="020B0604020202020204" pitchFamily="34" charset="0"/>
+              </a:rPr>
+              <a:t>C</a:t>
+            </a:r>
+            <a:r>
+              <a:rPr lang="en-US" sz="2500" dirty="0">
+                <a:latin typeface="Helvetica" panose="020B0604020202020204" pitchFamily="34" charset="0"/>
+                <a:cs typeface="Helvetica" panose="020B0604020202020204" pitchFamily="34" charset="0"/>
+              </a:rPr>
+              <a:t> Q-Q plot for Manhattan in </a:t>
+            </a:r>
+            <a:r>
+              <a:rPr lang="en-US" sz="2800" b="1" dirty="0">
+                <a:latin typeface="Helvetica" panose="020B0604020202020204" pitchFamily="34" charset="0"/>
+                <a:cs typeface="Helvetica" panose="020B0604020202020204" pitchFamily="34" charset="0"/>
+              </a:rPr>
+              <a:t>B</a:t>
+            </a:r>
+            <a:r>
+              <a:rPr lang="en-US" sz="2500" dirty="0">
+                <a:latin typeface="Helvetica" panose="020B0604020202020204" pitchFamily="34" charset="0"/>
+                <a:cs typeface="Helvetica" panose="020B0604020202020204" pitchFamily="34" charset="0"/>
+              </a:rPr>
+              <a:t>. </a:t>
+            </a:r>
+            <a:r>
+              <a:rPr lang="en-US" sz="2800" b="1" dirty="0">
+                <a:latin typeface="Helvetica" panose="020B0604020202020204" pitchFamily="34" charset="0"/>
+                <a:cs typeface="Helvetica" panose="020B0604020202020204" pitchFamily="34" charset="0"/>
+              </a:rPr>
+              <a:t>D </a:t>
+            </a:r>
+            <a:r>
+              <a:rPr lang="en-US" sz="2500" i="1" dirty="0">
+                <a:latin typeface="Helvetica" panose="020B0604020202020204" pitchFamily="34" charset="0"/>
+                <a:cs typeface="Helvetica" panose="020B0604020202020204" pitchFamily="34" charset="0"/>
+              </a:rPr>
+              <a:t>Southern and northern sites have similar allelic effects on </a:t>
+            </a:r>
+            <a:r>
+              <a:rPr lang="en-US" sz="2500" i="1" dirty="0" err="1">
+                <a:latin typeface="Helvetica" panose="020B0604020202020204" pitchFamily="34" charset="0"/>
+                <a:cs typeface="Helvetica" panose="020B0604020202020204" pitchFamily="34" charset="0"/>
+              </a:rPr>
+              <a:t>greenup</a:t>
+            </a:r>
+            <a:r>
+              <a:rPr lang="en-US" sz="2500" i="1" dirty="0">
+                <a:latin typeface="Helvetica" panose="020B0604020202020204" pitchFamily="34" charset="0"/>
+                <a:cs typeface="Helvetica" panose="020B0604020202020204" pitchFamily="34" charset="0"/>
+              </a:rPr>
+              <a:t>. Mash analysis of alleles with pairwise similar effects.</a:t>
+            </a:r>
+          </a:p>
+        </p:txBody>
+      </p:sp>
+      <p:sp>
+        <p:nvSpPr>
+          <p:cNvPr id="49" name="TextBox 48">
+            <a:extLst>
+              <a:ext uri="{FF2B5EF4-FFF2-40B4-BE49-F238E27FC236}">
+                <a16:creationId xmlns:a16="http://schemas.microsoft.com/office/drawing/2014/main" id="{3D26A98B-D5D8-46AD-957B-52552D8DB23A}"/>
+              </a:ext>
+            </a:extLst>
+          </p:cNvPr>
+          <p:cNvSpPr txBox="1"/>
+          <p:nvPr/>
+        </p:nvSpPr>
+        <p:spPr>
+          <a:xfrm>
+            <a:off x="16328859" y="16667766"/>
+            <a:ext cx="16685794" cy="1338828"/>
+          </a:xfrm>
+          <a:prstGeom prst="rect">
+            <a:avLst/>
+          </a:prstGeom>
+          <a:noFill/>
+        </p:spPr>
+        <p:txBody>
+          <a:bodyPr wrap="square" rtlCol="0">
+            <a:spAutoFit/>
+          </a:bodyPr>
+          <a:lstStyle/>
+          <a:p>
+            <a:r>
+              <a:rPr lang="en-US" sz="2500" i="1" dirty="0">
+                <a:latin typeface="Helvetica" panose="020B0604020202020204" pitchFamily="34" charset="0"/>
+                <a:cs typeface="Helvetica" panose="020B0604020202020204" pitchFamily="34" charset="0"/>
+              </a:rPr>
+              <a:t>SNPs with significant associations with one or more </a:t>
+            </a:r>
+            <a:r>
+              <a:rPr lang="en-US" sz="2500" i="1" dirty="0" err="1">
+                <a:latin typeface="Helvetica" panose="020B0604020202020204" pitchFamily="34" charset="0"/>
+                <a:cs typeface="Helvetica" panose="020B0604020202020204" pitchFamily="34" charset="0"/>
+              </a:rPr>
+              <a:t>bioclim</a:t>
+            </a:r>
+            <a:r>
+              <a:rPr lang="en-US" sz="2500" i="1" dirty="0">
+                <a:latin typeface="Helvetica" panose="020B0604020202020204" pitchFamily="34" charset="0"/>
+                <a:cs typeface="Helvetica" panose="020B0604020202020204" pitchFamily="34" charset="0"/>
+              </a:rPr>
+              <a:t> variable. </a:t>
+            </a:r>
+            <a:r>
+              <a:rPr lang="en-US" sz="2800" b="1" dirty="0">
+                <a:latin typeface="Helvetica" panose="020B0604020202020204" pitchFamily="34" charset="0"/>
+                <a:cs typeface="Helvetica" panose="020B0604020202020204" pitchFamily="34" charset="0"/>
+              </a:rPr>
+              <a:t>A</a:t>
+            </a:r>
+            <a:r>
+              <a:rPr lang="en-US" sz="2500" b="1" i="1" dirty="0">
+                <a:latin typeface="Helvetica" panose="020B0604020202020204" pitchFamily="34" charset="0"/>
+                <a:cs typeface="Helvetica" panose="020B0604020202020204" pitchFamily="34" charset="0"/>
+              </a:rPr>
+              <a:t> </a:t>
+            </a:r>
+            <a:r>
+              <a:rPr lang="en-US" sz="2500" i="1" dirty="0">
+                <a:latin typeface="Helvetica" panose="020B0604020202020204" pitchFamily="34" charset="0"/>
+                <a:cs typeface="Helvetica" panose="020B0604020202020204" pitchFamily="34" charset="0"/>
+              </a:rPr>
+              <a:t>Significant SNPs were typically associated with 14-18 </a:t>
+            </a:r>
+            <a:r>
+              <a:rPr lang="en-US" sz="2500" i="1" dirty="0" err="1">
+                <a:latin typeface="Helvetica" panose="020B0604020202020204" pitchFamily="34" charset="0"/>
+                <a:cs typeface="Helvetica" panose="020B0604020202020204" pitchFamily="34" charset="0"/>
+              </a:rPr>
+              <a:t>bioclim</a:t>
+            </a:r>
+            <a:r>
+              <a:rPr lang="en-US" sz="2500" i="1" dirty="0">
+                <a:latin typeface="Helvetica" panose="020B0604020202020204" pitchFamily="34" charset="0"/>
+                <a:cs typeface="Helvetica" panose="020B0604020202020204" pitchFamily="34" charset="0"/>
+              </a:rPr>
+              <a:t> variables when analyzed with mash (</a:t>
+            </a:r>
+            <a:r>
+              <a:rPr lang="en-US" sz="2500" i="1" dirty="0" err="1">
+                <a:latin typeface="Helvetica" panose="020B0604020202020204" pitchFamily="34" charset="0"/>
+                <a:cs typeface="Helvetica" panose="020B0604020202020204" pitchFamily="34" charset="0"/>
+              </a:rPr>
+              <a:t>Urbut</a:t>
+            </a:r>
+            <a:r>
+              <a:rPr lang="en-US" sz="2500" i="1" dirty="0">
+                <a:latin typeface="Helvetica" panose="020B0604020202020204" pitchFamily="34" charset="0"/>
+                <a:cs typeface="Helvetica" panose="020B0604020202020204" pitchFamily="34" charset="0"/>
+              </a:rPr>
+              <a:t> et al., 2019 Nat. Gen.) Three nearby genes are noted. </a:t>
+            </a:r>
+          </a:p>
+          <a:p>
+            <a:r>
+              <a:rPr lang="en-US" sz="2500" i="1" dirty="0">
+                <a:latin typeface="Helvetica" panose="020B0604020202020204" pitchFamily="34" charset="0"/>
+                <a:cs typeface="Helvetica" panose="020B0604020202020204" pitchFamily="34" charset="0"/>
+              </a:rPr>
+              <a:t> </a:t>
+            </a:r>
+            <a:r>
+              <a:rPr lang="en-US" sz="2800" b="1" dirty="0">
+                <a:latin typeface="Helvetica" panose="020B0604020202020204" pitchFamily="34" charset="0"/>
+                <a:cs typeface="Helvetica" panose="020B0604020202020204" pitchFamily="34" charset="0"/>
+              </a:rPr>
+              <a:t>B</a:t>
+            </a:r>
+            <a:r>
+              <a:rPr lang="en-US" sz="2500" i="1" dirty="0">
+                <a:latin typeface="Helvetica" panose="020B0604020202020204" pitchFamily="34" charset="0"/>
+                <a:cs typeface="Helvetica" panose="020B0604020202020204" pitchFamily="34" charset="0"/>
+              </a:rPr>
+              <a:t> The starred allele in </a:t>
+            </a:r>
+            <a:r>
+              <a:rPr lang="en-US" sz="2800" b="1" dirty="0">
+                <a:latin typeface="Helvetica" panose="020B0604020202020204" pitchFamily="34" charset="0"/>
+                <a:cs typeface="Helvetica" panose="020B0604020202020204" pitchFamily="34" charset="0"/>
+              </a:rPr>
+              <a:t>A</a:t>
+            </a:r>
+            <a:r>
+              <a:rPr lang="en-US" sz="2500" i="1" dirty="0">
+                <a:latin typeface="Helvetica" panose="020B0604020202020204" pitchFamily="34" charset="0"/>
+                <a:cs typeface="Helvetica" panose="020B0604020202020204" pitchFamily="34" charset="0"/>
+              </a:rPr>
+              <a:t> has alternate alleles found in plants from consistent temperature, warmer climates.</a:t>
+            </a:r>
+            <a:endParaRPr lang="en-US" sz="2500" dirty="0">
+              <a:latin typeface="Helvetica" panose="020B0604020202020204" pitchFamily="34" charset="0"/>
+              <a:cs typeface="Helvetica" panose="020B0604020202020204" pitchFamily="34" charset="0"/>
+            </a:endParaRPr>
+          </a:p>
+        </p:txBody>
+      </p:sp>
       <p:pic>
         <p:nvPicPr>
-          <p:cNvPr id="2" name="Picture 1"/>
+          <p:cNvPr id="10" name="Picture 9" descr="A close up of text on a white background&#10;&#10;Description automatically generated">
+            <a:extLst>
+              <a:ext uri="{FF2B5EF4-FFF2-40B4-BE49-F238E27FC236}">
+                <a16:creationId xmlns:a16="http://schemas.microsoft.com/office/drawing/2014/main" id="{C038CA5A-F9DD-4311-9442-0DE982E48672}"/>
+              </a:ext>
+            </a:extLst>
+          </p:cNvPr>
           <p:cNvPicPr>
             <a:picLocks noChangeAspect="1"/>
           </p:cNvPicPr>
           <p:nvPr/>
         </p:nvPicPr>
-        <p:blipFill>
-          <a:blip r:embed="rId6" cstate="print">
+        <p:blipFill rotWithShape="1">
+          <a:blip r:embed="rId6">
             <a:extLst>
               <a:ext uri="{28A0092B-C50C-407E-A947-70E740481C1C}">
                 <a14:useLocalDpi xmlns:a14="http://schemas.microsoft.com/office/drawing/2010/main" val="0"/>
               </a:ext>
             </a:extLst>
           </a:blip>
-          <a:stretch>
-            <a:fillRect/>
-          </a:stretch>
+          <a:srcRect b="610"/>
+          <a:stretch/>
         </p:blipFill>
         <p:spPr>
           <a:xfrm>
-            <a:off x="1858809" y="21139510"/>
-            <a:ext cx="10058400" cy="3352799"/>
+            <a:off x="18857477" y="4818637"/>
+            <a:ext cx="11510246" cy="5750303"/>
           </a:xfrm>
           <a:prstGeom prst="rect">
             <a:avLst/>
           </a:prstGeom>
         </p:spPr>
       </p:pic>
+      <p:sp>
+        <p:nvSpPr>
+          <p:cNvPr id="65" name="TextBox 64">
+            <a:extLst>
+              <a:ext uri="{FF2B5EF4-FFF2-40B4-BE49-F238E27FC236}">
+                <a16:creationId xmlns:a16="http://schemas.microsoft.com/office/drawing/2014/main" id="{39AB7BE9-C136-4BA5-B0FA-F7FB3E05A418}"/>
+              </a:ext>
+            </a:extLst>
+          </p:cNvPr>
+          <p:cNvSpPr txBox="1"/>
+          <p:nvPr/>
+        </p:nvSpPr>
+        <p:spPr>
+          <a:xfrm>
+            <a:off x="16081507" y="6904904"/>
+            <a:ext cx="2693240" cy="3554819"/>
+          </a:xfrm>
+          <a:prstGeom prst="rect">
+            <a:avLst/>
+          </a:prstGeom>
+          <a:noFill/>
+        </p:spPr>
+        <p:txBody>
+          <a:bodyPr wrap="square" rtlCol="0">
+            <a:spAutoFit/>
+          </a:bodyPr>
+          <a:lstStyle/>
+          <a:p>
+            <a:r>
+              <a:rPr lang="en-US" sz="2500" i="1" dirty="0">
+                <a:latin typeface="Helvetica" panose="020B0604020202020204" pitchFamily="34" charset="0"/>
+                <a:cs typeface="Helvetica" panose="020B0604020202020204" pitchFamily="34" charset="0"/>
+              </a:rPr>
+              <a:t>Major phenotypic and genetic groups in the tetraploid switchgrass diversity panel. Plant specimens for the five major types are shown. </a:t>
+            </a:r>
+          </a:p>
+        </p:txBody>
+      </p:sp>
+      <p:sp>
+        <p:nvSpPr>
+          <p:cNvPr id="85" name="Rectangle 84">
+            <a:extLst>
+              <a:ext uri="{FF2B5EF4-FFF2-40B4-BE49-F238E27FC236}">
+                <a16:creationId xmlns:a16="http://schemas.microsoft.com/office/drawing/2014/main" id="{EAEE8B1B-3558-4EB6-ADEF-C431E2343D70}"/>
+              </a:ext>
+            </a:extLst>
+          </p:cNvPr>
+          <p:cNvSpPr/>
+          <p:nvPr/>
+        </p:nvSpPr>
+        <p:spPr>
+          <a:xfrm>
+            <a:off x="16384011" y="12062755"/>
+            <a:ext cx="16351509" cy="4588469"/>
+          </a:xfrm>
+          <a:prstGeom prst="rect">
+            <a:avLst/>
+          </a:prstGeom>
+          <a:solidFill>
+            <a:schemeClr val="bg1"/>
+          </a:solidFill>
+          <a:ln>
+            <a:solidFill>
+              <a:schemeClr val="bg1"/>
+            </a:solidFill>
+          </a:ln>
+        </p:spPr>
+        <p:style>
+          <a:lnRef idx="2">
+            <a:schemeClr val="accent1">
+              <a:shade val="50000"/>
+            </a:schemeClr>
+          </a:lnRef>
+          <a:fillRef idx="1">
+            <a:schemeClr val="accent1"/>
+          </a:fillRef>
+          <a:effectRef idx="0">
+            <a:schemeClr val="accent1"/>
+          </a:effectRef>
+          <a:fontRef idx="minor">
+            <a:schemeClr val="lt1"/>
+          </a:fontRef>
+        </p:style>
+        <p:txBody>
+          <a:bodyPr rtlCol="0" anchor="ctr"/>
+          <a:lstStyle/>
+          <a:p>
+            <a:pPr algn="ctr"/>
+            <a:endParaRPr lang="en-US"/>
+          </a:p>
+        </p:txBody>
+      </p:sp>
+      <p:sp>
+        <p:nvSpPr>
+          <p:cNvPr id="88" name="TextBox 87">
+            <a:extLst>
+              <a:ext uri="{FF2B5EF4-FFF2-40B4-BE49-F238E27FC236}">
+                <a16:creationId xmlns:a16="http://schemas.microsoft.com/office/drawing/2014/main" id="{BA890FB5-7228-4D35-86B0-273994EC2747}"/>
+              </a:ext>
+            </a:extLst>
+          </p:cNvPr>
+          <p:cNvSpPr txBox="1"/>
+          <p:nvPr/>
+        </p:nvSpPr>
+        <p:spPr>
+          <a:xfrm>
+            <a:off x="19888200" y="19291185"/>
+            <a:ext cx="10706100" cy="2923877"/>
+          </a:xfrm>
+          <a:prstGeom prst="rect">
+            <a:avLst/>
+          </a:prstGeom>
+          <a:noFill/>
+        </p:spPr>
+        <p:txBody>
+          <a:bodyPr wrap="square" rtlCol="0">
+            <a:spAutoFit/>
+          </a:bodyPr>
+          <a:lstStyle/>
+          <a:p>
+            <a:r>
+              <a:rPr lang="en-US" sz="2800" b="1" dirty="0">
+                <a:latin typeface="Helvetica" panose="020B0604020202020204" pitchFamily="34" charset="0"/>
+                <a:cs typeface="Helvetica" panose="020B0604020202020204" pitchFamily="34" charset="0"/>
+              </a:rPr>
+              <a:t>E </a:t>
+            </a:r>
+            <a:r>
+              <a:rPr lang="en-US" sz="2500" i="1" dirty="0">
+                <a:latin typeface="Helvetica" panose="020B0604020202020204" pitchFamily="34" charset="0"/>
+                <a:cs typeface="Helvetica" panose="020B0604020202020204" pitchFamily="34" charset="0"/>
+              </a:rPr>
+              <a:t>Biomass shows environment and ecotype by environment effects. Sites are arranged in latitudinal order and bars are colored by plant ecotype. </a:t>
+            </a:r>
+          </a:p>
+          <a:p>
+            <a:r>
+              <a:rPr lang="en-US" sz="2800" b="1" dirty="0">
+                <a:latin typeface="Helvetica" panose="020B0604020202020204" pitchFamily="34" charset="0"/>
+                <a:cs typeface="Helvetica" panose="020B0604020202020204" pitchFamily="34" charset="0"/>
+              </a:rPr>
+              <a:t>F</a:t>
+            </a:r>
+            <a:r>
+              <a:rPr lang="en-US" sz="2500" i="1" dirty="0">
+                <a:latin typeface="Helvetica" panose="020B0604020202020204" pitchFamily="34" charset="0"/>
+                <a:cs typeface="Helvetica" panose="020B0604020202020204" pitchFamily="34" charset="0"/>
+              </a:rPr>
+              <a:t> Manhattan plot for the starred distribution in </a:t>
+            </a:r>
+            <a:r>
+              <a:rPr lang="en-US" sz="2800" b="1" dirty="0">
+                <a:latin typeface="Helvetica" panose="020B0604020202020204" pitchFamily="34" charset="0"/>
+                <a:cs typeface="Helvetica" panose="020B0604020202020204" pitchFamily="34" charset="0"/>
+              </a:rPr>
+              <a:t>E</a:t>
+            </a:r>
+            <a:r>
+              <a:rPr lang="en-US" sz="2500" i="1" dirty="0">
+                <a:latin typeface="Helvetica" panose="020B0604020202020204" pitchFamily="34" charset="0"/>
+                <a:cs typeface="Helvetica" panose="020B0604020202020204" pitchFamily="34" charset="0"/>
+              </a:rPr>
+              <a:t>, biomass in Temple, Texas. Dotted line indicates the 5% false discovery rate threshold.</a:t>
+            </a:r>
+          </a:p>
+          <a:p>
+            <a:r>
+              <a:rPr lang="en-US" sz="2800" b="1" dirty="0">
+                <a:latin typeface="Helvetica" panose="020B0604020202020204" pitchFamily="34" charset="0"/>
+                <a:cs typeface="Helvetica" panose="020B0604020202020204" pitchFamily="34" charset="0"/>
+              </a:rPr>
+              <a:t>G</a:t>
+            </a:r>
+            <a:r>
+              <a:rPr lang="en-US" sz="2500" i="1" dirty="0">
+                <a:latin typeface="Helvetica" panose="020B0604020202020204" pitchFamily="34" charset="0"/>
+                <a:cs typeface="Helvetica" panose="020B0604020202020204" pitchFamily="34" charset="0"/>
+              </a:rPr>
+              <a:t> The effect sizes for the starred allele in </a:t>
+            </a:r>
+            <a:r>
+              <a:rPr lang="en-US" sz="2800" b="1" dirty="0">
+                <a:latin typeface="Helvetica" panose="020B0604020202020204" pitchFamily="34" charset="0"/>
+                <a:cs typeface="Helvetica" panose="020B0604020202020204" pitchFamily="34" charset="0"/>
+              </a:rPr>
+              <a:t>F</a:t>
+            </a:r>
+            <a:r>
+              <a:rPr lang="en-US" sz="2500" i="1" dirty="0">
+                <a:latin typeface="Helvetica" panose="020B0604020202020204" pitchFamily="34" charset="0"/>
+                <a:cs typeface="Helvetica" panose="020B0604020202020204" pitchFamily="34" charset="0"/>
+              </a:rPr>
+              <a:t>, analyzed using mash (</a:t>
+            </a:r>
+            <a:r>
+              <a:rPr lang="en-US" sz="2500" i="1" dirty="0" err="1">
+                <a:latin typeface="Helvetica" panose="020B0604020202020204" pitchFamily="34" charset="0"/>
+                <a:cs typeface="Helvetica" panose="020B0604020202020204" pitchFamily="34" charset="0"/>
+              </a:rPr>
+              <a:t>Urbut</a:t>
+            </a:r>
+            <a:r>
+              <a:rPr lang="en-US" sz="2500" i="1" dirty="0">
+                <a:latin typeface="Helvetica" panose="020B0604020202020204" pitchFamily="34" charset="0"/>
+                <a:cs typeface="Helvetica" panose="020B0604020202020204" pitchFamily="34" charset="0"/>
+              </a:rPr>
+              <a:t> et al., 2019 Nat. Gen). </a:t>
+            </a:r>
+            <a:r>
+              <a:rPr lang="en-US" sz="2400" i="1" dirty="0">
+                <a:latin typeface="Helvetica" panose="020B0604020202020204" pitchFamily="34" charset="0"/>
+                <a:cs typeface="Helvetica" panose="020B0604020202020204" pitchFamily="34" charset="0"/>
+              </a:rPr>
+              <a:t>This SNP</a:t>
+            </a:r>
+            <a:r>
+              <a:rPr lang="en-US" sz="2500" i="1" dirty="0">
+                <a:latin typeface="Helvetica" panose="020B0604020202020204" pitchFamily="34" charset="0"/>
+                <a:cs typeface="Helvetica" panose="020B0604020202020204" pitchFamily="34" charset="0"/>
+              </a:rPr>
+              <a:t> has an alternate allele that increases biomass at all ten sites with a latitudinal gradient in effect magnitude.</a:t>
+            </a:r>
+          </a:p>
+        </p:txBody>
+      </p:sp>
       <p:pic>
         <p:nvPicPr>
-          <p:cNvPr id="3" name="Picture 2"/>
+          <p:cNvPr id="97" name="Picture 96" descr="A picture containing object, microscope, ship, light&#10;&#10;Description automatically generated">
+            <a:extLst>
+              <a:ext uri="{FF2B5EF4-FFF2-40B4-BE49-F238E27FC236}">
+                <a16:creationId xmlns:a16="http://schemas.microsoft.com/office/drawing/2014/main" id="{0C7B98B2-E807-42B9-82EF-A3B14C321F11}"/>
+              </a:ext>
+            </a:extLst>
+          </p:cNvPr>
           <p:cNvPicPr>
             <a:picLocks noChangeAspect="1"/>
           </p:cNvPicPr>
@@ -5575,17 +5991,131 @@
         </p:blipFill>
         <p:spPr>
           <a:xfrm>
-            <a:off x="14159248" y="20976133"/>
-            <a:ext cx="10058400" cy="3352799"/>
+            <a:off x="18478501" y="22383746"/>
+            <a:ext cx="12192010" cy="3048003"/>
           </a:xfrm>
           <a:prstGeom prst="rect">
             <a:avLst/>
           </a:prstGeom>
         </p:spPr>
       </p:pic>
+      <p:sp>
+        <p:nvSpPr>
+          <p:cNvPr id="79" name="Star: 5 Points 78">
+            <a:extLst>
+              <a:ext uri="{FF2B5EF4-FFF2-40B4-BE49-F238E27FC236}">
+                <a16:creationId xmlns:a16="http://schemas.microsoft.com/office/drawing/2014/main" id="{AF9C486A-3394-4F80-A1CB-8C6DAC58A1A5}"/>
+              </a:ext>
+            </a:extLst>
+          </p:cNvPr>
+          <p:cNvSpPr/>
+          <p:nvPr/>
+        </p:nvSpPr>
+        <p:spPr>
+          <a:xfrm>
+            <a:off x="19836707" y="22771994"/>
+            <a:ext cx="342900" cy="342900"/>
+          </a:xfrm>
+          <a:prstGeom prst="star5">
+            <a:avLst/>
+          </a:prstGeom>
+          <a:solidFill>
+            <a:srgbClr val="FAC127"/>
+          </a:solidFill>
+          <a:ln>
+            <a:solidFill>
+              <a:schemeClr val="tx1"/>
+            </a:solidFill>
+          </a:ln>
+        </p:spPr>
+        <p:style>
+          <a:lnRef idx="2">
+            <a:schemeClr val="accent1">
+              <a:shade val="50000"/>
+            </a:schemeClr>
+          </a:lnRef>
+          <a:fillRef idx="1">
+            <a:schemeClr val="accent1"/>
+          </a:fillRef>
+          <a:effectRef idx="0">
+            <a:schemeClr val="accent1"/>
+          </a:effectRef>
+          <a:fontRef idx="minor">
+            <a:schemeClr val="lt1"/>
+          </a:fontRef>
+        </p:style>
+        <p:txBody>
+          <a:bodyPr rtlCol="0" anchor="ctr"/>
+          <a:lstStyle/>
+          <a:p>
+            <a:pPr algn="ctr"/>
+            <a:endParaRPr lang="en-US"/>
+          </a:p>
+        </p:txBody>
+      </p:sp>
+      <p:sp>
+        <p:nvSpPr>
+          <p:cNvPr id="102" name="Rectangle 101">
+            <a:extLst>
+              <a:ext uri="{FF2B5EF4-FFF2-40B4-BE49-F238E27FC236}">
+                <a16:creationId xmlns:a16="http://schemas.microsoft.com/office/drawing/2014/main" id="{226D2746-1653-43D7-AA6B-4B6CDD3E00F7}"/>
+              </a:ext>
+            </a:extLst>
+          </p:cNvPr>
+          <p:cNvSpPr/>
+          <p:nvPr/>
+        </p:nvSpPr>
+        <p:spPr>
+          <a:xfrm>
+            <a:off x="2616200" y="21793200"/>
+            <a:ext cx="7493000" cy="3657600"/>
+          </a:xfrm>
+          <a:prstGeom prst="rect">
+            <a:avLst/>
+          </a:prstGeom>
+          <a:solidFill>
+            <a:schemeClr val="bg1"/>
+          </a:solidFill>
+          <a:ln>
+            <a:solidFill>
+              <a:schemeClr val="bg1"/>
+            </a:solidFill>
+          </a:ln>
+        </p:spPr>
+        <p:style>
+          <a:lnRef idx="2">
+            <a:schemeClr val="accent1">
+              <a:shade val="50000"/>
+            </a:schemeClr>
+          </a:lnRef>
+          <a:fillRef idx="1">
+            <a:schemeClr val="accent1"/>
+          </a:fillRef>
+          <a:effectRef idx="0">
+            <a:schemeClr val="accent1"/>
+          </a:effectRef>
+          <a:fontRef idx="minor">
+            <a:schemeClr val="lt1"/>
+          </a:fontRef>
+        </p:style>
+        <p:txBody>
+          <a:bodyPr rtlCol="0" anchor="ctr"/>
+          <a:lstStyle/>
+          <a:p>
+            <a:pPr algn="ctr"/>
+            <a:endParaRPr lang="en-US"/>
+          </a:p>
+        </p:txBody>
+      </p:sp>
       <p:pic>
         <p:nvPicPr>
-          <p:cNvPr id="4" name="Picture 3"/>
+          <p:cNvPr id="99" name="Picture 98" descr="A picture containing table&#10;&#10;Description automatically generated">
+            <a:extLst>
+              <a:ext uri="{FF2B5EF4-FFF2-40B4-BE49-F238E27FC236}">
+                <a16:creationId xmlns:a16="http://schemas.microsoft.com/office/drawing/2014/main" id="{40ABF4CA-1897-4A58-A301-ED70BD4474AF}"/>
+              </a:ext>
+            </a:extLst>
+          </p:cNvPr>
           <p:cNvPicPr>
             <a:picLocks noChangeAspect="1"/>
           </p:cNvPicPr>
@@ -5605,8 +6135,8 @@
         </p:blipFill>
         <p:spPr>
           <a:xfrm>
-            <a:off x="26042763" y="20823567"/>
-            <a:ext cx="10058400" cy="3352799"/>
+            <a:off x="4229100" y="19278596"/>
+            <a:ext cx="12192011" cy="3048003"/>
           </a:xfrm>
           <a:prstGeom prst="rect">
             <a:avLst/>
@@ -5615,150 +6145,67 @@
       </p:pic>
       <p:sp>
         <p:nvSpPr>
-          <p:cNvPr id="43" name="TextBox 42"/>
-          <p:cNvSpPr txBox="1"/>
+          <p:cNvPr id="80" name="Star: 5 Points 79">
+            <a:extLst>
+              <a:ext uri="{FF2B5EF4-FFF2-40B4-BE49-F238E27FC236}">
+                <a16:creationId xmlns:a16="http://schemas.microsoft.com/office/drawing/2014/main" id="{BE2974F1-BAA0-4135-854D-9BC48B7ACA00}"/>
+              </a:ext>
+            </a:extLst>
+          </p:cNvPr>
+          <p:cNvSpPr/>
           <p:nvPr/>
         </p:nvSpPr>
         <p:spPr>
           <a:xfrm>
-            <a:off x="26042763" y="24244185"/>
-            <a:ext cx="9194604" cy="523220"/>
-          </a:xfrm>
-          <a:prstGeom prst="rect">
-            <a:avLst/>
-          </a:prstGeom>
-          <a:noFill/>
-        </p:spPr>
-        <p:txBody>
-          <a:bodyPr wrap="square" rtlCol="0">
-            <a:spAutoFit/>
-          </a:bodyPr>
-          <a:lstStyle/>
-          <a:p>
-            <a:r>
-              <a:rPr lang="en-US" sz="2800" b="1" dirty="0" smtClean="0">
-                <a:latin typeface="Helvetica" panose="020B0604020202020204" pitchFamily="34" charset="0"/>
-                <a:cs typeface="Helvetica" panose="020B0604020202020204" pitchFamily="34" charset="0"/>
-              </a:rPr>
-              <a:t>A </a:t>
-            </a:r>
-            <a:r>
-              <a:rPr lang="en-US" sz="2500" i="1" dirty="0" smtClean="0">
-                <a:latin typeface="Helvetica" panose="020B0604020202020204" pitchFamily="34" charset="0"/>
-                <a:cs typeface="Helvetica" panose="020B0604020202020204" pitchFamily="34" charset="0"/>
-              </a:rPr>
-              <a:t>Associations for 50% Greenup in Michigan</a:t>
-            </a:r>
-            <a:endParaRPr lang="en-US" sz="2500" i="1" dirty="0">
-              <a:latin typeface="Helvetica" panose="020B0604020202020204" pitchFamily="34" charset="0"/>
-              <a:cs typeface="Helvetica" panose="020B0604020202020204" pitchFamily="34" charset="0"/>
-            </a:endParaRPr>
-          </a:p>
-        </p:txBody>
-      </p:sp>
-      <p:sp>
-        <p:nvSpPr>
-          <p:cNvPr id="50" name="TextBox 49"/>
-          <p:cNvSpPr txBox="1"/>
-          <p:nvPr/>
-        </p:nvSpPr>
-        <p:spPr>
-          <a:xfrm>
-            <a:off x="14159248" y="24328932"/>
-            <a:ext cx="9194604" cy="523220"/>
-          </a:xfrm>
-          <a:prstGeom prst="rect">
-            <a:avLst/>
-          </a:prstGeom>
-          <a:noFill/>
-        </p:spPr>
-        <p:txBody>
-          <a:bodyPr wrap="square" rtlCol="0">
-            <a:spAutoFit/>
-          </a:bodyPr>
-          <a:lstStyle/>
-          <a:p>
-            <a:r>
-              <a:rPr lang="en-US" sz="2800" b="1" dirty="0" smtClean="0">
-                <a:latin typeface="Helvetica" panose="020B0604020202020204" pitchFamily="34" charset="0"/>
-                <a:cs typeface="Helvetica" panose="020B0604020202020204" pitchFamily="34" charset="0"/>
-              </a:rPr>
-              <a:t>A </a:t>
-            </a:r>
-            <a:r>
-              <a:rPr lang="en-US" sz="2500" i="1" dirty="0" smtClean="0">
-                <a:latin typeface="Helvetica" panose="020B0604020202020204" pitchFamily="34" charset="0"/>
-                <a:cs typeface="Helvetica" panose="020B0604020202020204" pitchFamily="34" charset="0"/>
-              </a:rPr>
-              <a:t>Associations for biomass in Temple, Texas</a:t>
-            </a:r>
-            <a:endParaRPr lang="en-US" sz="2500" i="1" dirty="0">
-              <a:latin typeface="Helvetica" panose="020B0604020202020204" pitchFamily="34" charset="0"/>
-              <a:cs typeface="Helvetica" panose="020B0604020202020204" pitchFamily="34" charset="0"/>
-            </a:endParaRPr>
-          </a:p>
-        </p:txBody>
-      </p:sp>
-      <p:sp>
-        <p:nvSpPr>
-          <p:cNvPr id="54" name="TextBox 53"/>
-          <p:cNvSpPr txBox="1"/>
-          <p:nvPr/>
-        </p:nvSpPr>
-        <p:spPr>
-          <a:xfrm>
-            <a:off x="1828218" y="24491787"/>
-            <a:ext cx="11191095" cy="523220"/>
-          </a:xfrm>
-          <a:prstGeom prst="rect">
-            <a:avLst/>
-          </a:prstGeom>
-          <a:noFill/>
-        </p:spPr>
-        <p:txBody>
-          <a:bodyPr wrap="square" rtlCol="0">
-            <a:spAutoFit/>
-          </a:bodyPr>
-          <a:lstStyle/>
-          <a:p>
-            <a:r>
-              <a:rPr lang="en-US" sz="2800" b="1" dirty="0" smtClean="0">
-                <a:latin typeface="Helvetica" panose="020B0604020202020204" pitchFamily="34" charset="0"/>
-                <a:cs typeface="Helvetica" panose="020B0604020202020204" pitchFamily="34" charset="0"/>
-              </a:rPr>
-              <a:t>A </a:t>
-            </a:r>
-            <a:r>
-              <a:rPr lang="en-US" sz="2500" i="1" dirty="0" smtClean="0">
-                <a:latin typeface="Helvetica" panose="020B0604020202020204" pitchFamily="34" charset="0"/>
-                <a:cs typeface="Helvetica" panose="020B0604020202020204" pitchFamily="34" charset="0"/>
-              </a:rPr>
-              <a:t>Associations for the time between </a:t>
-            </a:r>
-            <a:r>
-              <a:rPr lang="en-US" sz="2500" i="1" dirty="0" err="1" smtClean="0">
-                <a:latin typeface="Helvetica" panose="020B0604020202020204" pitchFamily="34" charset="0"/>
-                <a:cs typeface="Helvetica" panose="020B0604020202020204" pitchFamily="34" charset="0"/>
-              </a:rPr>
-              <a:t>greenup</a:t>
-            </a:r>
-            <a:r>
-              <a:rPr lang="en-US" sz="2500" i="1" dirty="0" smtClean="0">
-                <a:latin typeface="Helvetica" panose="020B0604020202020204" pitchFamily="34" charset="0"/>
-                <a:cs typeface="Helvetica" panose="020B0604020202020204" pitchFamily="34" charset="0"/>
-              </a:rPr>
-              <a:t> and flowering in Temple, Texas</a:t>
-            </a:r>
-            <a:endParaRPr lang="en-US" sz="2500" i="1" dirty="0">
-              <a:latin typeface="Helvetica" panose="020B0604020202020204" pitchFamily="34" charset="0"/>
-              <a:cs typeface="Helvetica" panose="020B0604020202020204" pitchFamily="34" charset="0"/>
-            </a:endParaRPr>
+            <a:off x="4713705" y="19504181"/>
+            <a:ext cx="342900" cy="342900"/>
+          </a:xfrm>
+          <a:prstGeom prst="star5">
+            <a:avLst/>
+          </a:prstGeom>
+          <a:solidFill>
+            <a:srgbClr val="D44842"/>
+          </a:solidFill>
+          <a:ln>
+            <a:solidFill>
+              <a:schemeClr val="tx1"/>
+            </a:solidFill>
+          </a:ln>
+        </p:spPr>
+        <p:style>
+          <a:lnRef idx="2">
+            <a:schemeClr val="accent1">
+              <a:shade val="50000"/>
+            </a:schemeClr>
+          </a:lnRef>
+          <a:fillRef idx="1">
+            <a:schemeClr val="accent1"/>
+          </a:fillRef>
+          <a:effectRef idx="0">
+            <a:schemeClr val="accent1"/>
+          </a:effectRef>
+          <a:fontRef idx="minor">
+            <a:schemeClr val="lt1"/>
+          </a:fontRef>
+        </p:style>
+        <p:txBody>
+          <a:bodyPr rtlCol="0" anchor="ctr"/>
+          <a:lstStyle/>
+          <a:p>
+            <a:pPr algn="ctr"/>
+            <a:endParaRPr lang="en-US"/>
           </a:p>
         </p:txBody>
       </p:sp>
       <p:pic>
         <p:nvPicPr>
-          <p:cNvPr id="8" name="Picture 7"/>
+          <p:cNvPr id="104" name="Picture 103" descr="A screenshot of a cell phone&#10;&#10;Description automatically generated">
+            <a:extLst>
+              <a:ext uri="{FF2B5EF4-FFF2-40B4-BE49-F238E27FC236}">
+                <a16:creationId xmlns:a16="http://schemas.microsoft.com/office/drawing/2014/main" id="{1800C4EA-EC99-45BA-8EA5-3FCD850E5E9F}"/>
+              </a:ext>
+            </a:extLst>
+          </p:cNvPr>
           <p:cNvPicPr>
             <a:picLocks noChangeAspect="1"/>
           </p:cNvPicPr>
@@ -5778,17 +6225,131 @@
         </p:blipFill>
         <p:spPr>
           <a:xfrm>
-            <a:off x="33032700" y="11923475"/>
-            <a:ext cx="3373263" cy="5458353"/>
+            <a:off x="1214012" y="18434604"/>
+            <a:ext cx="9444081" cy="7854396"/>
           </a:xfrm>
           <a:prstGeom prst="rect">
             <a:avLst/>
           </a:prstGeom>
         </p:spPr>
       </p:pic>
+      <p:sp>
+        <p:nvSpPr>
+          <p:cNvPr id="81" name="Star: 5 Points 80">
+            <a:extLst>
+              <a:ext uri="{FF2B5EF4-FFF2-40B4-BE49-F238E27FC236}">
+                <a16:creationId xmlns:a16="http://schemas.microsoft.com/office/drawing/2014/main" id="{D6F4BC48-18A8-4099-93FC-AAC51144D0E4}"/>
+              </a:ext>
+            </a:extLst>
+          </p:cNvPr>
+          <p:cNvSpPr/>
+          <p:nvPr/>
+        </p:nvSpPr>
+        <p:spPr>
+          <a:xfrm>
+            <a:off x="2644253" y="19497925"/>
+            <a:ext cx="342900" cy="342900"/>
+          </a:xfrm>
+          <a:prstGeom prst="star5">
+            <a:avLst/>
+          </a:prstGeom>
+          <a:solidFill>
+            <a:srgbClr val="D44842"/>
+          </a:solidFill>
+          <a:ln>
+            <a:solidFill>
+              <a:schemeClr val="tx1"/>
+            </a:solidFill>
+          </a:ln>
+        </p:spPr>
+        <p:style>
+          <a:lnRef idx="2">
+            <a:schemeClr val="accent1">
+              <a:shade val="50000"/>
+            </a:schemeClr>
+          </a:lnRef>
+          <a:fillRef idx="1">
+            <a:schemeClr val="accent1"/>
+          </a:fillRef>
+          <a:effectRef idx="0">
+            <a:schemeClr val="accent1"/>
+          </a:effectRef>
+          <a:fontRef idx="minor">
+            <a:schemeClr val="lt1"/>
+          </a:fontRef>
+        </p:style>
+        <p:txBody>
+          <a:bodyPr rtlCol="0" anchor="ctr"/>
+          <a:lstStyle/>
+          <a:p>
+            <a:pPr algn="ctr"/>
+            <a:endParaRPr lang="en-US"/>
+          </a:p>
+        </p:txBody>
+      </p:sp>
+      <p:sp>
+        <p:nvSpPr>
+          <p:cNvPr id="107" name="Rectangle 106">
+            <a:extLst>
+              <a:ext uri="{FF2B5EF4-FFF2-40B4-BE49-F238E27FC236}">
+                <a16:creationId xmlns:a16="http://schemas.microsoft.com/office/drawing/2014/main" id="{26C1B90B-F8A5-4404-8D58-EA1177B8B863}"/>
+              </a:ext>
+            </a:extLst>
+          </p:cNvPr>
+          <p:cNvSpPr/>
+          <p:nvPr/>
+        </p:nvSpPr>
+        <p:spPr>
+          <a:xfrm>
+            <a:off x="30708600" y="18440400"/>
+            <a:ext cx="6515100" cy="6972300"/>
+          </a:xfrm>
+          <a:prstGeom prst="rect">
+            <a:avLst/>
+          </a:prstGeom>
+          <a:solidFill>
+            <a:schemeClr val="bg1"/>
+          </a:solidFill>
+          <a:ln>
+            <a:solidFill>
+              <a:schemeClr val="bg1"/>
+            </a:solidFill>
+          </a:ln>
+        </p:spPr>
+        <p:style>
+          <a:lnRef idx="2">
+            <a:schemeClr val="accent1">
+              <a:shade val="50000"/>
+            </a:schemeClr>
+          </a:lnRef>
+          <a:fillRef idx="1">
+            <a:schemeClr val="accent1"/>
+          </a:fillRef>
+          <a:effectRef idx="0">
+            <a:schemeClr val="accent1"/>
+          </a:effectRef>
+          <a:fontRef idx="minor">
+            <a:schemeClr val="lt1"/>
+          </a:fontRef>
+        </p:style>
+        <p:txBody>
+          <a:bodyPr rtlCol="0" anchor="ctr"/>
+          <a:lstStyle/>
+          <a:p>
+            <a:pPr algn="ctr"/>
+            <a:endParaRPr lang="en-US"/>
+          </a:p>
+        </p:txBody>
+      </p:sp>
       <p:pic>
         <p:nvPicPr>
-          <p:cNvPr id="18" name="Picture 17"/>
+          <p:cNvPr id="109" name="Picture 108" descr="A screenshot of a cell phone&#10;&#10;Description automatically generated">
+            <a:extLst>
+              <a:ext uri="{FF2B5EF4-FFF2-40B4-BE49-F238E27FC236}">
+                <a16:creationId xmlns:a16="http://schemas.microsoft.com/office/drawing/2014/main" id="{C0DF55F9-4ACD-488C-AEAF-2782F371D633}"/>
+              </a:ext>
+            </a:extLst>
+          </p:cNvPr>
           <p:cNvPicPr>
             <a:picLocks noChangeAspect="1"/>
           </p:cNvPicPr>
@@ -5808,17 +6369,125 @@
         </p:blipFill>
         <p:spPr>
           <a:xfrm>
-            <a:off x="16263453" y="14698683"/>
-            <a:ext cx="10058400" cy="2770945"/>
+            <a:off x="30670500" y="18431099"/>
+            <a:ext cx="6556862" cy="6999028"/>
           </a:xfrm>
           <a:prstGeom prst="rect">
             <a:avLst/>
           </a:prstGeom>
         </p:spPr>
       </p:pic>
+      <p:sp>
+        <p:nvSpPr>
+          <p:cNvPr id="78" name="Star: 5 Points 77">
+            <a:extLst>
+              <a:ext uri="{FF2B5EF4-FFF2-40B4-BE49-F238E27FC236}">
+                <a16:creationId xmlns:a16="http://schemas.microsoft.com/office/drawing/2014/main" id="{F9DE7E41-2450-45C9-A364-79C573D1F035}"/>
+              </a:ext>
+            </a:extLst>
+          </p:cNvPr>
+          <p:cNvSpPr/>
+          <p:nvPr/>
+        </p:nvSpPr>
+        <p:spPr>
+          <a:xfrm>
+            <a:off x="32232330" y="22868146"/>
+            <a:ext cx="342900" cy="342900"/>
+          </a:xfrm>
+          <a:prstGeom prst="star5">
+            <a:avLst/>
+          </a:prstGeom>
+          <a:solidFill>
+            <a:srgbClr val="FAC127"/>
+          </a:solidFill>
+          <a:ln>
+            <a:solidFill>
+              <a:schemeClr val="tx1"/>
+            </a:solidFill>
+          </a:ln>
+        </p:spPr>
+        <p:style>
+          <a:lnRef idx="2">
+            <a:schemeClr val="accent1">
+              <a:shade val="50000"/>
+            </a:schemeClr>
+          </a:lnRef>
+          <a:fillRef idx="1">
+            <a:schemeClr val="accent1"/>
+          </a:fillRef>
+          <a:effectRef idx="0">
+            <a:schemeClr val="accent1"/>
+          </a:effectRef>
+          <a:fontRef idx="minor">
+            <a:schemeClr val="lt1"/>
+          </a:fontRef>
+        </p:style>
+        <p:txBody>
+          <a:bodyPr rtlCol="0" anchor="ctr"/>
+          <a:lstStyle/>
+          <a:p>
+            <a:pPr algn="ctr"/>
+            <a:endParaRPr lang="en-US"/>
+          </a:p>
+        </p:txBody>
+      </p:sp>
+      <p:sp>
+        <p:nvSpPr>
+          <p:cNvPr id="111" name="Rectangle 110">
+            <a:extLst>
+              <a:ext uri="{FF2B5EF4-FFF2-40B4-BE49-F238E27FC236}">
+                <a16:creationId xmlns:a16="http://schemas.microsoft.com/office/drawing/2014/main" id="{F26D67E9-833C-4071-8C2F-6BAFBA1F729B}"/>
+              </a:ext>
+            </a:extLst>
+          </p:cNvPr>
+          <p:cNvSpPr/>
+          <p:nvPr/>
+        </p:nvSpPr>
+        <p:spPr>
+          <a:xfrm>
+            <a:off x="32317899" y="12064622"/>
+            <a:ext cx="2593074" cy="4585648"/>
+          </a:xfrm>
+          <a:prstGeom prst="rect">
+            <a:avLst/>
+          </a:prstGeom>
+          <a:solidFill>
+            <a:schemeClr val="bg1"/>
+          </a:solidFill>
+          <a:ln>
+            <a:solidFill>
+              <a:schemeClr val="bg1"/>
+            </a:solidFill>
+          </a:ln>
+        </p:spPr>
+        <p:style>
+          <a:lnRef idx="2">
+            <a:schemeClr val="accent1">
+              <a:shade val="50000"/>
+            </a:schemeClr>
+          </a:lnRef>
+          <a:fillRef idx="1">
+            <a:schemeClr val="accent1"/>
+          </a:fillRef>
+          <a:effectRef idx="0">
+            <a:schemeClr val="accent1"/>
+          </a:effectRef>
+          <a:fontRef idx="minor">
+            <a:schemeClr val="lt1"/>
+          </a:fontRef>
+        </p:style>
+        <p:txBody>
+          <a:bodyPr rtlCol="0" anchor="ctr"/>
+          <a:lstStyle/>
+          <a:p>
+            <a:pPr algn="ctr"/>
+            <a:endParaRPr lang="en-US"/>
+          </a:p>
+        </p:txBody>
+      </p:sp>
       <p:pic>
         <p:nvPicPr>
-          <p:cNvPr id="21" name="Picture 20"/>
+          <p:cNvPr id="8" name="Picture 7"/>
           <p:cNvPicPr>
             <a:picLocks noChangeAspect="1"/>
           </p:cNvPicPr>
@@ -5838,8 +6507,829 @@
         </p:blipFill>
         <p:spPr>
           <a:xfrm>
-            <a:off x="16263453" y="12060957"/>
-            <a:ext cx="10058400" cy="2514599"/>
+            <a:off x="33261300" y="12058167"/>
+            <a:ext cx="3373263" cy="5458353"/>
+          </a:xfrm>
+          <a:prstGeom prst="rect">
+            <a:avLst/>
+          </a:prstGeom>
+        </p:spPr>
+      </p:pic>
+      <p:pic>
+        <p:nvPicPr>
+          <p:cNvPr id="18" name="Picture 17"/>
+          <p:cNvPicPr>
+            <a:picLocks noChangeAspect="1"/>
+          </p:cNvPicPr>
+          <p:nvPr/>
+        </p:nvPicPr>
+        <p:blipFill>
+          <a:blip r:embed="rId12" cstate="print">
+            <a:extLst>
+              <a:ext uri="{28A0092B-C50C-407E-A947-70E740481C1C}">
+                <a14:useLocalDpi xmlns:a14="http://schemas.microsoft.com/office/drawing/2010/main" val="0"/>
+              </a:ext>
+            </a:extLst>
+          </a:blip>
+          <a:stretch>
+            <a:fillRect/>
+          </a:stretch>
+        </p:blipFill>
+        <p:spPr>
+          <a:xfrm>
+            <a:off x="16383000" y="12175701"/>
+            <a:ext cx="16225353" cy="4469852"/>
+          </a:xfrm>
+          <a:prstGeom prst="rect">
+            <a:avLst/>
+          </a:prstGeom>
+        </p:spPr>
+      </p:pic>
+      <p:sp>
+        <p:nvSpPr>
+          <p:cNvPr id="82" name="Star: 5 Points 81">
+            <a:extLst>
+              <a:ext uri="{FF2B5EF4-FFF2-40B4-BE49-F238E27FC236}">
+                <a16:creationId xmlns:a16="http://schemas.microsoft.com/office/drawing/2014/main" id="{9FF2CC26-D7FC-4E37-839C-AD8D2BD52630}"/>
+              </a:ext>
+            </a:extLst>
+          </p:cNvPr>
+          <p:cNvSpPr/>
+          <p:nvPr/>
+        </p:nvSpPr>
+        <p:spPr>
+          <a:xfrm>
+            <a:off x="21965734" y="12183804"/>
+            <a:ext cx="342900" cy="342900"/>
+          </a:xfrm>
+          <a:prstGeom prst="star5">
+            <a:avLst/>
+          </a:prstGeom>
+          <a:solidFill>
+            <a:srgbClr val="292D6A"/>
+          </a:solidFill>
+          <a:ln>
+            <a:solidFill>
+              <a:srgbClr val="262B70"/>
+            </a:solidFill>
+          </a:ln>
+        </p:spPr>
+        <p:style>
+          <a:lnRef idx="2">
+            <a:schemeClr val="accent1">
+              <a:shade val="50000"/>
+            </a:schemeClr>
+          </a:lnRef>
+          <a:fillRef idx="1">
+            <a:schemeClr val="accent1"/>
+          </a:fillRef>
+          <a:effectRef idx="0">
+            <a:schemeClr val="accent1"/>
+          </a:effectRef>
+          <a:fontRef idx="minor">
+            <a:schemeClr val="lt1"/>
+          </a:fontRef>
+        </p:style>
+        <p:txBody>
+          <a:bodyPr rtlCol="0" anchor="ctr"/>
+          <a:lstStyle/>
+          <a:p>
+            <a:pPr algn="ctr"/>
+            <a:endParaRPr lang="en-US"/>
+          </a:p>
+        </p:txBody>
+      </p:sp>
+      <p:sp>
+        <p:nvSpPr>
+          <p:cNvPr id="83" name="Star: 5 Points 82">
+            <a:extLst>
+              <a:ext uri="{FF2B5EF4-FFF2-40B4-BE49-F238E27FC236}">
+                <a16:creationId xmlns:a16="http://schemas.microsoft.com/office/drawing/2014/main" id="{A1398781-6C51-40E4-B5B5-73AF9D6697D5}"/>
+              </a:ext>
+            </a:extLst>
+          </p:cNvPr>
+          <p:cNvSpPr/>
+          <p:nvPr/>
+        </p:nvSpPr>
+        <p:spPr>
+          <a:xfrm>
+            <a:off x="33325997" y="12530591"/>
+            <a:ext cx="342900" cy="342900"/>
+          </a:xfrm>
+          <a:prstGeom prst="star5">
+            <a:avLst/>
+          </a:prstGeom>
+          <a:solidFill>
+            <a:srgbClr val="292D6A"/>
+          </a:solidFill>
+          <a:ln>
+            <a:solidFill>
+              <a:srgbClr val="262B70"/>
+            </a:solidFill>
+          </a:ln>
+        </p:spPr>
+        <p:style>
+          <a:lnRef idx="2">
+            <a:schemeClr val="accent1">
+              <a:shade val="50000"/>
+            </a:schemeClr>
+          </a:lnRef>
+          <a:fillRef idx="1">
+            <a:schemeClr val="accent1"/>
+          </a:fillRef>
+          <a:effectRef idx="0">
+            <a:schemeClr val="accent1"/>
+          </a:effectRef>
+          <a:fontRef idx="minor">
+            <a:schemeClr val="lt1"/>
+          </a:fontRef>
+        </p:style>
+        <p:txBody>
+          <a:bodyPr rtlCol="0" anchor="ctr"/>
+          <a:lstStyle/>
+          <a:p>
+            <a:pPr algn="ctr"/>
+            <a:endParaRPr lang="en-US"/>
+          </a:p>
+        </p:txBody>
+      </p:sp>
+      <p:pic>
+        <p:nvPicPr>
+          <p:cNvPr id="113" name="Picture 112" descr="A close up of a map&#10;&#10;Description automatically generated">
+            <a:extLst>
+              <a:ext uri="{FF2B5EF4-FFF2-40B4-BE49-F238E27FC236}">
+                <a16:creationId xmlns:a16="http://schemas.microsoft.com/office/drawing/2014/main" id="{212B092B-7DEA-4747-88B8-B3F1E3ABFF38}"/>
+              </a:ext>
+            </a:extLst>
+          </p:cNvPr>
+          <p:cNvPicPr>
+            <a:picLocks noChangeAspect="1"/>
+          </p:cNvPicPr>
+          <p:nvPr/>
+        </p:nvPicPr>
+        <p:blipFill rotWithShape="1">
+          <a:blip r:embed="rId13" cstate="print">
+            <a:extLst>
+              <a:ext uri="{28A0092B-C50C-407E-A947-70E740481C1C}">
+                <a14:useLocalDpi xmlns:a14="http://schemas.microsoft.com/office/drawing/2010/main" val="0"/>
+              </a:ext>
+            </a:extLst>
+          </a:blip>
+          <a:srcRect t="9869"/>
+          <a:stretch/>
+        </p:blipFill>
+        <p:spPr>
+          <a:xfrm>
+            <a:off x="16320331" y="19286138"/>
+            <a:ext cx="3373390" cy="3040466"/>
+          </a:xfrm>
+          <a:prstGeom prst="rect">
+            <a:avLst/>
+          </a:prstGeom>
+        </p:spPr>
+      </p:pic>
+      <p:sp>
+        <p:nvSpPr>
+          <p:cNvPr id="117" name="Rectangle 116">
+            <a:extLst>
+              <a:ext uri="{FF2B5EF4-FFF2-40B4-BE49-F238E27FC236}">
+                <a16:creationId xmlns:a16="http://schemas.microsoft.com/office/drawing/2014/main" id="{D9AB3B24-4B1B-40B6-8211-3E765EA957CC}"/>
+              </a:ext>
+            </a:extLst>
+          </p:cNvPr>
+          <p:cNvSpPr/>
+          <p:nvPr/>
+        </p:nvSpPr>
+        <p:spPr>
+          <a:xfrm>
+            <a:off x="1181100" y="12077700"/>
+            <a:ext cx="14623192" cy="3943920"/>
+          </a:xfrm>
+          <a:prstGeom prst="rect">
+            <a:avLst/>
+          </a:prstGeom>
+          <a:solidFill>
+            <a:schemeClr val="bg1"/>
+          </a:solidFill>
+          <a:ln>
+            <a:solidFill>
+              <a:schemeClr val="bg1"/>
+            </a:solidFill>
+          </a:ln>
+        </p:spPr>
+        <p:style>
+          <a:lnRef idx="2">
+            <a:schemeClr val="accent1">
+              <a:shade val="50000"/>
+            </a:schemeClr>
+          </a:lnRef>
+          <a:fillRef idx="1">
+            <a:schemeClr val="accent1"/>
+          </a:fillRef>
+          <a:effectRef idx="0">
+            <a:schemeClr val="accent1"/>
+          </a:effectRef>
+          <a:fontRef idx="minor">
+            <a:schemeClr val="lt1"/>
+          </a:fontRef>
+        </p:style>
+        <p:txBody>
+          <a:bodyPr rtlCol="0" anchor="ctr"/>
+          <a:lstStyle/>
+          <a:p>
+            <a:pPr algn="ctr"/>
+            <a:endParaRPr lang="en-US"/>
+          </a:p>
+        </p:txBody>
+      </p:sp>
+      <p:sp>
+        <p:nvSpPr>
+          <p:cNvPr id="84" name="Rectangle 83">
+            <a:extLst>
+              <a:ext uri="{FF2B5EF4-FFF2-40B4-BE49-F238E27FC236}">
+                <a16:creationId xmlns:a16="http://schemas.microsoft.com/office/drawing/2014/main" id="{3271ED8E-279C-4922-AD85-CEC4037269C4}"/>
+              </a:ext>
+            </a:extLst>
+          </p:cNvPr>
+          <p:cNvSpPr/>
+          <p:nvPr/>
+        </p:nvSpPr>
+        <p:spPr>
+          <a:xfrm>
+            <a:off x="10878562" y="12325446"/>
+            <a:ext cx="4924871" cy="3717607"/>
+          </a:xfrm>
+          <a:prstGeom prst="rect">
+            <a:avLst/>
+          </a:prstGeom>
+          <a:solidFill>
+            <a:schemeClr val="bg1"/>
+          </a:solidFill>
+          <a:ln>
+            <a:solidFill>
+              <a:schemeClr val="bg1"/>
+            </a:solidFill>
+          </a:ln>
+        </p:spPr>
+        <p:style>
+          <a:lnRef idx="2">
+            <a:schemeClr val="accent1">
+              <a:shade val="50000"/>
+            </a:schemeClr>
+          </a:lnRef>
+          <a:fillRef idx="1">
+            <a:schemeClr val="accent1"/>
+          </a:fillRef>
+          <a:effectRef idx="0">
+            <a:schemeClr val="accent1"/>
+          </a:effectRef>
+          <a:fontRef idx="minor">
+            <a:schemeClr val="lt1"/>
+          </a:fontRef>
+        </p:style>
+        <p:txBody>
+          <a:bodyPr rtlCol="0" anchor="ctr"/>
+          <a:lstStyle/>
+          <a:p>
+            <a:pPr algn="ctr"/>
+            <a:r>
+              <a:rPr lang="en-US" dirty="0"/>
+              <a:t>FGF</a:t>
+            </a:r>
+          </a:p>
+        </p:txBody>
+      </p:sp>
+      <p:pic>
+        <p:nvPicPr>
+          <p:cNvPr id="19" name="Picture 18" descr="A close up of a map&#10;&#10;Description automatically generated">
+            <a:extLst>
+              <a:ext uri="{FF2B5EF4-FFF2-40B4-BE49-F238E27FC236}">
+                <a16:creationId xmlns:a16="http://schemas.microsoft.com/office/drawing/2014/main" id="{0277068C-7F2C-4EB7-80BE-81ACD2E6F31C}"/>
+              </a:ext>
+            </a:extLst>
+          </p:cNvPr>
+          <p:cNvPicPr>
+            <a:picLocks noChangeAspect="1"/>
+          </p:cNvPicPr>
+          <p:nvPr/>
+        </p:nvPicPr>
+        <p:blipFill rotWithShape="1">
+          <a:blip r:embed="rId14" cstate="print">
+            <a:extLst>
+              <a:ext uri="{28A0092B-C50C-407E-A947-70E740481C1C}">
+                <a14:useLocalDpi xmlns:a14="http://schemas.microsoft.com/office/drawing/2010/main" val="0"/>
+              </a:ext>
+            </a:extLst>
+          </a:blip>
+          <a:srcRect l="5211" t="16261" b="24720"/>
+          <a:stretch/>
+        </p:blipFill>
+        <p:spPr>
+          <a:xfrm>
+            <a:off x="1218198" y="12316007"/>
+            <a:ext cx="9702704" cy="3733800"/>
+          </a:xfrm>
+          <a:prstGeom prst="rect">
+            <a:avLst/>
+          </a:prstGeom>
+        </p:spPr>
+      </p:pic>
+      <p:pic>
+        <p:nvPicPr>
+          <p:cNvPr id="71" name="Picture 70" descr="A screenshot of a social media post&#10;&#10;Description automatically generated">
+            <a:extLst>
+              <a:ext uri="{FF2B5EF4-FFF2-40B4-BE49-F238E27FC236}">
+                <a16:creationId xmlns:a16="http://schemas.microsoft.com/office/drawing/2014/main" id="{E3BFE3E6-CEAD-4A45-A30C-E0AFED5E9535}"/>
+              </a:ext>
+            </a:extLst>
+          </p:cNvPr>
+          <p:cNvPicPr>
+            <a:picLocks noChangeAspect="1"/>
+          </p:cNvPicPr>
+          <p:nvPr/>
+        </p:nvPicPr>
+        <p:blipFill rotWithShape="1">
+          <a:blip r:embed="rId15" cstate="print">
+            <a:extLst>
+              <a:ext uri="{28A0092B-C50C-407E-A947-70E740481C1C}">
+                <a14:useLocalDpi xmlns:a14="http://schemas.microsoft.com/office/drawing/2010/main" val="0"/>
+              </a:ext>
+            </a:extLst>
+          </a:blip>
+          <a:srcRect r="74414" b="15941"/>
+          <a:stretch/>
+        </p:blipFill>
+        <p:spPr>
+          <a:xfrm>
+            <a:off x="11356940" y="12320100"/>
+            <a:ext cx="4436185" cy="3643610"/>
+          </a:xfrm>
+          <a:prstGeom prst="rect">
+            <a:avLst/>
+          </a:prstGeom>
+        </p:spPr>
+      </p:pic>
+      <p:sp>
+        <p:nvSpPr>
+          <p:cNvPr id="114" name="Rectangle 113">
+            <a:extLst>
+              <a:ext uri="{FF2B5EF4-FFF2-40B4-BE49-F238E27FC236}">
+                <a16:creationId xmlns:a16="http://schemas.microsoft.com/office/drawing/2014/main" id="{66D26EBA-A046-4287-A3FE-6DBF2BE15791}"/>
+              </a:ext>
+            </a:extLst>
+          </p:cNvPr>
+          <p:cNvSpPr/>
+          <p:nvPr/>
+        </p:nvSpPr>
+        <p:spPr>
+          <a:xfrm>
+            <a:off x="1098420" y="12096975"/>
+            <a:ext cx="444352" cy="523220"/>
+          </a:xfrm>
+          <a:prstGeom prst="rect">
+            <a:avLst/>
+          </a:prstGeom>
+        </p:spPr>
+        <p:txBody>
+          <a:bodyPr wrap="none">
+            <a:spAutoFit/>
+          </a:bodyPr>
+          <a:lstStyle/>
+          <a:p>
+            <a:r>
+              <a:rPr lang="en-US" sz="2800" b="1" dirty="0">
+                <a:latin typeface="Helvetica" panose="020B0604020202020204" pitchFamily="34" charset="0"/>
+                <a:cs typeface="Helvetica" panose="020B0604020202020204" pitchFamily="34" charset="0"/>
+              </a:rPr>
+              <a:t>A</a:t>
+            </a:r>
+            <a:endParaRPr lang="en-US" sz="2800" dirty="0"/>
+          </a:p>
+        </p:txBody>
+      </p:sp>
+      <p:sp>
+        <p:nvSpPr>
+          <p:cNvPr id="115" name="Rectangle 114">
+            <a:extLst>
+              <a:ext uri="{FF2B5EF4-FFF2-40B4-BE49-F238E27FC236}">
+                <a16:creationId xmlns:a16="http://schemas.microsoft.com/office/drawing/2014/main" id="{4DDC0169-C4ED-4E1B-AF11-3121285D930D}"/>
+              </a:ext>
+            </a:extLst>
+          </p:cNvPr>
+          <p:cNvSpPr/>
+          <p:nvPr/>
+        </p:nvSpPr>
+        <p:spPr>
+          <a:xfrm>
+            <a:off x="6199337" y="12070083"/>
+            <a:ext cx="444352" cy="523220"/>
+          </a:xfrm>
+          <a:prstGeom prst="rect">
+            <a:avLst/>
+          </a:prstGeom>
+        </p:spPr>
+        <p:txBody>
+          <a:bodyPr wrap="none">
+            <a:spAutoFit/>
+          </a:bodyPr>
+          <a:lstStyle/>
+          <a:p>
+            <a:r>
+              <a:rPr lang="en-US" sz="2800" b="1" dirty="0">
+                <a:latin typeface="Helvetica" panose="020B0604020202020204" pitchFamily="34" charset="0"/>
+                <a:cs typeface="Helvetica" panose="020B0604020202020204" pitchFamily="34" charset="0"/>
+              </a:rPr>
+              <a:t>B</a:t>
+            </a:r>
+            <a:endParaRPr lang="en-US" sz="2800" dirty="0"/>
+          </a:p>
+        </p:txBody>
+      </p:sp>
+      <p:sp>
+        <p:nvSpPr>
+          <p:cNvPr id="116" name="Rectangle 115">
+            <a:extLst>
+              <a:ext uri="{FF2B5EF4-FFF2-40B4-BE49-F238E27FC236}">
+                <a16:creationId xmlns:a16="http://schemas.microsoft.com/office/drawing/2014/main" id="{050397EB-83A0-4759-848A-14BA1811B992}"/>
+              </a:ext>
+            </a:extLst>
+          </p:cNvPr>
+          <p:cNvSpPr/>
+          <p:nvPr/>
+        </p:nvSpPr>
+        <p:spPr>
+          <a:xfrm>
+            <a:off x="11049245" y="12079049"/>
+            <a:ext cx="444352" cy="523220"/>
+          </a:xfrm>
+          <a:prstGeom prst="rect">
+            <a:avLst/>
+          </a:prstGeom>
+        </p:spPr>
+        <p:txBody>
+          <a:bodyPr wrap="none">
+            <a:spAutoFit/>
+          </a:bodyPr>
+          <a:lstStyle/>
+          <a:p>
+            <a:r>
+              <a:rPr lang="en-US" sz="2800" b="1" dirty="0">
+                <a:latin typeface="Helvetica" panose="020B0604020202020204" pitchFamily="34" charset="0"/>
+                <a:cs typeface="Helvetica" panose="020B0604020202020204" pitchFamily="34" charset="0"/>
+              </a:rPr>
+              <a:t>C</a:t>
+            </a:r>
+            <a:endParaRPr lang="en-US" sz="2800" dirty="0"/>
+          </a:p>
+        </p:txBody>
+      </p:sp>
+      <p:sp>
+        <p:nvSpPr>
+          <p:cNvPr id="118" name="Rectangle 117">
+            <a:extLst>
+              <a:ext uri="{FF2B5EF4-FFF2-40B4-BE49-F238E27FC236}">
+                <a16:creationId xmlns:a16="http://schemas.microsoft.com/office/drawing/2014/main" id="{D9E88F01-7443-4DAF-9100-5EFCD11A9EB3}"/>
+              </a:ext>
+            </a:extLst>
+          </p:cNvPr>
+          <p:cNvSpPr/>
+          <p:nvPr/>
+        </p:nvSpPr>
+        <p:spPr>
+          <a:xfrm>
+            <a:off x="16395570" y="12096975"/>
+            <a:ext cx="444352" cy="523220"/>
+          </a:xfrm>
+          <a:prstGeom prst="rect">
+            <a:avLst/>
+          </a:prstGeom>
+        </p:spPr>
+        <p:txBody>
+          <a:bodyPr wrap="none">
+            <a:spAutoFit/>
+          </a:bodyPr>
+          <a:lstStyle/>
+          <a:p>
+            <a:r>
+              <a:rPr lang="en-US" sz="2800" b="1" dirty="0">
+                <a:latin typeface="Helvetica" panose="020B0604020202020204" pitchFamily="34" charset="0"/>
+                <a:cs typeface="Helvetica" panose="020B0604020202020204" pitchFamily="34" charset="0"/>
+              </a:rPr>
+              <a:t>A</a:t>
+            </a:r>
+            <a:endParaRPr lang="en-US" sz="2800" dirty="0"/>
+          </a:p>
+        </p:txBody>
+      </p:sp>
+      <p:sp>
+        <p:nvSpPr>
+          <p:cNvPr id="119" name="Rectangle 118">
+            <a:extLst>
+              <a:ext uri="{FF2B5EF4-FFF2-40B4-BE49-F238E27FC236}">
+                <a16:creationId xmlns:a16="http://schemas.microsoft.com/office/drawing/2014/main" id="{11F5D33C-1E5C-46C5-BECE-28639CDE6D6E}"/>
+              </a:ext>
+            </a:extLst>
+          </p:cNvPr>
+          <p:cNvSpPr/>
+          <p:nvPr/>
+        </p:nvSpPr>
+        <p:spPr>
+          <a:xfrm>
+            <a:off x="33045270" y="12096975"/>
+            <a:ext cx="444352" cy="523220"/>
+          </a:xfrm>
+          <a:prstGeom prst="rect">
+            <a:avLst/>
+          </a:prstGeom>
+        </p:spPr>
+        <p:txBody>
+          <a:bodyPr wrap="none">
+            <a:spAutoFit/>
+          </a:bodyPr>
+          <a:lstStyle/>
+          <a:p>
+            <a:r>
+              <a:rPr lang="en-US" sz="2800" b="1" dirty="0">
+                <a:latin typeface="Helvetica" panose="020B0604020202020204" pitchFamily="34" charset="0"/>
+                <a:cs typeface="Helvetica" panose="020B0604020202020204" pitchFamily="34" charset="0"/>
+              </a:rPr>
+              <a:t>B</a:t>
+            </a:r>
+            <a:endParaRPr lang="en-US" sz="2800" dirty="0"/>
+          </a:p>
+        </p:txBody>
+      </p:sp>
+      <p:sp>
+        <p:nvSpPr>
+          <p:cNvPr id="121" name="Rectangle 120">
+            <a:extLst>
+              <a:ext uri="{FF2B5EF4-FFF2-40B4-BE49-F238E27FC236}">
+                <a16:creationId xmlns:a16="http://schemas.microsoft.com/office/drawing/2014/main" id="{DCCD2C68-4380-4E8F-BC3D-13351B5FFC4D}"/>
+              </a:ext>
+            </a:extLst>
+          </p:cNvPr>
+          <p:cNvSpPr/>
+          <p:nvPr/>
+        </p:nvSpPr>
+        <p:spPr>
+          <a:xfrm>
+            <a:off x="1159380" y="18406335"/>
+            <a:ext cx="444352" cy="523220"/>
+          </a:xfrm>
+          <a:prstGeom prst="rect">
+            <a:avLst/>
+          </a:prstGeom>
+        </p:spPr>
+        <p:txBody>
+          <a:bodyPr wrap="none">
+            <a:spAutoFit/>
+          </a:bodyPr>
+          <a:lstStyle/>
+          <a:p>
+            <a:r>
+              <a:rPr lang="en-US" sz="2800" b="1" dirty="0">
+                <a:latin typeface="Helvetica" panose="020B0604020202020204" pitchFamily="34" charset="0"/>
+                <a:cs typeface="Helvetica" panose="020B0604020202020204" pitchFamily="34" charset="0"/>
+              </a:rPr>
+              <a:t>A</a:t>
+            </a:r>
+            <a:endParaRPr lang="en-US" sz="2800" dirty="0"/>
+          </a:p>
+        </p:txBody>
+      </p:sp>
+      <p:sp>
+        <p:nvSpPr>
+          <p:cNvPr id="122" name="Rectangle 121">
+            <a:extLst>
+              <a:ext uri="{FF2B5EF4-FFF2-40B4-BE49-F238E27FC236}">
+                <a16:creationId xmlns:a16="http://schemas.microsoft.com/office/drawing/2014/main" id="{7557704C-6795-45BF-9BC1-06C8B09292A2}"/>
+              </a:ext>
+            </a:extLst>
+          </p:cNvPr>
+          <p:cNvSpPr/>
+          <p:nvPr/>
+        </p:nvSpPr>
+        <p:spPr>
+          <a:xfrm>
+            <a:off x="4237860" y="19168335"/>
+            <a:ext cx="386644" cy="523220"/>
+          </a:xfrm>
+          <a:prstGeom prst="rect">
+            <a:avLst/>
+          </a:prstGeom>
+        </p:spPr>
+        <p:txBody>
+          <a:bodyPr wrap="none">
+            <a:spAutoFit/>
+          </a:bodyPr>
+          <a:lstStyle/>
+          <a:p>
+            <a:r>
+              <a:rPr lang="en-US" sz="2800" b="1" dirty="0"/>
+              <a:t>B</a:t>
+            </a:r>
+          </a:p>
+        </p:txBody>
+      </p:sp>
+      <p:sp>
+        <p:nvSpPr>
+          <p:cNvPr id="123" name="Rectangle 122">
+            <a:extLst>
+              <a:ext uri="{FF2B5EF4-FFF2-40B4-BE49-F238E27FC236}">
+                <a16:creationId xmlns:a16="http://schemas.microsoft.com/office/drawing/2014/main" id="{D55B8725-BD24-423E-A9BF-C3C4B7AE7750}"/>
+              </a:ext>
+            </a:extLst>
+          </p:cNvPr>
+          <p:cNvSpPr/>
+          <p:nvPr/>
+        </p:nvSpPr>
+        <p:spPr>
+          <a:xfrm>
+            <a:off x="16338420" y="19168335"/>
+            <a:ext cx="375424" cy="523220"/>
+          </a:xfrm>
+          <a:prstGeom prst="rect">
+            <a:avLst/>
+          </a:prstGeom>
+        </p:spPr>
+        <p:txBody>
+          <a:bodyPr wrap="none">
+            <a:spAutoFit/>
+          </a:bodyPr>
+          <a:lstStyle/>
+          <a:p>
+            <a:r>
+              <a:rPr lang="en-US" sz="2800" b="1" dirty="0"/>
+              <a:t>C</a:t>
+            </a:r>
+          </a:p>
+        </p:txBody>
+      </p:sp>
+      <p:sp>
+        <p:nvSpPr>
+          <p:cNvPr id="124" name="Rectangle 123">
+            <a:extLst>
+              <a:ext uri="{FF2B5EF4-FFF2-40B4-BE49-F238E27FC236}">
+                <a16:creationId xmlns:a16="http://schemas.microsoft.com/office/drawing/2014/main" id="{2C9E62B2-84C3-4FCF-80E0-E64254DDA4BD}"/>
+              </a:ext>
+            </a:extLst>
+          </p:cNvPr>
+          <p:cNvSpPr/>
+          <p:nvPr/>
+        </p:nvSpPr>
+        <p:spPr>
+          <a:xfrm>
+            <a:off x="34016820" y="19625535"/>
+            <a:ext cx="413896" cy="523220"/>
+          </a:xfrm>
+          <a:prstGeom prst="rect">
+            <a:avLst/>
+          </a:prstGeom>
+        </p:spPr>
+        <p:txBody>
+          <a:bodyPr wrap="none">
+            <a:spAutoFit/>
+          </a:bodyPr>
+          <a:lstStyle/>
+          <a:p>
+            <a:r>
+              <a:rPr lang="en-US" sz="2800" b="1" dirty="0"/>
+              <a:t>G</a:t>
+            </a:r>
+          </a:p>
+        </p:txBody>
+      </p:sp>
+      <p:sp>
+        <p:nvSpPr>
+          <p:cNvPr id="125" name="Rectangle 124">
+            <a:extLst>
+              <a:ext uri="{FF2B5EF4-FFF2-40B4-BE49-F238E27FC236}">
+                <a16:creationId xmlns:a16="http://schemas.microsoft.com/office/drawing/2014/main" id="{737B91AC-F87C-4BC9-A8F5-1A8CC80D6095}"/>
+              </a:ext>
+            </a:extLst>
+          </p:cNvPr>
+          <p:cNvSpPr/>
+          <p:nvPr/>
+        </p:nvSpPr>
+        <p:spPr>
+          <a:xfrm>
+            <a:off x="30724980" y="18436815"/>
+            <a:ext cx="359394" cy="523220"/>
+          </a:xfrm>
+          <a:prstGeom prst="rect">
+            <a:avLst/>
+          </a:prstGeom>
+        </p:spPr>
+        <p:txBody>
+          <a:bodyPr wrap="none">
+            <a:spAutoFit/>
+          </a:bodyPr>
+          <a:lstStyle/>
+          <a:p>
+            <a:r>
+              <a:rPr lang="en-US" sz="2800" b="1" dirty="0"/>
+              <a:t>E</a:t>
+            </a:r>
+          </a:p>
+        </p:txBody>
+      </p:sp>
+      <p:sp>
+        <p:nvSpPr>
+          <p:cNvPr id="126" name="Rectangle 125">
+            <a:extLst>
+              <a:ext uri="{FF2B5EF4-FFF2-40B4-BE49-F238E27FC236}">
+                <a16:creationId xmlns:a16="http://schemas.microsoft.com/office/drawing/2014/main" id="{24B967C1-3F5D-4BFB-AA41-9E642A9BEA2F}"/>
+              </a:ext>
+            </a:extLst>
+          </p:cNvPr>
+          <p:cNvSpPr/>
+          <p:nvPr/>
+        </p:nvSpPr>
+        <p:spPr>
+          <a:xfrm>
+            <a:off x="18411060" y="22307775"/>
+            <a:ext cx="349776" cy="523220"/>
+          </a:xfrm>
+          <a:prstGeom prst="rect">
+            <a:avLst/>
+          </a:prstGeom>
+        </p:spPr>
+        <p:txBody>
+          <a:bodyPr wrap="none">
+            <a:spAutoFit/>
+          </a:bodyPr>
+          <a:lstStyle/>
+          <a:p>
+            <a:r>
+              <a:rPr lang="en-US" sz="2800" b="1" dirty="0"/>
+              <a:t>F</a:t>
+            </a:r>
+          </a:p>
+        </p:txBody>
+      </p:sp>
+      <p:sp>
+        <p:nvSpPr>
+          <p:cNvPr id="127" name="Rectangle 126">
+            <a:extLst>
+              <a:ext uri="{FF2B5EF4-FFF2-40B4-BE49-F238E27FC236}">
+                <a16:creationId xmlns:a16="http://schemas.microsoft.com/office/drawing/2014/main" id="{5E6ADDC7-93E7-40DB-9DDE-4DF0B2CF0FF0}"/>
+              </a:ext>
+            </a:extLst>
+          </p:cNvPr>
+          <p:cNvSpPr/>
+          <p:nvPr/>
+        </p:nvSpPr>
+        <p:spPr>
+          <a:xfrm>
+            <a:off x="6097140" y="22216335"/>
+            <a:ext cx="410690" cy="523220"/>
+          </a:xfrm>
+          <a:prstGeom prst="rect">
+            <a:avLst/>
+          </a:prstGeom>
+        </p:spPr>
+        <p:txBody>
+          <a:bodyPr wrap="none">
+            <a:spAutoFit/>
+          </a:bodyPr>
+          <a:lstStyle/>
+          <a:p>
+            <a:r>
+              <a:rPr lang="en-US" sz="2800" b="1" dirty="0"/>
+              <a:t>D</a:t>
+            </a:r>
+          </a:p>
+        </p:txBody>
+      </p:sp>
+      <p:pic>
+        <p:nvPicPr>
+          <p:cNvPr id="128" name="Picture 127">
+            <a:extLst>
+              <a:ext uri="{FF2B5EF4-FFF2-40B4-BE49-F238E27FC236}">
+                <a16:creationId xmlns:a16="http://schemas.microsoft.com/office/drawing/2014/main" id="{7E551389-9C22-4842-9C4F-AFCA9AB548A6}"/>
+              </a:ext>
+            </a:extLst>
+          </p:cNvPr>
+          <p:cNvPicPr>
+            <a:picLocks noChangeAspect="1"/>
+          </p:cNvPicPr>
+          <p:nvPr/>
+        </p:nvPicPr>
+        <p:blipFill rotWithShape="1">
+          <a:blip r:embed="rId16" cstate="print">
+            <a:extLst>
+              <a:ext uri="{28A0092B-C50C-407E-A947-70E740481C1C}">
+                <a14:useLocalDpi xmlns:a14="http://schemas.microsoft.com/office/drawing/2010/main" val="0"/>
+              </a:ext>
+            </a:extLst>
+          </a:blip>
+          <a:srcRect l="6313" t="14105" r="3448" b="19678"/>
+          <a:stretch/>
+        </p:blipFill>
+        <p:spPr>
+          <a:xfrm rot="16200000">
+            <a:off x="35946657" y="18267638"/>
+            <a:ext cx="1113586" cy="1453450"/>
           </a:xfrm>
           <a:prstGeom prst="rect">
             <a:avLst/>

</xml_diff>

<commit_message>
New figures for DOE presentation 2-21
</commit_message>
<xml_diff>
--- a/presentations/MacQueen_Juenger_DOE.pptx
+++ b/presentations/MacQueen_Juenger_DOE.pptx
@@ -197,7 +197,7 @@
           <a:p>
             <a:fld id="{4944184F-C803-4148-93A0-DFA06EF5EF58}" type="datetimeFigureOut">
               <a:rPr lang="en-US" smtClean="0"/>
-              <a:t>2020-02-19</a:t>
+              <a:t>2/20/2020</a:t>
             </a:fld>
             <a:endParaRPr lang="en-US"/>
           </a:p>
@@ -682,7 +682,7 @@
           <a:p>
             <a:fld id="{C3D8989D-7557-47B7-BF73-5C0345B022EC}" type="datetimeFigureOut">
               <a:rPr lang="en-US" smtClean="0"/>
-              <a:t>2020-02-19</a:t>
+              <a:t>2/20/2020</a:t>
             </a:fld>
             <a:endParaRPr lang="en-US"/>
           </a:p>
@@ -852,7 +852,7 @@
           <a:p>
             <a:fld id="{C3D8989D-7557-47B7-BF73-5C0345B022EC}" type="datetimeFigureOut">
               <a:rPr lang="en-US" smtClean="0"/>
-              <a:t>2020-02-19</a:t>
+              <a:t>2/20/2020</a:t>
             </a:fld>
             <a:endParaRPr lang="en-US"/>
           </a:p>
@@ -1032,7 +1032,7 @@
           <a:p>
             <a:fld id="{C3D8989D-7557-47B7-BF73-5C0345B022EC}" type="datetimeFigureOut">
               <a:rPr lang="en-US" smtClean="0"/>
-              <a:t>2020-02-19</a:t>
+              <a:t>2/20/2020</a:t>
             </a:fld>
             <a:endParaRPr lang="en-US"/>
           </a:p>
@@ -1202,7 +1202,7 @@
           <a:p>
             <a:fld id="{C3D8989D-7557-47B7-BF73-5C0345B022EC}" type="datetimeFigureOut">
               <a:rPr lang="en-US" smtClean="0"/>
-              <a:t>2020-02-19</a:t>
+              <a:t>2/20/2020</a:t>
             </a:fld>
             <a:endParaRPr lang="en-US"/>
           </a:p>
@@ -1446,7 +1446,7 @@
           <a:p>
             <a:fld id="{C3D8989D-7557-47B7-BF73-5C0345B022EC}" type="datetimeFigureOut">
               <a:rPr lang="en-US" smtClean="0"/>
-              <a:t>2020-02-19</a:t>
+              <a:t>2/20/2020</a:t>
             </a:fld>
             <a:endParaRPr lang="en-US"/>
           </a:p>
@@ -1678,7 +1678,7 @@
           <a:p>
             <a:fld id="{C3D8989D-7557-47B7-BF73-5C0345B022EC}" type="datetimeFigureOut">
               <a:rPr lang="en-US" smtClean="0"/>
-              <a:t>2020-02-19</a:t>
+              <a:t>2/20/2020</a:t>
             </a:fld>
             <a:endParaRPr lang="en-US"/>
           </a:p>
@@ -2045,7 +2045,7 @@
           <a:p>
             <a:fld id="{C3D8989D-7557-47B7-BF73-5C0345B022EC}" type="datetimeFigureOut">
               <a:rPr lang="en-US" smtClean="0"/>
-              <a:t>2020-02-19</a:t>
+              <a:t>2/20/2020</a:t>
             </a:fld>
             <a:endParaRPr lang="en-US"/>
           </a:p>
@@ -2163,7 +2163,7 @@
           <a:p>
             <a:fld id="{C3D8989D-7557-47B7-BF73-5C0345B022EC}" type="datetimeFigureOut">
               <a:rPr lang="en-US" smtClean="0"/>
-              <a:t>2020-02-19</a:t>
+              <a:t>2/20/2020</a:t>
             </a:fld>
             <a:endParaRPr lang="en-US"/>
           </a:p>
@@ -2258,7 +2258,7 @@
           <a:p>
             <a:fld id="{C3D8989D-7557-47B7-BF73-5C0345B022EC}" type="datetimeFigureOut">
               <a:rPr lang="en-US" smtClean="0"/>
-              <a:t>2020-02-19</a:t>
+              <a:t>2/20/2020</a:t>
             </a:fld>
             <a:endParaRPr lang="en-US"/>
           </a:p>
@@ -2535,7 +2535,7 @@
           <a:p>
             <a:fld id="{C3D8989D-7557-47B7-BF73-5C0345B022EC}" type="datetimeFigureOut">
               <a:rPr lang="en-US" smtClean="0"/>
-              <a:t>2020-02-19</a:t>
+              <a:t>2/20/2020</a:t>
             </a:fld>
             <a:endParaRPr lang="en-US"/>
           </a:p>
@@ -2792,7 +2792,7 @@
           <a:p>
             <a:fld id="{C3D8989D-7557-47B7-BF73-5C0345B022EC}" type="datetimeFigureOut">
               <a:rPr lang="en-US" smtClean="0"/>
-              <a:t>2020-02-19</a:t>
+              <a:t>2/20/2020</a:t>
             </a:fld>
             <a:endParaRPr lang="en-US"/>
           </a:p>
@@ -3005,7 +3005,7 @@
           <a:p>
             <a:fld id="{C3D8989D-7557-47B7-BF73-5C0345B022EC}" type="datetimeFigureOut">
               <a:rPr lang="en-US" smtClean="0"/>
-              <a:t>2020-02-19</a:t>
+              <a:t>2/20/2020</a:t>
             </a:fld>
             <a:endParaRPr lang="en-US"/>
           </a:p>
@@ -3425,11 +3425,13 @@
             <a:avLst/>
           </a:prstGeom>
           <a:solidFill>
-            <a:srgbClr val="EAEAF0"/>
+            <a:srgbClr val="EAEAF0">
+              <a:alpha val="40000"/>
+            </a:srgbClr>
           </a:solidFill>
           <a:ln>
             <a:solidFill>
-              <a:srgbClr val="EAEAF0"/>
+              <a:srgbClr val="262B70"/>
             </a:solidFill>
           </a:ln>
         </p:spPr>
@@ -3473,11 +3475,13 @@
             <a:avLst/>
           </a:prstGeom>
           <a:solidFill>
-            <a:srgbClr val="EAEAF0"/>
+            <a:srgbClr val="EAEAF0">
+              <a:alpha val="40000"/>
+            </a:srgbClr>
           </a:solidFill>
           <a:ln>
             <a:solidFill>
-              <a:srgbClr val="EAEAF0"/>
+              <a:srgbClr val="262B70"/>
             </a:solidFill>
           </a:ln>
         </p:spPr>
@@ -3527,11 +3531,13 @@
             <a:avLst/>
           </a:prstGeom>
           <a:solidFill>
-            <a:srgbClr val="EAEAF0"/>
+            <a:srgbClr val="EAEAF0">
+              <a:alpha val="40000"/>
+            </a:srgbClr>
           </a:solidFill>
           <a:ln>
             <a:solidFill>
-              <a:srgbClr val="EAEAF0"/>
+              <a:srgbClr val="262B70"/>
             </a:solidFill>
           </a:ln>
         </p:spPr>
@@ -3575,11 +3581,13 @@
             <a:avLst/>
           </a:prstGeom>
           <a:solidFill>
-            <a:srgbClr val="EAEAF0"/>
+            <a:srgbClr val="EAEAF0">
+              <a:alpha val="40000"/>
+            </a:srgbClr>
           </a:solidFill>
           <a:ln>
             <a:solidFill>
-              <a:srgbClr val="EAEAF0"/>
+              <a:srgbClr val="262B70"/>
             </a:solidFill>
           </a:ln>
         </p:spPr>
@@ -3623,11 +3631,13 @@
             <a:avLst/>
           </a:prstGeom>
           <a:solidFill>
-            <a:srgbClr val="EAEAF0"/>
+            <a:srgbClr val="EAEAF0">
+              <a:alpha val="40000"/>
+            </a:srgbClr>
           </a:solidFill>
           <a:ln>
             <a:solidFill>
-              <a:srgbClr val="EAEAF0"/>
+              <a:srgbClr val="262B70"/>
             </a:solidFill>
           </a:ln>
         </p:spPr>
@@ -3671,11 +3681,13 @@
             <a:avLst/>
           </a:prstGeom>
           <a:solidFill>
-            <a:srgbClr val="EAEAF0"/>
+            <a:srgbClr val="EAEAF0">
+              <a:alpha val="40000"/>
+            </a:srgbClr>
           </a:solidFill>
           <a:ln>
             <a:solidFill>
-              <a:srgbClr val="EAEAF0"/>
+              <a:srgbClr val="262B70"/>
             </a:solidFill>
           </a:ln>
         </p:spPr>
@@ -3719,11 +3731,13 @@
             <a:avLst/>
           </a:prstGeom>
           <a:solidFill>
-            <a:srgbClr val="EAEAF0"/>
+            <a:srgbClr val="EAEAF0">
+              <a:alpha val="40000"/>
+            </a:srgbClr>
           </a:solidFill>
           <a:ln>
             <a:solidFill>
-              <a:srgbClr val="EAEAF0"/>
+              <a:srgbClr val="262B70"/>
             </a:solidFill>
           </a:ln>
         </p:spPr>
@@ -3767,11 +3781,13 @@
             <a:avLst/>
           </a:prstGeom>
           <a:solidFill>
-            <a:srgbClr val="EAEAF0"/>
+            <a:srgbClr val="EAEAF0">
+              <a:alpha val="40000"/>
+            </a:srgbClr>
           </a:solidFill>
           <a:ln>
             <a:solidFill>
-              <a:srgbClr val="EAEAF0"/>
+              <a:srgbClr val="262B70"/>
             </a:solidFill>
           </a:ln>
         </p:spPr>

</xml_diff>